<commit_message>
updated ppt and all codes
</commit_message>
<xml_diff>
--- a/RTBD.pptx
+++ b/RTBD.pptx
@@ -5,7 +5,7 @@
     <p:sldMasterId id="2147483654" r:id="rId1"/>
   </p:sldMasterIdLst>
   <p:notesMasterIdLst>
-    <p:notesMasterId r:id="rId20"/>
+    <p:notesMasterId r:id="rId21"/>
   </p:notesMasterIdLst>
   <p:sldIdLst>
     <p:sldId id="256" r:id="rId2"/>
@@ -25,7 +25,8 @@
     <p:sldId id="275" r:id="rId16"/>
     <p:sldId id="276" r:id="rId17"/>
     <p:sldId id="264" r:id="rId18"/>
-    <p:sldId id="265" r:id="rId19"/>
+    <p:sldId id="277" r:id="rId19"/>
+    <p:sldId id="278" r:id="rId20"/>
   </p:sldIdLst>
   <p:sldSz cx="9144000" cy="5143500" type="screen16x9"/>
   <p:notesSz cx="6858000" cy="9144000"/>
@@ -236,6 +237,7 @@
 
 <file path=ppt/charts/chart1.xml><?xml version="1.0" encoding="utf-8"?>
 <c:chartSpace xmlns:c="http://schemas.openxmlformats.org/drawingml/2006/chart" xmlns:a="http://schemas.openxmlformats.org/drawingml/2006/main" xmlns:r="http://schemas.openxmlformats.org/officeDocument/2006/relationships">
+  <c:date1904 val="1"/>
   <c:lang val="en-US"/>
   <c:chart>
     <c:title>
@@ -1673,11 +1675,11 @@
           </c:val>
         </c:ser>
         <c:marker val="1"/>
-        <c:axId val="39907328"/>
-        <c:axId val="39909248"/>
+        <c:axId val="48602112"/>
+        <c:axId val="48616576"/>
       </c:lineChart>
       <c:catAx>
-        <c:axId val="39907328"/>
+        <c:axId val="48602112"/>
         <c:scaling>
           <c:orientation val="minMax"/>
         </c:scaling>
@@ -1702,14 +1704,14 @@
         </c:title>
         <c:numFmt formatCode="General" sourceLinked="1"/>
         <c:tickLblPos val="nextTo"/>
-        <c:crossAx val="39909248"/>
+        <c:crossAx val="48616576"/>
         <c:crosses val="autoZero"/>
         <c:auto val="1"/>
         <c:lblAlgn val="ctr"/>
         <c:lblOffset val="100"/>
       </c:catAx>
       <c:valAx>
-        <c:axId val="39909248"/>
+        <c:axId val="48616576"/>
         <c:scaling>
           <c:orientation val="minMax"/>
         </c:scaling>
@@ -1735,7 +1737,7 @@
         </c:title>
         <c:numFmt formatCode="General" sourceLinked="1"/>
         <c:tickLblPos val="nextTo"/>
-        <c:crossAx val="39907328"/>
+        <c:crossAx val="48602112"/>
         <c:crosses val="autoZero"/>
         <c:crossBetween val="between"/>
       </c:valAx>
@@ -1752,6 +1754,7 @@
 
 <file path=ppt/charts/chart2.xml><?xml version="1.0" encoding="utf-8"?>
 <c:chartSpace xmlns:c="http://schemas.openxmlformats.org/drawingml/2006/chart" xmlns:a="http://schemas.openxmlformats.org/drawingml/2006/main" xmlns:r="http://schemas.openxmlformats.org/officeDocument/2006/relationships">
+  <c:date1904 val="1"/>
   <c:lang val="en-US"/>
   <c:chart>
     <c:title>
@@ -1956,40 +1959,40 @@
                 <c:formatCode>General</c:formatCode>
                 <c:ptCount val="45"/>
                 <c:pt idx="0">
-                  <c:v>1.5333333</c:v>
+                  <c:v>1.5333332999999998</c:v>
                 </c:pt>
                 <c:pt idx="1">
                   <c:v>1.1000000000000001</c:v>
                 </c:pt>
                 <c:pt idx="2">
-                  <c:v>1.2592592</c:v>
+                  <c:v>1.2592591999999998</c:v>
                 </c:pt>
                 <c:pt idx="3">
-                  <c:v>1.3333333999999999</c:v>
+                  <c:v>1.3333333999999997</c:v>
                 </c:pt>
                 <c:pt idx="4">
                   <c:v>1.2</c:v>
                 </c:pt>
                 <c:pt idx="5">
-                  <c:v>1.2857143</c:v>
+                  <c:v>1.2857142999999998</c:v>
                 </c:pt>
                 <c:pt idx="6">
-                  <c:v>1.1534392</c:v>
+                  <c:v>1.1534391999999998</c:v>
                 </c:pt>
                 <c:pt idx="7">
                   <c:v>1.0277778</c:v>
                 </c:pt>
                 <c:pt idx="8">
-                  <c:v>1.1295336</c:v>
+                  <c:v>1.1295335999999998</c:v>
                 </c:pt>
                 <c:pt idx="9">
-                  <c:v>1.2535886000000001</c:v>
+                  <c:v>1.2535885999999998</c:v>
                 </c:pt>
                 <c:pt idx="10">
                   <c:v>1.1646091000000001</c:v>
                 </c:pt>
                 <c:pt idx="11">
-                  <c:v>1.3133802000000001</c:v>
+                  <c:v>1.3133801999999999</c:v>
                 </c:pt>
                 <c:pt idx="12">
                   <c:v>1.2288135</c:v>
@@ -1998,7 +2001,7 @@
                   <c:v>1.2965880000000001</c:v>
                 </c:pt>
                 <c:pt idx="14">
-                  <c:v>1.2594696999999999</c:v>
+                  <c:v>1.2594696999999995</c:v>
                 </c:pt>
                 <c:pt idx="15">
                   <c:v>1.1790744</c:v>
@@ -2007,19 +2010,19 @@
                   <c:v>1.1752137</c:v>
                 </c:pt>
                 <c:pt idx="17">
-                  <c:v>1.3136426999999999</c:v>
+                  <c:v>1.3136426999999997</c:v>
                 </c:pt>
                 <c:pt idx="18">
-                  <c:v>1.2722062999999999</c:v>
+                  <c:v>1.2722062999999997</c:v>
                 </c:pt>
                 <c:pt idx="19">
-                  <c:v>1.3315216999999999</c:v>
+                  <c:v>1.3315216999999995</c:v>
                 </c:pt>
                 <c:pt idx="20">
                   <c:v>1.3363533000000001</c:v>
                 </c:pt>
                 <c:pt idx="21">
-                  <c:v>1.3136494999999999</c:v>
+                  <c:v>1.3136494999999997</c:v>
                 </c:pt>
                 <c:pt idx="22">
                   <c:v>1.3222221999999999</c:v>
@@ -2037,58 +2040,58 @@
                   <c:v>1.3460608999999999</c:v>
                 </c:pt>
                 <c:pt idx="27">
-                  <c:v>1.3318681999999999</c:v>
+                  <c:v>1.3318681999999997</c:v>
                 </c:pt>
                 <c:pt idx="28">
-                  <c:v>1.3843171999999999</c:v>
+                  <c:v>1.3843172000000001</c:v>
                 </c:pt>
                 <c:pt idx="29">
-                  <c:v>1.3602282000000001</c:v>
+                  <c:v>1.3602281999999999</c:v>
                 </c:pt>
                 <c:pt idx="30">
-                  <c:v>1.4276644999999999</c:v>
+                  <c:v>1.4276644999999994</c:v>
                 </c:pt>
                 <c:pt idx="31">
-                  <c:v>1.4053899000000001</c:v>
+                  <c:v>1.4053898999999999</c:v>
                 </c:pt>
                 <c:pt idx="32">
-                  <c:v>1.4091532</c:v>
+                  <c:v>1.4091531999999998</c:v>
                 </c:pt>
                 <c:pt idx="33">
-                  <c:v>1.4528627000000001</c:v>
+                  <c:v>1.4528626999999998</c:v>
                 </c:pt>
                 <c:pt idx="34">
-                  <c:v>1.4339293</c:v>
+                  <c:v>1.4339292999999995</c:v>
                 </c:pt>
                 <c:pt idx="35">
-                  <c:v>1.4420018999999999</c:v>
+                  <c:v>1.4420018999999997</c:v>
                 </c:pt>
                 <c:pt idx="36">
-                  <c:v>1.4407300000000001</c:v>
+                  <c:v>1.4407299999999998</c:v>
                 </c:pt>
                 <c:pt idx="37">
-                  <c:v>1.4735007</c:v>
+                  <c:v>1.4735006999999998</c:v>
                 </c:pt>
                 <c:pt idx="38">
-                  <c:v>1.4253210999999999</c:v>
+                  <c:v>1.4253210999999995</c:v>
                 </c:pt>
                 <c:pt idx="39">
-                  <c:v>1.4645902</c:v>
+                  <c:v>1.4645901999999997</c:v>
                 </c:pt>
                 <c:pt idx="40">
-                  <c:v>1.456634</c:v>
+                  <c:v>1.4566339999999998</c:v>
                 </c:pt>
                 <c:pt idx="41">
-                  <c:v>1.4192887999999999</c:v>
+                  <c:v>1.4192887999999997</c:v>
                 </c:pt>
                 <c:pt idx="42">
                   <c:v>1.4342088</c:v>
                 </c:pt>
                 <c:pt idx="43">
-                  <c:v>1.3759733000000001</c:v>
+                  <c:v>1.3759732999999998</c:v>
                 </c:pt>
                 <c:pt idx="44">
-                  <c:v>1.4216337999999999</c:v>
+                  <c:v>1.4216337999999995</c:v>
                 </c:pt>
               </c:numCache>
             </c:numRef>
@@ -2262,16 +2265,16 @@
                 <c:formatCode>General</c:formatCode>
                 <c:ptCount val="45"/>
                 <c:pt idx="0">
-                  <c:v>1.5333333</c:v>
+                  <c:v>1.5333332999999998</c:v>
                 </c:pt>
                 <c:pt idx="1">
                   <c:v>1.1000000000000001</c:v>
                 </c:pt>
                 <c:pt idx="2">
-                  <c:v>1.2592592</c:v>
+                  <c:v>1.2592591999999998</c:v>
                 </c:pt>
                 <c:pt idx="3">
-                  <c:v>1.3333333999999999</c:v>
+                  <c:v>1.3333333999999997</c:v>
                 </c:pt>
                 <c:pt idx="4">
                   <c:v>1.2</c:v>
@@ -2289,22 +2292,22 @@
                   <c:v>1.0971428000000001</c:v>
                 </c:pt>
                 <c:pt idx="9">
-                  <c:v>1.2634407999999999</c:v>
+                  <c:v>1.2634407999999997</c:v>
                 </c:pt>
                 <c:pt idx="10">
-                  <c:v>1.0935252</c:v>
+                  <c:v>1.0935251999999998</c:v>
                 </c:pt>
                 <c:pt idx="11">
-                  <c:v>1.3039216</c:v>
+                  <c:v>1.3039215999999996</c:v>
                 </c:pt>
                 <c:pt idx="12">
-                  <c:v>1.1753247</c:v>
+                  <c:v>1.1753246999999998</c:v>
                 </c:pt>
                 <c:pt idx="13">
-                  <c:v>1.2769953000000001</c:v>
+                  <c:v>1.2769952999999998</c:v>
                 </c:pt>
                 <c:pt idx="14">
-                  <c:v>1.2250923</c:v>
+                  <c:v>1.2250922999999998</c:v>
                 </c:pt>
                 <c:pt idx="15">
                   <c:v>1.13486</c:v>
@@ -2313,40 +2316,40 @@
                   <c:v>1.1565657</c:v>
                 </c:pt>
                 <c:pt idx="17">
-                  <c:v>1.2412935</c:v>
+                  <c:v>1.2412934999999998</c:v>
                 </c:pt>
                 <c:pt idx="18">
-                  <c:v>1.2531645</c:v>
+                  <c:v>1.2531644999999998</c:v>
                 </c:pt>
                 <c:pt idx="19">
                   <c:v>1.2227378</c:v>
                 </c:pt>
                 <c:pt idx="20">
-                  <c:v>1.2711443</c:v>
+                  <c:v>1.2711442999999998</c:v>
                 </c:pt>
                 <c:pt idx="21">
-                  <c:v>1.3950617000000001</c:v>
+                  <c:v>1.3950616999999998</c:v>
                 </c:pt>
                 <c:pt idx="22">
-                  <c:v>1.2415254</c:v>
+                  <c:v>1.2415253999999998</c:v>
                 </c:pt>
                 <c:pt idx="23">
                   <c:v>1.3080261</c:v>
                 </c:pt>
                 <c:pt idx="24">
-                  <c:v>1.3378608000000001</c:v>
+                  <c:v>1.3378607999999999</c:v>
                 </c:pt>
                 <c:pt idx="25">
-                  <c:v>1.3412162000000001</c:v>
+                  <c:v>1.3412161999999999</c:v>
                 </c:pt>
                 <c:pt idx="26">
                   <c:v>1.2606708</c:v>
                 </c:pt>
                 <c:pt idx="27">
-                  <c:v>1.3510972000000001</c:v>
+                  <c:v>1.3510971999999999</c:v>
                 </c:pt>
                 <c:pt idx="28">
-                  <c:v>1.3950617000000001</c:v>
+                  <c:v>1.3950616999999998</c:v>
                 </c:pt>
                 <c:pt idx="29">
                   <c:v>1.3694445</c:v>
@@ -2355,31 +2358,31 @@
                   <c:v>1.3577024</c:v>
                 </c:pt>
                 <c:pt idx="31">
-                  <c:v>1.4111842000000001</c:v>
+                  <c:v>1.4111841999999997</c:v>
                 </c:pt>
                 <c:pt idx="32">
-                  <c:v>1.3873044999999999</c:v>
+                  <c:v>1.3873044999999997</c:v>
                 </c:pt>
                 <c:pt idx="33">
-                  <c:v>1.4390638</c:v>
+                  <c:v>1.4390637999999998</c:v>
                 </c:pt>
                 <c:pt idx="34">
-                  <c:v>1.4364680000000001</c:v>
+                  <c:v>1.4364679999999999</c:v>
                 </c:pt>
                 <c:pt idx="35">
-                  <c:v>1.4345238</c:v>
+                  <c:v>1.4345237999999998</c:v>
                 </c:pt>
                 <c:pt idx="36">
                   <c:v>1.3801653</c:v>
                 </c:pt>
                 <c:pt idx="37">
-                  <c:v>1.3787558</c:v>
+                  <c:v>1.3787558000000002</c:v>
                 </c:pt>
                 <c:pt idx="38">
                   <c:v>1.4283129999999999</c:v>
                 </c:pt>
                 <c:pt idx="39">
-                  <c:v>1.4081167000000001</c:v>
+                  <c:v>1.4081166999999999</c:v>
                 </c:pt>
                 <c:pt idx="40">
                   <c:v>1.3248629999999999</c:v>
@@ -2388,10 +2391,10 @@
                   <c:v>1.3101487000000001</c:v>
                 </c:pt>
                 <c:pt idx="42">
-                  <c:v>1.2901889</c:v>
+                  <c:v>1.2901889000000002</c:v>
                 </c:pt>
                 <c:pt idx="43">
-                  <c:v>1.2454756</c:v>
+                  <c:v>1.2454755999999998</c:v>
                 </c:pt>
                 <c:pt idx="44">
                   <c:v>1.2770728</c:v>
@@ -2568,13 +2571,13 @@
                 <c:formatCode>General</c:formatCode>
                 <c:ptCount val="45"/>
                 <c:pt idx="12">
-                  <c:v>1.1458333999999999</c:v>
+                  <c:v>1.1458333999999997</c:v>
                 </c:pt>
                 <c:pt idx="13">
                   <c:v>0</c:v>
                 </c:pt>
                 <c:pt idx="14">
-                  <c:v>1.2134830999999999</c:v>
+                  <c:v>1.2134830999999997</c:v>
                 </c:pt>
                 <c:pt idx="15">
                   <c:v>0</c:v>
@@ -2583,37 +2586,37 @@
                   <c:v>1.1157895</c:v>
                 </c:pt>
                 <c:pt idx="17">
-                  <c:v>1.0317460000000001</c:v>
+                  <c:v>1.0317459999999998</c:v>
                 </c:pt>
                 <c:pt idx="18">
-                  <c:v>1.0434783000000001</c:v>
+                  <c:v>1.0434782999999999</c:v>
                 </c:pt>
                 <c:pt idx="19">
-                  <c:v>1.0762712000000001</c:v>
+                  <c:v>1.0762711999999999</c:v>
                 </c:pt>
                 <c:pt idx="20">
-                  <c:v>1.1066666999999999</c:v>
+                  <c:v>1.1066666999999997</c:v>
                 </c:pt>
                 <c:pt idx="21">
-                  <c:v>1.0438144</c:v>
+                  <c:v>1.0438143999999998</c:v>
                 </c:pt>
                 <c:pt idx="22">
                   <c:v>1.0653154</c:v>
                 </c:pt>
                 <c:pt idx="23">
-                  <c:v>1.0594714000000001</c:v>
+                  <c:v>1.0594713999999998</c:v>
                 </c:pt>
                 <c:pt idx="24">
                   <c:v>1.1578170999999999</c:v>
                 </c:pt>
                 <c:pt idx="25">
-                  <c:v>1.0748298999999999</c:v>
+                  <c:v>1.0748298999999997</c:v>
                 </c:pt>
                 <c:pt idx="26">
                   <c:v>1.1320182000000001</c:v>
                 </c:pt>
                 <c:pt idx="27">
-                  <c:v>1.1224105</c:v>
+                  <c:v>1.1224105000000002</c:v>
                 </c:pt>
                 <c:pt idx="28">
                   <c:v>1.1406883000000001</c:v>
@@ -2625,46 +2628,46 @@
                   <c:v>1.1932007</c:v>
                 </c:pt>
                 <c:pt idx="31">
-                  <c:v>1.1880805000000001</c:v>
+                  <c:v>1.1880805000000003</c:v>
                 </c:pt>
                 <c:pt idx="32">
-                  <c:v>1.1863573000000001</c:v>
+                  <c:v>1.1863573000000003</c:v>
                 </c:pt>
                 <c:pt idx="33">
-                  <c:v>1.1770244999999999</c:v>
+                  <c:v>1.1770244999999997</c:v>
                 </c:pt>
                 <c:pt idx="34">
-                  <c:v>1.1512936</c:v>
+                  <c:v>1.1512935999999998</c:v>
                 </c:pt>
                 <c:pt idx="35">
                   <c:v>1.2283169</c:v>
                 </c:pt>
                 <c:pt idx="36">
-                  <c:v>1.2179253999999999</c:v>
+                  <c:v>1.2179253999999995</c:v>
                 </c:pt>
                 <c:pt idx="37">
-                  <c:v>1.2480916</c:v>
+                  <c:v>1.2480915999999997</c:v>
                 </c:pt>
                 <c:pt idx="38">
-                  <c:v>1.1883891</c:v>
+                  <c:v>1.1883891000000002</c:v>
                 </c:pt>
                 <c:pt idx="39">
-                  <c:v>1.2593714</c:v>
+                  <c:v>1.2593713999999998</c:v>
                 </c:pt>
                 <c:pt idx="40">
                   <c:v>1.3066514</c:v>
                 </c:pt>
                 <c:pt idx="41">
-                  <c:v>1.2787234000000001</c:v>
+                  <c:v>1.2787233999999998</c:v>
                 </c:pt>
                 <c:pt idx="42">
-                  <c:v>1.2653856000000001</c:v>
+                  <c:v>1.2653855999999999</c:v>
                 </c:pt>
                 <c:pt idx="43">
-                  <c:v>1.2610710999999999</c:v>
+                  <c:v>1.2610710999999997</c:v>
                 </c:pt>
                 <c:pt idx="44">
-                  <c:v>1.3033140000000001</c:v>
+                  <c:v>1.3033139999999999</c:v>
                 </c:pt>
               </c:numCache>
             </c:numRef>
@@ -2850,7 +2853,7 @@
                   <c:v>1.02</c:v>
                 </c:pt>
                 <c:pt idx="16">
-                  <c:v>1.0249999999999999</c:v>
+                  <c:v>1.0249999999999997</c:v>
                 </c:pt>
                 <c:pt idx="17">
                   <c:v>1</c:v>
@@ -2862,25 +2865,25 @@
                   <c:v>1</c:v>
                 </c:pt>
                 <c:pt idx="20">
-                  <c:v>1.0754716</c:v>
+                  <c:v>1.0754715999999997</c:v>
                 </c:pt>
                 <c:pt idx="21">
                   <c:v>1</c:v>
                 </c:pt>
                 <c:pt idx="22">
-                  <c:v>1.0472972</c:v>
+                  <c:v>1.0472971999999998</c:v>
                 </c:pt>
                 <c:pt idx="23">
                   <c:v>1.0884955999999999</c:v>
                 </c:pt>
                 <c:pt idx="24">
-                  <c:v>1.0552763999999999</c:v>
+                  <c:v>1.0552763999999997</c:v>
                 </c:pt>
                 <c:pt idx="25">
-                  <c:v>1.1560975</c:v>
+                  <c:v>1.1560975000000002</c:v>
                 </c:pt>
                 <c:pt idx="26">
-                  <c:v>1.0979730000000001</c:v>
+                  <c:v>1.0979729999999999</c:v>
                 </c:pt>
                 <c:pt idx="27">
                   <c:v>1.0607735</c:v>
@@ -2892,22 +2895,22 @@
                   <c:v>1.1442623000000001</c:v>
                 </c:pt>
                 <c:pt idx="30">
-                  <c:v>1.1097045999999999</c:v>
+                  <c:v>1.1097045999999997</c:v>
                 </c:pt>
                 <c:pt idx="31">
-                  <c:v>1.1475694000000001</c:v>
+                  <c:v>1.1475693999999999</c:v>
                 </c:pt>
                 <c:pt idx="32">
                   <c:v>1.1167883000000001</c:v>
                 </c:pt>
                 <c:pt idx="33">
-                  <c:v>1.1203539</c:v>
+                  <c:v>1.1203539000000002</c:v>
                 </c:pt>
                 <c:pt idx="34">
-                  <c:v>1.1584158</c:v>
+                  <c:v>1.1584158000000002</c:v>
                 </c:pt>
                 <c:pt idx="35">
-                  <c:v>1.1191336000000001</c:v>
+                  <c:v>1.1191335999999998</c:v>
                 </c:pt>
                 <c:pt idx="36">
                   <c:v>1.1129848</c:v>
@@ -2928,13 +2931,13 @@
                   <c:v>1.1242361999999999</c:v>
                 </c:pt>
                 <c:pt idx="42">
-                  <c:v>1.1536843000000001</c:v>
+                  <c:v>1.1536842999999999</c:v>
                 </c:pt>
                 <c:pt idx="43">
                   <c:v>1.1225681000000001</c:v>
                 </c:pt>
                 <c:pt idx="44">
-                  <c:v>1.1642157</c:v>
+                  <c:v>1.1642157000000002</c:v>
                 </c:pt>
               </c:numCache>
             </c:numRef>
@@ -3108,13 +3111,13 @@
                 <c:formatCode>General</c:formatCode>
                 <c:ptCount val="45"/>
                 <c:pt idx="17">
-                  <c:v>1.0238096000000001</c:v>
+                  <c:v>1.0238095999999997</c:v>
                 </c:pt>
                 <c:pt idx="18">
-                  <c:v>1.0208333999999999</c:v>
+                  <c:v>1.0208333999999997</c:v>
                 </c:pt>
                 <c:pt idx="19">
-                  <c:v>1.0099009999999999</c:v>
+                  <c:v>1.0099009999999997</c:v>
                 </c:pt>
                 <c:pt idx="20">
                   <c:v>1.125</c:v>
@@ -3123,43 +3126,43 @@
                   <c:v>0</c:v>
                 </c:pt>
                 <c:pt idx="22">
-                  <c:v>1.0972222</c:v>
+                  <c:v>1.0972221999999998</c:v>
                 </c:pt>
                 <c:pt idx="23">
-                  <c:v>1.0543479</c:v>
+                  <c:v>1.0543479000000002</c:v>
                 </c:pt>
                 <c:pt idx="24">
-                  <c:v>1.1666666000000001</c:v>
+                  <c:v>1.1666665999999999</c:v>
                 </c:pt>
                 <c:pt idx="25">
                   <c:v>1.0785123999999999</c:v>
                 </c:pt>
                 <c:pt idx="26">
-                  <c:v>1.0608366</c:v>
+                  <c:v>1.0608365999999998</c:v>
                 </c:pt>
                 <c:pt idx="27">
                   <c:v>1.0372671</c:v>
                 </c:pt>
                 <c:pt idx="28">
-                  <c:v>1.1551155</c:v>
+                  <c:v>1.1551155000000002</c:v>
                 </c:pt>
                 <c:pt idx="29">
                   <c:v>1.0712074</c:v>
                 </c:pt>
                 <c:pt idx="30">
-                  <c:v>1.1218486999999999</c:v>
+                  <c:v>1.1218486999999997</c:v>
                 </c:pt>
                 <c:pt idx="31">
                   <c:v>1.1705810000000001</c:v>
                 </c:pt>
                 <c:pt idx="32">
-                  <c:v>1.1654846999999999</c:v>
+                  <c:v>1.1654846999999997</c:v>
                 </c:pt>
                 <c:pt idx="33">
                   <c:v>1.1066822999999999</c:v>
                 </c:pt>
                 <c:pt idx="34">
-                  <c:v>1.1034482999999999</c:v>
+                  <c:v>1.1034482999999997</c:v>
                 </c:pt>
                 <c:pt idx="35">
                   <c:v>1.1030445</c:v>
@@ -3189,18 +3192,18 @@
                   <c:v>1.0980148000000001</c:v>
                 </c:pt>
                 <c:pt idx="44">
-                  <c:v>1.1192367999999999</c:v>
+                  <c:v>1.1192367999999997</c:v>
                 </c:pt>
               </c:numCache>
             </c:numRef>
           </c:val>
         </c:ser>
         <c:marker val="1"/>
-        <c:axId val="85982592"/>
-        <c:axId val="95410048"/>
+        <c:axId val="48780032"/>
+        <c:axId val="48781952"/>
       </c:lineChart>
       <c:catAx>
-        <c:axId val="85982592"/>
+        <c:axId val="48780032"/>
         <c:scaling>
           <c:orientation val="minMax"/>
         </c:scaling>
@@ -3225,14 +3228,14 @@
         </c:title>
         <c:numFmt formatCode="General" sourceLinked="1"/>
         <c:tickLblPos val="nextTo"/>
-        <c:crossAx val="95410048"/>
+        <c:crossAx val="48781952"/>
         <c:crosses val="autoZero"/>
         <c:auto val="1"/>
         <c:lblAlgn val="ctr"/>
         <c:lblOffset val="100"/>
       </c:catAx>
       <c:valAx>
-        <c:axId val="95410048"/>
+        <c:axId val="48781952"/>
         <c:scaling>
           <c:orientation val="minMax"/>
         </c:scaling>
@@ -3258,7 +3261,7 @@
         </c:title>
         <c:numFmt formatCode="General" sourceLinked="1"/>
         <c:tickLblPos val="nextTo"/>
-        <c:crossAx val="85982592"/>
+        <c:crossAx val="48780032"/>
         <c:crosses val="autoZero"/>
         <c:crossBetween val="between"/>
       </c:valAx>
@@ -3275,6 +3278,7 @@
 
 <file path=ppt/charts/chart3.xml><?xml version="1.0" encoding="utf-8"?>
 <c:chartSpace xmlns:c="http://schemas.openxmlformats.org/drawingml/2006/chart" xmlns:a="http://schemas.openxmlformats.org/drawingml/2006/main" xmlns:r="http://schemas.openxmlformats.org/officeDocument/2006/relationships">
+  <c:date1904 val="1"/>
   <c:lang val="en-US"/>
   <c:chart>
     <c:title>
@@ -3483,25 +3487,25 @@
                 <c:formatCode>General</c:formatCode>
                 <c:ptCount val="45"/>
                 <c:pt idx="0">
-                  <c:v>0.17391305000000001</c:v>
+                  <c:v>0.17391305000000004</c:v>
                 </c:pt>
                 <c:pt idx="1">
-                  <c:v>0.54545456000000003</c:v>
+                  <c:v>0.54545455999999992</c:v>
                 </c:pt>
                 <c:pt idx="2">
-                  <c:v>0.29411766</c:v>
+                  <c:v>0.29411766000000006</c:v>
                 </c:pt>
                 <c:pt idx="3">
                   <c:v>1.1363635999999999</c:v>
                 </c:pt>
                 <c:pt idx="4">
-                  <c:v>0.16666666999999999</c:v>
+                  <c:v>0.16666666999999996</c:v>
                 </c:pt>
                 <c:pt idx="5">
-                  <c:v>0.77777779999999996</c:v>
+                  <c:v>0.77777780000000007</c:v>
                 </c:pt>
                 <c:pt idx="6">
-                  <c:v>1.1743119</c:v>
+                  <c:v>1.1743119000000002</c:v>
                 </c:pt>
                 <c:pt idx="7">
                   <c:v>1.3153154</c:v>
@@ -3510,7 +3514,7 @@
                   <c:v>1.4954128</c:v>
                 </c:pt>
                 <c:pt idx="9">
-                  <c:v>1.1908396000000001</c:v>
+                  <c:v>1.1908395999999999</c:v>
                 </c:pt>
                 <c:pt idx="10">
                   <c:v>2.0989399999999998</c:v>
@@ -3519,16 +3523,16 @@
                   <c:v>1.5335121</c:v>
                 </c:pt>
                 <c:pt idx="12">
-                  <c:v>1.0298849999999999</c:v>
+                  <c:v>1.0298849999999997</c:v>
                 </c:pt>
                 <c:pt idx="13">
-                  <c:v>1.6923077</c:v>
+                  <c:v>1.6923077000000002</c:v>
                 </c:pt>
                 <c:pt idx="14">
-                  <c:v>1.7082706999999999</c:v>
+                  <c:v>1.7082706999999997</c:v>
                 </c:pt>
                 <c:pt idx="15">
-                  <c:v>2.9522184999999999</c:v>
+                  <c:v>2.952218499999999</c:v>
                 </c:pt>
                 <c:pt idx="16">
                   <c:v>1.9163635999999999</c:v>
@@ -3537,22 +3541,22 @@
                   <c:v>2.1970022</c:v>
                 </c:pt>
                 <c:pt idx="18">
-                  <c:v>1.7837837999999999</c:v>
+                  <c:v>1.7837837999999997</c:v>
                 </c:pt>
                 <c:pt idx="19">
-                  <c:v>2.0865307</c:v>
+                  <c:v>2.0865307000000004</c:v>
                 </c:pt>
                 <c:pt idx="20">
-                  <c:v>1.9779660999999999</c:v>
+                  <c:v>1.9779660999999997</c:v>
                 </c:pt>
                 <c:pt idx="21">
                   <c:v>1.9395726</c:v>
                 </c:pt>
                 <c:pt idx="22">
-                  <c:v>1.6845508</c:v>
+                  <c:v>1.6845508000000002</c:v>
                 </c:pt>
                 <c:pt idx="23">
-                  <c:v>1.8872093000000001</c:v>
+                  <c:v>1.8872092999999999</c:v>
                 </c:pt>
                 <c:pt idx="24">
                   <c:v>1.9656085000000001</c:v>
@@ -3567,7 +3571,7 @@
                   <c:v>2.3622112</c:v>
                 </c:pt>
                 <c:pt idx="28">
-                  <c:v>2.4158108</c:v>
+                  <c:v>2.4158107999999996</c:v>
                 </c:pt>
                 <c:pt idx="29">
                   <c:v>2.4032353999999998</c:v>
@@ -3576,34 +3580,34 @@
                   <c:v>2.4905219999999999</c:v>
                 </c:pt>
                 <c:pt idx="31">
-                  <c:v>2.4018766999999999</c:v>
+                  <c:v>2.4018766999999994</c:v>
                 </c:pt>
                 <c:pt idx="32">
                   <c:v>2.463244</c:v>
                 </c:pt>
                 <c:pt idx="33">
-                  <c:v>2.5999660000000002</c:v>
+                  <c:v>2.5999659999999998</c:v>
                 </c:pt>
                 <c:pt idx="34">
-                  <c:v>2.6943429999999999</c:v>
+                  <c:v>2.6943429999999995</c:v>
                 </c:pt>
                 <c:pt idx="35">
-                  <c:v>2.7635770000000002</c:v>
+                  <c:v>2.7635770000000006</c:v>
                 </c:pt>
                 <c:pt idx="36">
-                  <c:v>2.8496174999999999</c:v>
+                  <c:v>2.8496174999999995</c:v>
                 </c:pt>
                 <c:pt idx="37">
                   <c:v>2.6204448</c:v>
                 </c:pt>
                 <c:pt idx="38">
-                  <c:v>2.8344011</c:v>
+                  <c:v>2.8344010999999996</c:v>
                 </c:pt>
                 <c:pt idx="39">
-                  <c:v>2.8538169999999998</c:v>
+                  <c:v>2.8538169999999994</c:v>
                 </c:pt>
                 <c:pt idx="40">
-                  <c:v>2.9095659999999999</c:v>
+                  <c:v>2.9095659999999994</c:v>
                 </c:pt>
                 <c:pt idx="41">
                   <c:v>3.0385646999999998</c:v>
@@ -3789,31 +3793,31 @@
                 <c:formatCode>General</c:formatCode>
                 <c:ptCount val="45"/>
                 <c:pt idx="0">
-                  <c:v>0.17391305000000001</c:v>
+                  <c:v>0.17391305000000004</c:v>
                 </c:pt>
                 <c:pt idx="1">
-                  <c:v>0.54545456000000003</c:v>
+                  <c:v>0.54545455999999992</c:v>
                 </c:pt>
                 <c:pt idx="2">
-                  <c:v>0.29411766</c:v>
+                  <c:v>0.29411766000000006</c:v>
                 </c:pt>
                 <c:pt idx="3">
                   <c:v>1.1363635999999999</c:v>
                 </c:pt>
                 <c:pt idx="4">
-                  <c:v>0.16666666999999999</c:v>
+                  <c:v>0.16666666999999996</c:v>
                 </c:pt>
                 <c:pt idx="5">
-                  <c:v>0.72499999999999998</c:v>
+                  <c:v>0.72500000000000009</c:v>
                 </c:pt>
                 <c:pt idx="6">
-                  <c:v>1.2717949</c:v>
+                  <c:v>1.2717948999999997</c:v>
                 </c:pt>
                 <c:pt idx="7">
                   <c:v>0.86956520000000004</c:v>
                 </c:pt>
                 <c:pt idx="8">
-                  <c:v>1.5416666000000001</c:v>
+                  <c:v>1.5416665999999997</c:v>
                 </c:pt>
                 <c:pt idx="9">
                   <c:v>1.2340424999999999</c:v>
@@ -3828,22 +3832,22 @@
                   <c:v>0.93922649999999996</c:v>
                 </c:pt>
                 <c:pt idx="13">
-                  <c:v>1.4191176999999999</c:v>
+                  <c:v>1.4191176999999997</c:v>
                 </c:pt>
                 <c:pt idx="14">
                   <c:v>1.6385542</c:v>
                 </c:pt>
                 <c:pt idx="15">
-                  <c:v>2.192825</c:v>
+                  <c:v>2.1928249999999996</c:v>
                 </c:pt>
                 <c:pt idx="16">
                   <c:v>1.4061135</c:v>
                 </c:pt>
                 <c:pt idx="17">
-                  <c:v>2.2885770000000001</c:v>
+                  <c:v>2.2885770000000005</c:v>
                 </c:pt>
                 <c:pt idx="18">
-                  <c:v>1.5838383</c:v>
+                  <c:v>1.5838382999999998</c:v>
                 </c:pt>
                 <c:pt idx="19">
                   <c:v>1.9582542000000001</c:v>
@@ -3855,43 +3859,43 @@
                   <c:v>1.8761061000000001</c:v>
                 </c:pt>
                 <c:pt idx="22">
-                  <c:v>1.7542663000000001</c:v>
+                  <c:v>1.7542662999999998</c:v>
                 </c:pt>
                 <c:pt idx="23">
-                  <c:v>1.7545606</c:v>
+                  <c:v>1.7545605999999998</c:v>
                 </c:pt>
                 <c:pt idx="24">
-                  <c:v>2.2081217999999998</c:v>
+                  <c:v>2.2081218000000007</c:v>
                 </c:pt>
                 <c:pt idx="25">
                   <c:v>3.2745593</c:v>
                 </c:pt>
                 <c:pt idx="26">
-                  <c:v>2.43289</c:v>
+                  <c:v>2.4328899999999996</c:v>
                 </c:pt>
                 <c:pt idx="27">
                   <c:v>2.9071924999999998</c:v>
                 </c:pt>
                 <c:pt idx="28">
-                  <c:v>3.2920353000000002</c:v>
+                  <c:v>3.2920352999999998</c:v>
                 </c:pt>
                 <c:pt idx="29">
                   <c:v>3.0385396</c:v>
                 </c:pt>
                 <c:pt idx="30">
-                  <c:v>3.4365385000000002</c:v>
+                  <c:v>3.4365384999999997</c:v>
                 </c:pt>
                 <c:pt idx="31">
                   <c:v>3.006993</c:v>
                 </c:pt>
                 <c:pt idx="32">
-                  <c:v>3.0331564000000002</c:v>
+                  <c:v>3.0331563999999998</c:v>
                 </c:pt>
                 <c:pt idx="33">
                   <c:v>3.2540662</c:v>
                 </c:pt>
                 <c:pt idx="34">
-                  <c:v>3.2573713999999998</c:v>
+                  <c:v>3.2573714000000002</c:v>
                 </c:pt>
                 <c:pt idx="35">
                   <c:v>3.1304748</c:v>
@@ -3900,7 +3904,7 @@
                   <c:v>3.3807678000000001</c:v>
                 </c:pt>
                 <c:pt idx="37">
-                  <c:v>2.8305709999999999</c:v>
+                  <c:v>2.8305709999999995</c:v>
                 </c:pt>
                 <c:pt idx="38">
                   <c:v>3.0557314999999998</c:v>
@@ -3912,10 +3916,10 @@
                   <c:v>3.2824369999999998</c:v>
                 </c:pt>
                 <c:pt idx="41">
-                  <c:v>3.3916528000000001</c:v>
+                  <c:v>3.3916527999999992</c:v>
                 </c:pt>
                 <c:pt idx="42">
-                  <c:v>3.4116387000000001</c:v>
+                  <c:v>3.4116386999999997</c:v>
                 </c:pt>
                 <c:pt idx="43">
                   <c:v>3.6609538000000001</c:v>
@@ -4101,7 +4105,7 @@
                   <c:v>0</c:v>
                 </c:pt>
                 <c:pt idx="14">
-                  <c:v>2.0185184</c:v>
+                  <c:v>2.0185183999999996</c:v>
                 </c:pt>
                 <c:pt idx="15">
                   <c:v>0</c:v>
@@ -4110,43 +4114,43 @@
                   <c:v>1.6792452</c:v>
                 </c:pt>
                 <c:pt idx="17">
-                  <c:v>2.8307693</c:v>
+                  <c:v>2.8307692999999996</c:v>
                 </c:pt>
                 <c:pt idx="18">
-                  <c:v>0.16666666999999999</c:v>
+                  <c:v>0.16666666999999996</c:v>
                 </c:pt>
                 <c:pt idx="19">
-                  <c:v>1.9842519999999999</c:v>
+                  <c:v>1.9842520000000001</c:v>
                 </c:pt>
                 <c:pt idx="20">
                   <c:v>2.1144577999999998</c:v>
                 </c:pt>
                 <c:pt idx="21">
-                  <c:v>1.6296295999999999</c:v>
+                  <c:v>1.6296295999999997</c:v>
                 </c:pt>
                 <c:pt idx="22">
                   <c:v>1.7885835000000001</c:v>
                 </c:pt>
                 <c:pt idx="23">
-                  <c:v>1.7297298000000001</c:v>
+                  <c:v>1.7297297999999997</c:v>
                 </c:pt>
                 <c:pt idx="24">
                   <c:v>1.9057325000000001</c:v>
                 </c:pt>
                 <c:pt idx="25">
-                  <c:v>2.3955696</c:v>
+                  <c:v>2.3955695999999995</c:v>
                 </c:pt>
                 <c:pt idx="26">
-                  <c:v>2.1179624000000001</c:v>
+                  <c:v>2.1179623999999997</c:v>
                 </c:pt>
                 <c:pt idx="27">
-                  <c:v>2.1308725000000002</c:v>
+                  <c:v>2.1308724999999997</c:v>
                 </c:pt>
                 <c:pt idx="28">
-                  <c:v>2.094055</c:v>
+                  <c:v>2.0940549999999996</c:v>
                 </c:pt>
                 <c:pt idx="29">
-                  <c:v>2.007533</c:v>
+                  <c:v>2.0075330000000005</c:v>
                 </c:pt>
                 <c:pt idx="30">
                   <c:v>2.1250868000000001</c:v>
@@ -4155,7 +4159,7 @@
                   <c:v>2.2644951</c:v>
                 </c:pt>
                 <c:pt idx="32">
-                  <c:v>2.2133965</c:v>
+                  <c:v>2.2133965000000004</c:v>
                 </c:pt>
                 <c:pt idx="33">
                   <c:v>2.4949333999999999</c:v>
@@ -4164,34 +4168,34 @@
                   <c:v>2.6888130000000001</c:v>
                 </c:pt>
                 <c:pt idx="35">
-                  <c:v>2.7335877000000002</c:v>
+                  <c:v>2.7335877000000006</c:v>
                 </c:pt>
                 <c:pt idx="36">
-                  <c:v>2.5760179000000001</c:v>
+                  <c:v>2.5760178999999996</c:v>
                 </c:pt>
                 <c:pt idx="37">
-                  <c:v>2.6123853000000001</c:v>
+                  <c:v>2.6123852999999997</c:v>
                 </c:pt>
                 <c:pt idx="38">
-                  <c:v>2.5719829999999999</c:v>
+                  <c:v>2.5719829999999995</c:v>
                 </c:pt>
                 <c:pt idx="39">
-                  <c:v>2.5315694999999998</c:v>
+                  <c:v>2.5315694999999994</c:v>
                 </c:pt>
                 <c:pt idx="40">
                   <c:v>2.888938</c:v>
                 </c:pt>
                 <c:pt idx="41">
-                  <c:v>2.9545994000000002</c:v>
+                  <c:v>2.9545993999999998</c:v>
                 </c:pt>
                 <c:pt idx="42">
-                  <c:v>2.8023766999999999</c:v>
+                  <c:v>2.8023766999999995</c:v>
                 </c:pt>
                 <c:pt idx="43">
                   <c:v>2.9869335000000001</c:v>
                 </c:pt>
                 <c:pt idx="44">
-                  <c:v>3.1696430000000002</c:v>
+                  <c:v>3.1696429999999998</c:v>
                 </c:pt>
               </c:numCache>
             </c:numRef>
@@ -4368,19 +4372,19 @@
                   <c:v>1.3</c:v>
                 </c:pt>
                 <c:pt idx="13">
-                  <c:v>2.2941177000000001</c:v>
+                  <c:v>2.2941177000000006</c:v>
                 </c:pt>
                 <c:pt idx="14">
                   <c:v>0</c:v>
                 </c:pt>
                 <c:pt idx="15">
-                  <c:v>10.862745</c:v>
+                  <c:v>10.862745000000002</c:v>
                 </c:pt>
                 <c:pt idx="16">
-                  <c:v>6.9756099999999996</c:v>
+                  <c:v>6.9756100000000005</c:v>
                 </c:pt>
                 <c:pt idx="17">
-                  <c:v>1.9</c:v>
+                  <c:v>1.9000000000000001</c:v>
                 </c:pt>
                 <c:pt idx="18">
                   <c:v>0</c:v>
@@ -4392,19 +4396,19 @@
                   <c:v>2</c:v>
                 </c:pt>
                 <c:pt idx="21">
-                  <c:v>1.548387</c:v>
+                  <c:v>1.5483870000000002</c:v>
                 </c:pt>
                 <c:pt idx="22">
                   <c:v>1.8580645</c:v>
                 </c:pt>
                 <c:pt idx="23">
-                  <c:v>1.9674796999999999</c:v>
+                  <c:v>1.9674796999999997</c:v>
                 </c:pt>
                 <c:pt idx="24">
                   <c:v>2.2571428</c:v>
                 </c:pt>
                 <c:pt idx="25">
-                  <c:v>1.5021096</c:v>
+                  <c:v>1.5021095999999998</c:v>
                 </c:pt>
                 <c:pt idx="26">
                   <c:v>2.7076924</c:v>
@@ -4413,34 +4417,34 @@
                   <c:v>2.1458333000000001</c:v>
                 </c:pt>
                 <c:pt idx="28">
-                  <c:v>1.9771428</c:v>
+                  <c:v>1.9771428000000002</c:v>
                 </c:pt>
                 <c:pt idx="29">
-                  <c:v>2.1318052000000001</c:v>
+                  <c:v>2.1318051999999996</c:v>
                 </c:pt>
                 <c:pt idx="30">
                   <c:v>2.0038022999999998</c:v>
                 </c:pt>
                 <c:pt idx="31">
-                  <c:v>2.3721633</c:v>
+                  <c:v>2.3721632999999995</c:v>
                 </c:pt>
                 <c:pt idx="32">
                   <c:v>2.1176472</c:v>
                 </c:pt>
                 <c:pt idx="33">
-                  <c:v>2.1516587999999999</c:v>
+                  <c:v>2.1516587999999994</c:v>
                 </c:pt>
                 <c:pt idx="34">
-                  <c:v>2.0410256000000002</c:v>
+                  <c:v>2.0410255999999998</c:v>
                 </c:pt>
                 <c:pt idx="35">
                   <c:v>2.1451614000000001</c:v>
                 </c:pt>
                 <c:pt idx="36">
-                  <c:v>2.3060605999999999</c:v>
+                  <c:v>2.3060605999999995</c:v>
                 </c:pt>
                 <c:pt idx="37">
-                  <c:v>2.2163590000000002</c:v>
+                  <c:v>2.2163589999999997</c:v>
                 </c:pt>
                 <c:pt idx="38">
                   <c:v>2.2852350000000001</c:v>
@@ -4455,10 +4459,10 @@
                   <c:v>2.3913042999999998</c:v>
                 </c:pt>
                 <c:pt idx="42">
-                  <c:v>2.4927008000000002</c:v>
+                  <c:v>2.4927007999999997</c:v>
                 </c:pt>
                 <c:pt idx="43">
-                  <c:v>2.4263431999999998</c:v>
+                  <c:v>2.4263431999999994</c:v>
                 </c:pt>
                 <c:pt idx="44">
                   <c:v>2.9642105000000001</c:v>
@@ -4635,10 +4639,10 @@
                 <c:formatCode>General</c:formatCode>
                 <c:ptCount val="45"/>
                 <c:pt idx="17">
-                  <c:v>2.4186046000000001</c:v>
+                  <c:v>2.4186045999999997</c:v>
                 </c:pt>
                 <c:pt idx="18">
-                  <c:v>1.2653061000000001</c:v>
+                  <c:v>1.2653060999999999</c:v>
                 </c:pt>
                 <c:pt idx="19">
                   <c:v>3.5882353999999999</c:v>
@@ -4653,13 +4657,13 @@
                   <c:v>1.1392405000000001</c:v>
                 </c:pt>
                 <c:pt idx="23">
-                  <c:v>1.6597938999999999</c:v>
+                  <c:v>1.6597938999999997</c:v>
                 </c:pt>
                 <c:pt idx="24">
-                  <c:v>2.2142856000000002</c:v>
+                  <c:v>2.2142855999999997</c:v>
                 </c:pt>
                 <c:pt idx="25">
-                  <c:v>1.4942529</c:v>
+                  <c:v>1.4942529000000002</c:v>
                 </c:pt>
                 <c:pt idx="26">
                   <c:v>1.9354838000000001</c:v>
@@ -4671,10 +4675,10 @@
                   <c:v>1.8742856999999999</c:v>
                 </c:pt>
                 <c:pt idx="29">
-                  <c:v>2.0635838999999998</c:v>
+                  <c:v>2.0635839000000002</c:v>
                 </c:pt>
                 <c:pt idx="30">
-                  <c:v>2.2696629000000001</c:v>
+                  <c:v>2.2696628999999997</c:v>
                 </c:pt>
                 <c:pt idx="31">
                   <c:v>1.8986273</c:v>
@@ -4689,31 +4693,31 @@
                   <c:v>2.2455356000000002</c:v>
                 </c:pt>
                 <c:pt idx="35">
-                  <c:v>2.3248408</c:v>
+                  <c:v>2.3248407999999996</c:v>
                 </c:pt>
                 <c:pt idx="36">
-                  <c:v>2.3941069000000001</c:v>
+                  <c:v>2.3941068999999997</c:v>
                 </c:pt>
                 <c:pt idx="37">
-                  <c:v>2.4412664999999998</c:v>
+                  <c:v>2.4412664999999993</c:v>
                 </c:pt>
                 <c:pt idx="38">
-                  <c:v>2.3614090000000001</c:v>
+                  <c:v>2.3614089999999996</c:v>
                 </c:pt>
                 <c:pt idx="39">
-                  <c:v>2.3622048000000002</c:v>
+                  <c:v>2.3622047999999998</c:v>
                 </c:pt>
                 <c:pt idx="40">
-                  <c:v>2.7175370000000001</c:v>
+                  <c:v>2.7175370000000005</c:v>
                 </c:pt>
                 <c:pt idx="41">
                   <c:v>2.1294363000000001</c:v>
                 </c:pt>
                 <c:pt idx="42">
-                  <c:v>2.8550932000000002</c:v>
+                  <c:v>2.8550931999999998</c:v>
                 </c:pt>
                 <c:pt idx="43">
-                  <c:v>2.5514123</c:v>
+                  <c:v>2.5514122999999995</c:v>
                 </c:pt>
                 <c:pt idx="44">
                   <c:v>2.4375</c:v>
@@ -4723,11 +4727,11 @@
           </c:val>
         </c:ser>
         <c:marker val="1"/>
-        <c:axId val="95339648"/>
-        <c:axId val="95341952"/>
+        <c:axId val="48961792"/>
+        <c:axId val="48972160"/>
       </c:lineChart>
       <c:catAx>
-        <c:axId val="95339648"/>
+        <c:axId val="48961792"/>
         <c:scaling>
           <c:orientation val="minMax"/>
         </c:scaling>
@@ -4752,14 +4756,14 @@
         </c:title>
         <c:numFmt formatCode="General" sourceLinked="1"/>
         <c:tickLblPos val="nextTo"/>
-        <c:crossAx val="95341952"/>
+        <c:crossAx val="48972160"/>
         <c:crosses val="autoZero"/>
         <c:auto val="1"/>
         <c:lblAlgn val="ctr"/>
         <c:lblOffset val="100"/>
       </c:catAx>
       <c:valAx>
-        <c:axId val="95341952"/>
+        <c:axId val="48972160"/>
         <c:scaling>
           <c:orientation val="minMax"/>
         </c:scaling>
@@ -4785,7 +4789,7 @@
         </c:title>
         <c:numFmt formatCode="General" sourceLinked="1"/>
         <c:tickLblPos val="nextTo"/>
-        <c:crossAx val="95339648"/>
+        <c:crossAx val="48961792"/>
         <c:crosses val="autoZero"/>
         <c:crossBetween val="between"/>
       </c:valAx>
@@ -4802,6 +4806,7 @@
 
 <file path=ppt/charts/chart4.xml><?xml version="1.0" encoding="utf-8"?>
 <c:chartSpace xmlns:c="http://schemas.openxmlformats.org/drawingml/2006/chart" xmlns:a="http://schemas.openxmlformats.org/drawingml/2006/main" xmlns:r="http://schemas.openxmlformats.org/officeDocument/2006/relationships">
+  <c:date1904 val="1"/>
   <c:lang val="en-US"/>
   <c:chart>
     <c:title>
@@ -5013,13 +5018,13 @@
                   <c:v>0.90476190000000001</c:v>
                 </c:pt>
                 <c:pt idx="1">
-                  <c:v>0.72</c:v>
+                  <c:v>0.72000000000000008</c:v>
                 </c:pt>
                 <c:pt idx="2">
-                  <c:v>0.82758622999999998</c:v>
+                  <c:v>0.82758622999999987</c:v>
                 </c:pt>
                 <c:pt idx="3">
-                  <c:v>0.59259260000000002</c:v>
+                  <c:v>0.59259259999999991</c:v>
                 </c:pt>
                 <c:pt idx="4">
                   <c:v>0.90909094000000001</c:v>
@@ -5031,31 +5036,31 @@
                   <c:v>0.5496183</c:v>
                 </c:pt>
                 <c:pt idx="7">
-                  <c:v>0.46774194000000002</c:v>
+                  <c:v>0.46774193999999997</c:v>
                 </c:pt>
                 <c:pt idx="8">
                   <c:v>0.48760330000000002</c:v>
                 </c:pt>
                 <c:pt idx="9">
-                  <c:v>0.59627330000000001</c:v>
+                  <c:v>0.5962732999999999</c:v>
                 </c:pt>
                 <c:pt idx="10">
-                  <c:v>0.46308726</c:v>
+                  <c:v>0.46308726000000006</c:v>
                 </c:pt>
                 <c:pt idx="11">
                   <c:v>0.57603689999999996</c:v>
                 </c:pt>
                 <c:pt idx="12">
-                  <c:v>0.54307114999999995</c:v>
+                  <c:v>0.54307114999999984</c:v>
                 </c:pt>
                 <c:pt idx="13">
-                  <c:v>0.49450549999999999</c:v>
+                  <c:v>0.4945055000000001</c:v>
                 </c:pt>
                 <c:pt idx="14">
                   <c:v>0.43323442000000001</c:v>
                 </c:pt>
                 <c:pt idx="15">
-                  <c:v>0.39852399999999999</c:v>
+                  <c:v>0.39852400000000016</c:v>
                 </c:pt>
                 <c:pt idx="16">
                   <c:v>0.4014337</c:v>
@@ -5064,22 +5069,22 @@
                   <c:v>0.40178570000000002</c:v>
                 </c:pt>
                 <c:pt idx="18">
-                  <c:v>0.35071089999999999</c:v>
+                  <c:v>0.3507109000000001</c:v>
                 </c:pt>
                 <c:pt idx="19">
-                  <c:v>0.29945551999999998</c:v>
+                  <c:v>0.29945552000000003</c:v>
                 </c:pt>
                 <c:pt idx="20">
-                  <c:v>0.33211678</c:v>
+                  <c:v>0.33211678000000011</c:v>
                 </c:pt>
                 <c:pt idx="21">
-                  <c:v>0.29508197000000003</c:v>
+                  <c:v>0.29508197000000014</c:v>
                 </c:pt>
                 <c:pt idx="22">
-                  <c:v>0.29542302999999998</c:v>
+                  <c:v>0.29542303000000003</c:v>
                 </c:pt>
                 <c:pt idx="23">
-                  <c:v>0.32115867999999997</c:v>
+                  <c:v>0.32115868000000009</c:v>
                 </c:pt>
                 <c:pt idx="24">
                   <c:v>0.27709612</c:v>
@@ -5091,58 +5096,58 @@
                   <c:v>0.21908126999999999</c:v>
                 </c:pt>
                 <c:pt idx="27">
-                  <c:v>0.24220374</c:v>
+                  <c:v>0.24220374000000003</c:v>
                 </c:pt>
                 <c:pt idx="28">
-                  <c:v>0.19274193000000001</c:v>
+                  <c:v>0.19274193000000003</c:v>
                 </c:pt>
                 <c:pt idx="29">
-                  <c:v>0.17367170000000001</c:v>
+                  <c:v>0.17367169999999998</c:v>
                 </c:pt>
                 <c:pt idx="30">
-                  <c:v>0.1802974</c:v>
+                  <c:v>0.18029740000000005</c:v>
                 </c:pt>
                 <c:pt idx="31">
                   <c:v>0.1883746</c:v>
                 </c:pt>
                 <c:pt idx="32">
-                  <c:v>0.16648993000000001</c:v>
+                  <c:v>0.16648993000000004</c:v>
                 </c:pt>
                 <c:pt idx="33">
                   <c:v>0.15242164999999999</c:v>
                 </c:pt>
                 <c:pt idx="34">
-                  <c:v>0.15173596</c:v>
+                  <c:v>0.15173596000000003</c:v>
                 </c:pt>
                 <c:pt idx="35">
-                  <c:v>0.1095008</c:v>
+                  <c:v>0.10950080000000001</c:v>
                 </c:pt>
                 <c:pt idx="36">
-                  <c:v>0.10484178</c:v>
+                  <c:v>0.10484178000000001</c:v>
                 </c:pt>
                 <c:pt idx="37">
-                  <c:v>9.1723399999999997E-2</c:v>
+                  <c:v>9.1723400000000024E-2</c:v>
                 </c:pt>
                 <c:pt idx="38">
-                  <c:v>8.5435583999999995E-2</c:v>
+                  <c:v>8.5435584000000009E-2</c:v>
                 </c:pt>
                 <c:pt idx="39">
                   <c:v>0.103067905</c:v>
                 </c:pt>
                 <c:pt idx="40">
-                  <c:v>9.3842514000000002E-2</c:v>
+                  <c:v>9.3842513999999988E-2</c:v>
                 </c:pt>
                 <c:pt idx="41">
-                  <c:v>9.5622899999999997E-2</c:v>
+                  <c:v>9.5622900000000038E-2</c:v>
                 </c:pt>
                 <c:pt idx="42">
-                  <c:v>9.1988130000000001E-2</c:v>
+                  <c:v>9.1988129999999987E-2</c:v>
                 </c:pt>
                 <c:pt idx="43">
-                  <c:v>7.9018260000000007E-2</c:v>
+                  <c:v>7.9018260000000021E-2</c:v>
                 </c:pt>
                 <c:pt idx="44">
-                  <c:v>8.2352939999999999E-2</c:v>
+                  <c:v>8.2352940000000027E-2</c:v>
                 </c:pt>
               </c:numCache>
             </c:numRef>
@@ -5319,25 +5324,25 @@
                   <c:v>0.90476190000000001</c:v>
                 </c:pt>
                 <c:pt idx="1">
-                  <c:v>0.72</c:v>
+                  <c:v>0.72000000000000008</c:v>
                 </c:pt>
                 <c:pt idx="2">
-                  <c:v>0.82758622999999998</c:v>
+                  <c:v>0.82758622999999987</c:v>
                 </c:pt>
                 <c:pt idx="3">
-                  <c:v>0.59259260000000002</c:v>
+                  <c:v>0.59259259999999991</c:v>
                 </c:pt>
                 <c:pt idx="4">
                   <c:v>0.90909094000000001</c:v>
                 </c:pt>
                 <c:pt idx="5">
-                  <c:v>0.6181818</c:v>
+                  <c:v>0.61818180000000011</c:v>
                 </c:pt>
                 <c:pt idx="6">
-                  <c:v>0.48648649999999999</c:v>
+                  <c:v>0.48648650000000015</c:v>
                 </c:pt>
                 <c:pt idx="7">
-                  <c:v>0.48837209999999998</c:v>
+                  <c:v>0.48837210000000009</c:v>
                 </c:pt>
                 <c:pt idx="8">
                   <c:v>0.48113210000000001</c:v>
@@ -5352,31 +5357,31 @@
                   <c:v>0.57046980000000003</c:v>
                 </c:pt>
                 <c:pt idx="12">
-                  <c:v>0.63865550000000004</c:v>
+                  <c:v>0.63865550000000015</c:v>
                 </c:pt>
                 <c:pt idx="13">
                   <c:v>0.44966444</c:v>
                 </c:pt>
                 <c:pt idx="14">
-                  <c:v>0.43195265999999999</c:v>
+                  <c:v>0.4319526600000001</c:v>
                 </c:pt>
                 <c:pt idx="15">
-                  <c:v>0.37962963999999999</c:v>
+                  <c:v>0.3796296400000001</c:v>
                 </c:pt>
                 <c:pt idx="16">
-                  <c:v>0.28947368000000001</c:v>
+                  <c:v>0.28947368000000007</c:v>
                 </c:pt>
                 <c:pt idx="17">
-                  <c:v>0.31838566000000001</c:v>
+                  <c:v>0.31838566000000013</c:v>
                 </c:pt>
                 <c:pt idx="18">
-                  <c:v>0.33744857</c:v>
+                  <c:v>0.33744857000000011</c:v>
                 </c:pt>
                 <c:pt idx="19">
-                  <c:v>0.29387753999999999</c:v>
+                  <c:v>0.2938775400000001</c:v>
                 </c:pt>
                 <c:pt idx="20">
-                  <c:v>0.37354084999999998</c:v>
+                  <c:v>0.37354085000000004</c:v>
                 </c:pt>
                 <c:pt idx="21">
                   <c:v>0.26104417000000002</c:v>
@@ -5394,28 +5399,28 @@
                   <c:v>0.23129252</c:v>
                 </c:pt>
                 <c:pt idx="26">
-                  <c:v>0.22291021</c:v>
+                  <c:v>0.22291021000000003</c:v>
                 </c:pt>
                 <c:pt idx="27">
                   <c:v>0.24437300000000001</c:v>
                 </c:pt>
                 <c:pt idx="28">
-                  <c:v>0.11784512</c:v>
+                  <c:v>0.11784512000000001</c:v>
                 </c:pt>
                 <c:pt idx="29">
-                  <c:v>0.21159421</c:v>
+                  <c:v>0.21159421000000003</c:v>
                 </c:pt>
                 <c:pt idx="30">
-                  <c:v>0.19943820000000001</c:v>
+                  <c:v>0.19943820000000004</c:v>
                 </c:pt>
                 <c:pt idx="31">
                   <c:v>0.18013857</c:v>
                 </c:pt>
                 <c:pt idx="32">
-                  <c:v>0.18091450000000001</c:v>
+                  <c:v>0.18091450000000003</c:v>
                 </c:pt>
                 <c:pt idx="33">
-                  <c:v>0.19275123</c:v>
+                  <c:v>0.19275123000000002</c:v>
                 </c:pt>
                 <c:pt idx="34">
                   <c:v>0.17530487</c:v>
@@ -5424,31 +5429,31 @@
                   <c:v>0.12063952999999999</c:v>
                 </c:pt>
                 <c:pt idx="36">
-                  <c:v>8.4023669999999995E-2</c:v>
+                  <c:v>8.4023670000000023E-2</c:v>
                 </c:pt>
                 <c:pt idx="37">
                   <c:v>6.9101679999999999E-2</c:v>
                 </c:pt>
                 <c:pt idx="38">
-                  <c:v>5.9322033000000003E-2</c:v>
+                  <c:v>5.9322033000000017E-2</c:v>
                 </c:pt>
                 <c:pt idx="39">
-                  <c:v>8.8552914999999996E-2</c:v>
+                  <c:v>8.8552915000000024E-2</c:v>
                 </c:pt>
                 <c:pt idx="40">
-                  <c:v>8.4398979999999998E-2</c:v>
+                  <c:v>8.4398980000000026E-2</c:v>
                 </c:pt>
                 <c:pt idx="41">
-                  <c:v>7.6833524E-2</c:v>
+                  <c:v>7.6833524000000014E-2</c:v>
                 </c:pt>
                 <c:pt idx="42">
-                  <c:v>5.9113300000000001E-2</c:v>
+                  <c:v>5.9113300000000008E-2</c:v>
                 </c:pt>
                 <c:pt idx="43">
-                  <c:v>7.9118030000000006E-2</c:v>
+                  <c:v>7.911803000000002E-2</c:v>
                 </c:pt>
                 <c:pt idx="44">
-                  <c:v>8.7008340000000003E-2</c:v>
+                  <c:v>8.7008340000000017E-2</c:v>
                 </c:pt>
               </c:numCache>
             </c:numRef>
@@ -5622,19 +5627,19 @@
                 <c:formatCode>General</c:formatCode>
                 <c:ptCount val="45"/>
                 <c:pt idx="12">
-                  <c:v>0.52238804000000005</c:v>
+                  <c:v>0.52238803999999994</c:v>
                 </c:pt>
                 <c:pt idx="13">
                   <c:v>0</c:v>
                 </c:pt>
                 <c:pt idx="14">
-                  <c:v>0.48214287</c:v>
+                  <c:v>0.48214287000000006</c:v>
                 </c:pt>
                 <c:pt idx="15">
                   <c:v>0</c:v>
                 </c:pt>
                 <c:pt idx="16">
-                  <c:v>0.41818179999999999</c:v>
+                  <c:v>0.4181818000000001</c:v>
                 </c:pt>
                 <c:pt idx="17">
                   <c:v>0.52173910000000001</c:v>
@@ -5646,22 +5651,22 @@
                   <c:v>0.2982456</c:v>
                 </c:pt>
                 <c:pt idx="20">
-                  <c:v>0.31034482000000002</c:v>
+                  <c:v>0.31034482000000008</c:v>
                 </c:pt>
                 <c:pt idx="21">
-                  <c:v>0.31282051999999999</c:v>
+                  <c:v>0.31282052000000016</c:v>
                 </c:pt>
                 <c:pt idx="22">
                   <c:v>0.27014217000000001</c:v>
                 </c:pt>
                 <c:pt idx="23">
-                  <c:v>0.26146789999999998</c:v>
+                  <c:v>0.26146790000000003</c:v>
                 </c:pt>
                 <c:pt idx="24">
-                  <c:v>0.21276596</c:v>
+                  <c:v>0.21276596000000003</c:v>
                 </c:pt>
                 <c:pt idx="25">
-                  <c:v>0.18431373000000001</c:v>
+                  <c:v>0.18431373000000004</c:v>
                 </c:pt>
                 <c:pt idx="26">
                   <c:v>0.17567568</c:v>
@@ -5670,34 +5675,34 @@
                   <c:v>0.17826085999999999</c:v>
                 </c:pt>
                 <c:pt idx="28">
-                  <c:v>0.22004356999999999</c:v>
+                  <c:v>0.22004356999999997</c:v>
                 </c:pt>
                 <c:pt idx="29">
-                  <c:v>0.15914490000000001</c:v>
+                  <c:v>0.15914490000000003</c:v>
                 </c:pt>
                 <c:pt idx="30">
-                  <c:v>0.17406749999999999</c:v>
+                  <c:v>0.17406750000000001</c:v>
                 </c:pt>
                 <c:pt idx="31">
-                  <c:v>0.18398637000000001</c:v>
+                  <c:v>0.18398637000000004</c:v>
                 </c:pt>
                 <c:pt idx="32">
                   <c:v>0.13333333999999999</c:v>
                 </c:pt>
                 <c:pt idx="33">
-                  <c:v>0.123664126</c:v>
+                  <c:v>0.12366412600000003</c:v>
                 </c:pt>
                 <c:pt idx="34">
-                  <c:v>0.12569061000000001</c:v>
+                  <c:v>0.12569060999999998</c:v>
                 </c:pt>
                 <c:pt idx="35">
-                  <c:v>7.0438799999999996E-2</c:v>
+                  <c:v>7.043880000000001E-2</c:v>
                 </c:pt>
                 <c:pt idx="36">
                   <c:v>8.7912089999999998E-2</c:v>
                 </c:pt>
                 <c:pt idx="37">
-                  <c:v>7.7464790000000006E-2</c:v>
+                  <c:v>7.7464790000000019E-2</c:v>
                 </c:pt>
                 <c:pt idx="38">
                   <c:v>7.7223849999999997E-2</c:v>
@@ -5709,16 +5714,16 @@
                   <c:v>6.5201980000000007E-2</c:v>
                 </c:pt>
                 <c:pt idx="41">
-                  <c:v>6.9400630000000005E-2</c:v>
+                  <c:v>6.9400630000000033E-2</c:v>
                 </c:pt>
                 <c:pt idx="42">
-                  <c:v>7.9131654999999995E-2</c:v>
+                  <c:v>7.9131655000000009E-2</c:v>
                 </c:pt>
                 <c:pt idx="43">
-                  <c:v>4.5170259999999997E-2</c:v>
+                  <c:v>4.517025999999999E-2</c:v>
                 </c:pt>
                 <c:pt idx="44">
-                  <c:v>6.005398E-2</c:v>
+                  <c:v>6.0053980000000014E-2</c:v>
                 </c:pt>
               </c:numCache>
             </c:numRef>
@@ -5892,7 +5897,7 @@
                 <c:formatCode>General</c:formatCode>
                 <c:ptCount val="45"/>
                 <c:pt idx="12">
-                  <c:v>0.54545456000000003</c:v>
+                  <c:v>0.54545455999999992</c:v>
                 </c:pt>
                 <c:pt idx="13">
                   <c:v>0.4</c:v>
@@ -5907,7 +5912,7 @@
                   <c:v>0.25</c:v>
                 </c:pt>
                 <c:pt idx="17">
-                  <c:v>0.75</c:v>
+                  <c:v>0.75000000000000011</c:v>
                 </c:pt>
                 <c:pt idx="18">
                   <c:v>0</c:v>
@@ -5916,7 +5921,7 @@
                   <c:v>0.4</c:v>
                 </c:pt>
                 <c:pt idx="20">
-                  <c:v>0.17391305000000001</c:v>
+                  <c:v>0.17391305000000004</c:v>
                 </c:pt>
                 <c:pt idx="21">
                   <c:v>0.4</c:v>
@@ -5925,10 +5930,10 @@
                   <c:v>0.23880596000000001</c:v>
                 </c:pt>
                 <c:pt idx="23">
-                  <c:v>0.17307692999999999</c:v>
+                  <c:v>0.17307692999999996</c:v>
                 </c:pt>
                 <c:pt idx="24">
-                  <c:v>0.28735632</c:v>
+                  <c:v>0.28735632000000005</c:v>
                 </c:pt>
                 <c:pt idx="25">
                   <c:v>0.30769232000000002</c:v>
@@ -5940,7 +5945,7 @@
                   <c:v>0.25301205999999998</c:v>
                 </c:pt>
                 <c:pt idx="28">
-                  <c:v>0.21379310000000001</c:v>
+                  <c:v>0.21379310000000004</c:v>
                 </c:pt>
                 <c:pt idx="29">
                   <c:v>0.13235295</c:v>
@@ -5949,43 +5954,43 @@
                   <c:v>0.19354837999999999</c:v>
                 </c:pt>
                 <c:pt idx="31">
-                  <c:v>0.14741035999999999</c:v>
+                  <c:v>0.14741036000000002</c:v>
                 </c:pt>
                 <c:pt idx="32">
                   <c:v>0.13559321999999999</c:v>
                 </c:pt>
                 <c:pt idx="33">
-                  <c:v>0.123931624</c:v>
+                  <c:v>0.12393162400000002</c:v>
                 </c:pt>
                 <c:pt idx="34">
-                  <c:v>0.14096916000000001</c:v>
+                  <c:v>0.14096916000000004</c:v>
                 </c:pt>
                 <c:pt idx="35">
-                  <c:v>0.11814346000000001</c:v>
+                  <c:v>0.11814346000000002</c:v>
                 </c:pt>
                 <c:pt idx="36">
-                  <c:v>0.11965812000000001</c:v>
+                  <c:v>0.11965812000000002</c:v>
                 </c:pt>
                 <c:pt idx="37">
-                  <c:v>9.2592590000000002E-2</c:v>
+                  <c:v>9.2592590000000016E-2</c:v>
                 </c:pt>
                 <c:pt idx="38">
-                  <c:v>0.10232558</c:v>
+                  <c:v>0.10232558000000001</c:v>
                 </c:pt>
                 <c:pt idx="39">
-                  <c:v>0.17777778</c:v>
+                  <c:v>0.17777778000000002</c:v>
                 </c:pt>
                 <c:pt idx="40">
-                  <c:v>0.15879828000000001</c:v>
+                  <c:v>0.15879828000000007</c:v>
                 </c:pt>
                 <c:pt idx="41">
-                  <c:v>0.16915422999999999</c:v>
+                  <c:v>0.16915422999999996</c:v>
                 </c:pt>
                 <c:pt idx="42">
-                  <c:v>0.15706806000000001</c:v>
+                  <c:v>0.15706806000000004</c:v>
                 </c:pt>
                 <c:pt idx="43">
-                  <c:v>0.13592233000000001</c:v>
+                  <c:v>0.13592233000000004</c:v>
                 </c:pt>
                 <c:pt idx="44">
                   <c:v>8.4415585000000001E-2</c:v>
@@ -6168,10 +6173,10 @@
                   <c:v>0.30769232000000002</c:v>
                 </c:pt>
                 <c:pt idx="19">
-                  <c:v>0.31578946000000002</c:v>
+                  <c:v>0.31578946000000008</c:v>
                 </c:pt>
                 <c:pt idx="20">
-                  <c:v>0.48749999999999999</c:v>
+                  <c:v>0.4875000000000001</c:v>
                 </c:pt>
                 <c:pt idx="21">
                   <c:v>0</c:v>
@@ -6183,28 +6188,28 @@
                   <c:v>0.38775510000000002</c:v>
                 </c:pt>
                 <c:pt idx="24">
-                  <c:v>0.21739130000000001</c:v>
+                  <c:v>0.21739130000000004</c:v>
                 </c:pt>
                 <c:pt idx="25">
                   <c:v>0.40151515999999998</c:v>
                 </c:pt>
                 <c:pt idx="26">
-                  <c:v>0.26271185000000002</c:v>
+                  <c:v>0.26271184999999997</c:v>
                 </c:pt>
                 <c:pt idx="27">
-                  <c:v>0.36708861999999998</c:v>
+                  <c:v>0.36708862000000009</c:v>
                 </c:pt>
                 <c:pt idx="28">
-                  <c:v>0.25165564000000001</c:v>
+                  <c:v>0.25165563999999996</c:v>
                 </c:pt>
                 <c:pt idx="29">
                   <c:v>0.29333332000000001</c:v>
                 </c:pt>
                 <c:pt idx="30">
-                  <c:v>0.15686275</c:v>
+                  <c:v>0.15686275000000002</c:v>
                 </c:pt>
                 <c:pt idx="31">
-                  <c:v>0.19035532999999999</c:v>
+                  <c:v>0.19035532999999996</c:v>
                 </c:pt>
                 <c:pt idx="32">
                   <c:v>0.18421051999999999</c:v>
@@ -6213,28 +6218,28 @@
                   <c:v>0.19125684000000001</c:v>
                 </c:pt>
                 <c:pt idx="34">
-                  <c:v>0.13173652999999999</c:v>
+                  <c:v>0.13173652999999996</c:v>
                 </c:pt>
                 <c:pt idx="35">
-                  <c:v>0.14845939</c:v>
+                  <c:v>0.14845939000000005</c:v>
                 </c:pt>
                 <c:pt idx="36">
-                  <c:v>0.15979381000000001</c:v>
+                  <c:v>0.15979381000000004</c:v>
                 </c:pt>
                 <c:pt idx="37">
                   <c:v>0.105882354</c:v>
                 </c:pt>
                 <c:pt idx="38">
-                  <c:v>8.9686096000000007E-2</c:v>
+                  <c:v>8.9686096000000021E-2</c:v>
                 </c:pt>
                 <c:pt idx="39">
-                  <c:v>0.15948276</c:v>
+                  <c:v>0.15948276000000003</c:v>
                 </c:pt>
                 <c:pt idx="40">
-                  <c:v>9.1666670000000006E-2</c:v>
+                  <c:v>9.166667000000002E-2</c:v>
                 </c:pt>
                 <c:pt idx="41">
-                  <c:v>0.15384616000000001</c:v>
+                  <c:v>0.15384616000000004</c:v>
                 </c:pt>
                 <c:pt idx="42">
                   <c:v>0.13675213999999999</c:v>
@@ -6243,18 +6248,18 @@
                   <c:v>0.10891089</c:v>
                 </c:pt>
                 <c:pt idx="44">
-                  <c:v>9.1286309999999996E-2</c:v>
+                  <c:v>9.1286310000000009E-2</c:v>
                 </c:pt>
               </c:numCache>
             </c:numRef>
           </c:val>
         </c:ser>
         <c:marker val="1"/>
-        <c:axId val="95616384"/>
-        <c:axId val="58909440"/>
+        <c:axId val="49160192"/>
+        <c:axId val="49162112"/>
       </c:lineChart>
       <c:catAx>
-        <c:axId val="95616384"/>
+        <c:axId val="49160192"/>
         <c:scaling>
           <c:orientation val="minMax"/>
         </c:scaling>
@@ -6279,14 +6284,14 @@
         </c:title>
         <c:numFmt formatCode="General" sourceLinked="1"/>
         <c:tickLblPos val="nextTo"/>
-        <c:crossAx val="58909440"/>
+        <c:crossAx val="49162112"/>
         <c:crosses val="autoZero"/>
         <c:auto val="1"/>
         <c:lblAlgn val="ctr"/>
         <c:lblOffset val="100"/>
       </c:catAx>
       <c:valAx>
-        <c:axId val="58909440"/>
+        <c:axId val="49162112"/>
         <c:scaling>
           <c:orientation val="minMax"/>
         </c:scaling>
@@ -6312,7 +6317,7 @@
         </c:title>
         <c:numFmt formatCode="General" sourceLinked="1"/>
         <c:tickLblPos val="nextTo"/>
-        <c:crossAx val="95616384"/>
+        <c:crossAx val="49160192"/>
         <c:crosses val="autoZero"/>
         <c:crossBetween val="between"/>
       </c:valAx>
@@ -6329,6 +6334,7 @@
 
 <file path=ppt/charts/chart5.xml><?xml version="1.0" encoding="utf-8"?>
 <c:chartSpace xmlns:c="http://schemas.openxmlformats.org/drawingml/2006/chart" xmlns:a="http://schemas.openxmlformats.org/drawingml/2006/main" xmlns:r="http://schemas.openxmlformats.org/officeDocument/2006/relationships">
+  <c:date1904 val="1"/>
   <c:lang val="en-US"/>
   <c:chart>
     <c:title>
@@ -6537,10 +6543,10 @@
                 <c:formatCode>General</c:formatCode>
                 <c:ptCount val="45"/>
                 <c:pt idx="0">
-                  <c:v>2.5333332999999998</c:v>
+                  <c:v>2.5333333000000002</c:v>
                 </c:pt>
                 <c:pt idx="1">
-                  <c:v>2.3199999999999998</c:v>
+                  <c:v>2.3199999999999994</c:v>
                 </c:pt>
                 <c:pt idx="2">
                   <c:v>2.5454545</c:v>
@@ -6552,25 +6558,25 @@
                   <c:v>3</c:v>
                 </c:pt>
                 <c:pt idx="5">
-                  <c:v>2.6119403999999999</c:v>
+                  <c:v>2.6119403999999995</c:v>
                 </c:pt>
                 <c:pt idx="6">
-                  <c:v>2.3797470000000001</c:v>
+                  <c:v>2.3797469999999996</c:v>
                 </c:pt>
                 <c:pt idx="7">
                   <c:v>2.5</c:v>
                 </c:pt>
                 <c:pt idx="8">
-                  <c:v>2.4729728999999998</c:v>
+                  <c:v>2.4729728999999994</c:v>
                 </c:pt>
                 <c:pt idx="9">
-                  <c:v>2.8985506999999999</c:v>
+                  <c:v>2.8985506999999995</c:v>
                 </c:pt>
                 <c:pt idx="10">
-                  <c:v>2.8993289999999998</c:v>
+                  <c:v>2.8993289999999994</c:v>
                 </c:pt>
                 <c:pt idx="11">
-                  <c:v>3.0722222000000001</c:v>
+                  <c:v>3.0722221999999997</c:v>
                 </c:pt>
                 <c:pt idx="12">
                   <c:v>2.8049792999999998</c:v>
@@ -6579,22 +6585,22 @@
                   <c:v>3.2352940000000001</c:v>
                 </c:pt>
                 <c:pt idx="14">
-                  <c:v>2.9969969000000001</c:v>
+                  <c:v>2.9969968999999996</c:v>
                 </c:pt>
                 <c:pt idx="15">
-                  <c:v>2.9864407000000002</c:v>
+                  <c:v>2.9864406999999997</c:v>
                 </c:pt>
                 <c:pt idx="16">
-                  <c:v>3.2357724000000001</c:v>
+                  <c:v>3.2357723999999997</c:v>
                 </c:pt>
                 <c:pt idx="17">
-                  <c:v>3.3765903000000002</c:v>
+                  <c:v>3.3765902999999997</c:v>
                 </c:pt>
                 <c:pt idx="18">
-                  <c:v>3.3246074000000001</c:v>
+                  <c:v>3.3246073999999997</c:v>
                 </c:pt>
                 <c:pt idx="19">
-                  <c:v>3.4949083000000001</c:v>
+                  <c:v>3.4949082999999996</c:v>
                 </c:pt>
                 <c:pt idx="20">
                   <c:v>3.8297362000000001</c:v>
@@ -6609,10 +6615,10 @@
                   <c:v>3.5219939999999998</c:v>
                 </c:pt>
                 <c:pt idx="24">
-                  <c:v>3.5569334000000001</c:v>
+                  <c:v>3.5569333999999997</c:v>
                 </c:pt>
                 <c:pt idx="25">
-                  <c:v>3.5356394999999998</c:v>
+                  <c:v>3.5356394999999994</c:v>
                 </c:pt>
                 <c:pt idx="26">
                   <c:v>3.6125702999999998</c:v>
@@ -6624,10 +6630,10 @@
                   <c:v>3.635767</c:v>
                 </c:pt>
                 <c:pt idx="29">
-                  <c:v>3.7050242</c:v>
+                  <c:v>3.7050242000000004</c:v>
                 </c:pt>
                 <c:pt idx="30">
-                  <c:v>3.8543753999999999</c:v>
+                  <c:v>3.8543753999999995</c:v>
                 </c:pt>
                 <c:pt idx="31">
                   <c:v>3.6032926999999999</c:v>
@@ -6636,40 +6642,40 @@
                   <c:v>3.7321996999999998</c:v>
                 </c:pt>
                 <c:pt idx="33">
-                  <c:v>3.8033332999999998</c:v>
+                  <c:v>3.8033333000000002</c:v>
                 </c:pt>
                 <c:pt idx="34">
                   <c:v>3.6797065999999998</c:v>
                 </c:pt>
                 <c:pt idx="35">
-                  <c:v>3.8127870000000001</c:v>
+                  <c:v>3.8127869999999997</c:v>
                 </c:pt>
                 <c:pt idx="36">
-                  <c:v>3.8323269999999998</c:v>
+                  <c:v>3.8323269999999994</c:v>
                 </c:pt>
                 <c:pt idx="37">
-                  <c:v>3.9104682999999998</c:v>
+                  <c:v>3.9104682999999993</c:v>
                 </c:pt>
                 <c:pt idx="38">
                   <c:v>3.8405306000000001</c:v>
                 </c:pt>
                 <c:pt idx="39">
-                  <c:v>4.1850265999999996</c:v>
+                  <c:v>4.1850265999999987</c:v>
                 </c:pt>
                 <c:pt idx="40">
-                  <c:v>4.0149125999999997</c:v>
+                  <c:v>4.0149125999999979</c:v>
                 </c:pt>
                 <c:pt idx="41">
-                  <c:v>4.0448979999999999</c:v>
+                  <c:v>4.044897999999999</c:v>
                 </c:pt>
                 <c:pt idx="42">
-                  <c:v>4.0649569999999997</c:v>
+                  <c:v>4.0649569999999979</c:v>
                 </c:pt>
                 <c:pt idx="43">
-                  <c:v>3.8371559999999998</c:v>
+                  <c:v>3.8371559999999993</c:v>
                 </c:pt>
                 <c:pt idx="44">
-                  <c:v>3.9621474999999999</c:v>
+                  <c:v>3.9621474999999995</c:v>
                 </c:pt>
               </c:numCache>
             </c:numRef>
@@ -6843,10 +6849,10 @@
                 <c:formatCode>General</c:formatCode>
                 <c:ptCount val="45"/>
                 <c:pt idx="0">
-                  <c:v>2.5333332999999998</c:v>
+                  <c:v>2.5333333000000002</c:v>
                 </c:pt>
                 <c:pt idx="1">
-                  <c:v>2.3199999999999998</c:v>
+                  <c:v>2.3199999999999994</c:v>
                 </c:pt>
                 <c:pt idx="2">
                   <c:v>2.5454545</c:v>
@@ -6858,7 +6864,7 @@
                   <c:v>3</c:v>
                 </c:pt>
                 <c:pt idx="5">
-                  <c:v>2.6666666999999999</c:v>
+                  <c:v>2.6666666999999995</c:v>
                 </c:pt>
                 <c:pt idx="6">
                   <c:v>2.2999999999999998</c:v>
@@ -6867,7 +6873,7 @@
                   <c:v>2.4375</c:v>
                 </c:pt>
                 <c:pt idx="8">
-                  <c:v>2.3714284999999999</c:v>
+                  <c:v>2.3714284999999991</c:v>
                 </c:pt>
                 <c:pt idx="9">
                   <c:v>2.7938930000000002</c:v>
@@ -6876,43 +6882,43 @@
                   <c:v>2.8095238</c:v>
                 </c:pt>
                 <c:pt idx="11">
-                  <c:v>3.0620154999999998</c:v>
+                  <c:v>3.0620154999999993</c:v>
                 </c:pt>
                 <c:pt idx="12">
                   <c:v>3.0337079</c:v>
                 </c:pt>
                 <c:pt idx="13">
-                  <c:v>3.2479339</c:v>
+                  <c:v>3.2479339000000005</c:v>
                 </c:pt>
                 <c:pt idx="14">
                   <c:v>2.9761905999999998</c:v>
                 </c:pt>
                 <c:pt idx="15">
-                  <c:v>2.8278690000000002</c:v>
+                  <c:v>2.8278689999999997</c:v>
                 </c:pt>
                 <c:pt idx="16">
-                  <c:v>3.4361700000000002</c:v>
+                  <c:v>3.4361699999999997</c:v>
                 </c:pt>
                 <c:pt idx="17">
-                  <c:v>3.3317757000000001</c:v>
+                  <c:v>3.3317756999999997</c:v>
                 </c:pt>
                 <c:pt idx="18">
-                  <c:v>3.3130841000000002</c:v>
+                  <c:v>3.3130840999999998</c:v>
                 </c:pt>
                 <c:pt idx="19">
-                  <c:v>3.521531</c:v>
+                  <c:v>3.5215310000000004</c:v>
                 </c:pt>
                 <c:pt idx="20">
-                  <c:v>4.0598802999999997</c:v>
+                  <c:v>4.0598802999999988</c:v>
                 </c:pt>
                 <c:pt idx="21">
-                  <c:v>4.2848835000000003</c:v>
+                  <c:v>4.2848834999999994</c:v>
                 </c:pt>
                 <c:pt idx="22">
                   <c:v>3.8038278000000001</c:v>
                 </c:pt>
                 <c:pt idx="23">
-                  <c:v>3.9414634999999998</c:v>
+                  <c:v>3.9414634999999993</c:v>
                 </c:pt>
                 <c:pt idx="24">
                   <c:v>3.7456445999999999</c:v>
@@ -6924,28 +6930,28 @@
                   <c:v>3.6088328000000001</c:v>
                 </c:pt>
                 <c:pt idx="27">
-                  <c:v>3.9520547000000001</c:v>
+                  <c:v>3.9520546999999997</c:v>
                 </c:pt>
                 <c:pt idx="28">
-                  <c:v>3.9255664000000001</c:v>
+                  <c:v>3.9255663999999997</c:v>
                 </c:pt>
                 <c:pt idx="29">
-                  <c:v>3.9788519999999998</c:v>
+                  <c:v>3.9788519999999994</c:v>
                 </c:pt>
                 <c:pt idx="30">
-                  <c:v>4.0144929999999999</c:v>
+                  <c:v>4.014492999999999</c:v>
                 </c:pt>
                 <c:pt idx="31">
-                  <c:v>3.8223684000000002</c:v>
+                  <c:v>3.8223683999999993</c:v>
                 </c:pt>
                 <c:pt idx="32">
-                  <c:v>3.6928570000000001</c:v>
+                  <c:v>3.6928569999999996</c:v>
                 </c:pt>
                 <c:pt idx="33">
-                  <c:v>3.7221375000000001</c:v>
+                  <c:v>3.7221375000000005</c:v>
                 </c:pt>
                 <c:pt idx="34">
-                  <c:v>3.8064515999999999</c:v>
+                  <c:v>3.8064515999999995</c:v>
                 </c:pt>
                 <c:pt idx="35">
                   <c:v>3.9075066999999999</c:v>
@@ -6954,16 +6960,16 @@
                   <c:v>3.5622745</c:v>
                 </c:pt>
                 <c:pt idx="37">
-                  <c:v>3.4588679999999998</c:v>
+                  <c:v>3.4588679999999994</c:v>
                 </c:pt>
                 <c:pt idx="38">
-                  <c:v>3.8999079999999999</c:v>
+                  <c:v>3.8999079999999995</c:v>
                 </c:pt>
                 <c:pt idx="39">
                   <c:v>4.015625</c:v>
                 </c:pt>
                 <c:pt idx="40">
-                  <c:v>3.8560688000000001</c:v>
+                  <c:v>3.8560687999999992</c:v>
                 </c:pt>
                 <c:pt idx="41">
                   <c:v>3.6157205000000001</c:v>
@@ -6972,7 +6978,7 @@
                   <c:v>3.6031599999999999</c:v>
                 </c:pt>
                 <c:pt idx="43">
-                  <c:v>3.4646466</c:v>
+                  <c:v>3.4646465999999996</c:v>
                 </c:pt>
                 <c:pt idx="44">
                   <c:v>3.6183866999999998</c:v>
@@ -7164,19 +7170,19 @@
                   <c:v>2.2045455</c:v>
                 </c:pt>
                 <c:pt idx="17">
-                  <c:v>2.3131312999999998</c:v>
+                  <c:v>2.3131313000000002</c:v>
                 </c:pt>
                 <c:pt idx="18">
-                  <c:v>2.0909089999999999</c:v>
+                  <c:v>2.0909089999999995</c:v>
                 </c:pt>
                 <c:pt idx="19">
-                  <c:v>2.3368419999999999</c:v>
+                  <c:v>2.336841999999999</c:v>
                 </c:pt>
                 <c:pt idx="20">
                   <c:v>2.3441296</c:v>
                 </c:pt>
                 <c:pt idx="21">
-                  <c:v>2.3682432000000002</c:v>
+                  <c:v>2.3682431999999998</c:v>
                 </c:pt>
                 <c:pt idx="22">
                   <c:v>2.4735203000000001</c:v>
@@ -7185,13 +7191,13 @@
                   <c:v>2.5269841999999998</c:v>
                 </c:pt>
                 <c:pt idx="24">
-                  <c:v>2.5955284000000001</c:v>
+                  <c:v>2.5955283999999996</c:v>
                 </c:pt>
                 <c:pt idx="25">
                   <c:v>2.6808510000000001</c:v>
                 </c:pt>
                 <c:pt idx="26">
-                  <c:v>3.0216799999999999</c:v>
+                  <c:v>3.0216799999999995</c:v>
                 </c:pt>
                 <c:pt idx="27">
                   <c:v>2.9225807000000001</c:v>
@@ -7200,7 +7206,7 @@
                   <c:v>2.7206106000000001</c:v>
                 </c:pt>
                 <c:pt idx="29">
-                  <c:v>2.9703154999999999</c:v>
+                  <c:v>2.9703154999999994</c:v>
                 </c:pt>
                 <c:pt idx="30">
                   <c:v>2.9848275000000002</c:v>
@@ -7212,10 +7218,10 @@
                   <c:v>3.0252100999999998</c:v>
                 </c:pt>
                 <c:pt idx="33">
-                  <c:v>2.9572023999999999</c:v>
+                  <c:v>2.9572023999999995</c:v>
                 </c:pt>
                 <c:pt idx="34">
-                  <c:v>2.9024165000000002</c:v>
+                  <c:v>2.9024164999999997</c:v>
                 </c:pt>
                 <c:pt idx="35">
                   <c:v>3.0810168</c:v>
@@ -7227,22 +7233,22 @@
                   <c:v>3.2113269999999998</c:v>
                 </c:pt>
                 <c:pt idx="38">
-                  <c:v>2.9588087000000001</c:v>
+                  <c:v>2.9588086999999996</c:v>
                 </c:pt>
                 <c:pt idx="39">
-                  <c:v>3.215856</c:v>
+                  <c:v>3.2158559999999996</c:v>
                 </c:pt>
                 <c:pt idx="40">
-                  <c:v>3.3525143000000002</c:v>
+                  <c:v>3.3525142999999997</c:v>
                 </c:pt>
                 <c:pt idx="41">
-                  <c:v>3.3944223</c:v>
+                  <c:v>3.3944222999999996</c:v>
                 </c:pt>
                 <c:pt idx="42">
                   <c:v>3.4844176999999998</c:v>
                 </c:pt>
                 <c:pt idx="43">
-                  <c:v>3.4211566000000002</c:v>
+                  <c:v>3.4211565999999998</c:v>
                 </c:pt>
                 <c:pt idx="44">
                   <c:v>3.5429417999999999</c:v>
@@ -7422,13 +7428,13 @@
                   <c:v>2</c:v>
                 </c:pt>
                 <c:pt idx="13">
-                  <c:v>2.1724138000000002</c:v>
+                  <c:v>2.1724137999999997</c:v>
                 </c:pt>
                 <c:pt idx="14">
                   <c:v>0</c:v>
                 </c:pt>
                 <c:pt idx="15">
-                  <c:v>2.2142856000000002</c:v>
+                  <c:v>2.2142855999999997</c:v>
                 </c:pt>
                 <c:pt idx="16">
                   <c:v>2.4137930000000001</c:v>
@@ -7443,25 +7449,25 @@
                   <c:v>2.2666667</c:v>
                 </c:pt>
                 <c:pt idx="20">
-                  <c:v>2.0754716000000002</c:v>
+                  <c:v>2.0754715999999997</c:v>
                 </c:pt>
                 <c:pt idx="21">
                   <c:v>2.347826</c:v>
                 </c:pt>
                 <c:pt idx="22">
-                  <c:v>2.2109375</c:v>
+                  <c:v>2.2109375000000004</c:v>
                 </c:pt>
                 <c:pt idx="23">
                   <c:v>2.2424241999999999</c:v>
                 </c:pt>
                 <c:pt idx="24">
-                  <c:v>2.2962964000000001</c:v>
+                  <c:v>2.2962963999999997</c:v>
                 </c:pt>
                 <c:pt idx="25">
                   <c:v>2.5</c:v>
                 </c:pt>
                 <c:pt idx="26">
-                  <c:v>2.4976959999999999</c:v>
+                  <c:v>2.4976959999999995</c:v>
                 </c:pt>
                 <c:pt idx="27">
                   <c:v>2.5</c:v>
@@ -7470,7 +7476,7 @@
                   <c:v>2.4285714999999999</c:v>
                 </c:pt>
                 <c:pt idx="29">
-                  <c:v>2.7363183000000002</c:v>
+                  <c:v>2.7363182999999998</c:v>
                 </c:pt>
                 <c:pt idx="30">
                   <c:v>2.4570637</c:v>
@@ -7479,43 +7485,43 @@
                   <c:v>2.7349079999999999</c:v>
                 </c:pt>
                 <c:pt idx="32">
-                  <c:v>2.8286853000000001</c:v>
+                  <c:v>2.8286852999999996</c:v>
                 </c:pt>
                 <c:pt idx="33">
-                  <c:v>2.7438015999999998</c:v>
+                  <c:v>2.7438016000000003</c:v>
                 </c:pt>
                 <c:pt idx="34">
-                  <c:v>2.8690095000000002</c:v>
+                  <c:v>2.8690094999999998</c:v>
                 </c:pt>
                 <c:pt idx="35">
-                  <c:v>2.7867434000000002</c:v>
+                  <c:v>2.7867433999999998</c:v>
                 </c:pt>
                 <c:pt idx="36">
-                  <c:v>2.7741935</c:v>
+                  <c:v>2.7741935000000004</c:v>
                 </c:pt>
                 <c:pt idx="37">
-                  <c:v>2.9435897</c:v>
+                  <c:v>2.9435897000000004</c:v>
                 </c:pt>
                 <c:pt idx="38">
                   <c:v>2.8509316</c:v>
                 </c:pt>
                 <c:pt idx="39">
-                  <c:v>2.9965869999999999</c:v>
+                  <c:v>2.9965869999999994</c:v>
                 </c:pt>
                 <c:pt idx="40">
                   <c:v>2.8507042</c:v>
                 </c:pt>
                 <c:pt idx="41">
-                  <c:v>2.7142856000000002</c:v>
+                  <c:v>2.7142855999999997</c:v>
                 </c:pt>
                 <c:pt idx="42">
                   <c:v>3</c:v>
                 </c:pt>
                 <c:pt idx="43">
-                  <c:v>2.7975078</c:v>
+                  <c:v>2.7975078000000004</c:v>
                 </c:pt>
                 <c:pt idx="44">
-                  <c:v>2.8410852000000002</c:v>
+                  <c:v>2.8410851999999998</c:v>
                 </c:pt>
               </c:numCache>
             </c:numRef>
@@ -7689,16 +7695,16 @@
                 <c:formatCode>General</c:formatCode>
                 <c:ptCount val="45"/>
                 <c:pt idx="17">
-                  <c:v>2.0238094000000002</c:v>
+                  <c:v>2.0238093999999998</c:v>
                 </c:pt>
                 <c:pt idx="18">
-                  <c:v>2.1666666999999999</c:v>
+                  <c:v>2.1666666999999995</c:v>
                 </c:pt>
                 <c:pt idx="19">
-                  <c:v>2.4166666999999999</c:v>
+                  <c:v>2.4166666999999991</c:v>
                 </c:pt>
                 <c:pt idx="20">
-                  <c:v>2.4166666999999999</c:v>
+                  <c:v>2.4166666999999991</c:v>
                 </c:pt>
                 <c:pt idx="21">
                   <c:v>0</c:v>
@@ -7707,49 +7713,49 @@
                   <c:v>2.58</c:v>
                 </c:pt>
                 <c:pt idx="23">
-                  <c:v>2.4264705000000002</c:v>
+                  <c:v>2.4264704999999998</c:v>
                 </c:pt>
                 <c:pt idx="24">
-                  <c:v>2.8666665999999998</c:v>
+                  <c:v>2.8666665999999994</c:v>
                 </c:pt>
                 <c:pt idx="25">
-                  <c:v>2.359375</c:v>
+                  <c:v>2.3593749999999996</c:v>
                 </c:pt>
                 <c:pt idx="26">
-                  <c:v>2.3880596000000001</c:v>
+                  <c:v>2.3880595999999996</c:v>
                 </c:pt>
                 <c:pt idx="27">
-                  <c:v>2.4396550000000001</c:v>
+                  <c:v>2.4396549999999992</c:v>
                 </c:pt>
                 <c:pt idx="28">
-                  <c:v>2.6129030000000002</c:v>
+                  <c:v>2.6129029999999998</c:v>
                 </c:pt>
                 <c:pt idx="29">
-                  <c:v>2.4122447999999999</c:v>
+                  <c:v>2.4122447999999994</c:v>
                 </c:pt>
                 <c:pt idx="30">
                   <c:v>2.6898735</c:v>
                 </c:pt>
                 <c:pt idx="31">
-                  <c:v>2.5423453</c:v>
+                  <c:v>2.5423452999999996</c:v>
                 </c:pt>
                 <c:pt idx="32">
-                  <c:v>2.6825937999999998</c:v>
+                  <c:v>2.6825938000000003</c:v>
                 </c:pt>
                 <c:pt idx="33">
-                  <c:v>2.5450081999999998</c:v>
+                  <c:v>2.5450081999999994</c:v>
                 </c:pt>
                 <c:pt idx="34">
-                  <c:v>2.4640521999999998</c:v>
+                  <c:v>2.4640521999999994</c:v>
                 </c:pt>
                 <c:pt idx="35">
-                  <c:v>2.6584506000000001</c:v>
+                  <c:v>2.6584505999999997</c:v>
                 </c:pt>
                 <c:pt idx="36">
-                  <c:v>2.6355422000000002</c:v>
+                  <c:v>2.6355421999999997</c:v>
                 </c:pt>
                 <c:pt idx="37">
-                  <c:v>2.4810894000000001</c:v>
+                  <c:v>2.4810893999999997</c:v>
                 </c:pt>
                 <c:pt idx="38">
                   <c:v>2.6284290000000001</c:v>
@@ -7758,7 +7764,7 @@
                   <c:v>2.7638888000000001</c:v>
                 </c:pt>
                 <c:pt idx="40">
-                  <c:v>2.6203903999999998</c:v>
+                  <c:v>2.6203904000000002</c:v>
                 </c:pt>
                 <c:pt idx="41">
                   <c:v>2.807547</c:v>
@@ -7767,7 +7773,7 @@
                   <c:v>2.7125306</c:v>
                 </c:pt>
                 <c:pt idx="43">
-                  <c:v>2.5102389999999999</c:v>
+                  <c:v>2.5102389999999994</c:v>
                 </c:pt>
                 <c:pt idx="44">
                   <c:v>2.6221199999999998</c:v>
@@ -7777,11 +7783,11 @@
           </c:val>
         </c:ser>
         <c:marker val="1"/>
-        <c:axId val="112319104"/>
-        <c:axId val="112322432"/>
+        <c:axId val="59909632"/>
+        <c:axId val="59911552"/>
       </c:lineChart>
       <c:catAx>
-        <c:axId val="112319104"/>
+        <c:axId val="59909632"/>
         <c:scaling>
           <c:orientation val="minMax"/>
         </c:scaling>
@@ -7806,14 +7812,14 @@
         </c:title>
         <c:numFmt formatCode="General" sourceLinked="1"/>
         <c:tickLblPos val="nextTo"/>
-        <c:crossAx val="112322432"/>
+        <c:crossAx val="59911552"/>
         <c:crosses val="autoZero"/>
         <c:auto val="1"/>
         <c:lblAlgn val="ctr"/>
         <c:lblOffset val="100"/>
       </c:catAx>
       <c:valAx>
-        <c:axId val="112322432"/>
+        <c:axId val="59911552"/>
         <c:scaling>
           <c:orientation val="minMax"/>
         </c:scaling>
@@ -7839,7 +7845,7 @@
         </c:title>
         <c:numFmt formatCode="General" sourceLinked="1"/>
         <c:tickLblPos val="nextTo"/>
-        <c:crossAx val="112319104"/>
+        <c:crossAx val="59909632"/>
         <c:crosses val="autoZero"/>
         <c:crossBetween val="between"/>
       </c:valAx>
@@ -8934,8 +8940,8 @@
         </p:nvSpPr>
         <p:spPr>
           <a:xfrm>
-            <a:off x="381187" y="685800"/>
-            <a:ext cx="6096299" cy="3429000"/>
+            <a:off x="381000" y="685800"/>
+            <a:ext cx="6096000" cy="3429000"/>
           </a:xfrm>
           <a:custGeom>
             <a:avLst/>
@@ -9011,7 +9017,7 @@
   <p:cSld>
     <p:spTree>
       <p:nvGrpSpPr>
-        <p:cNvPr id="1" name="Shape 88"/>
+        <p:cNvPr id="1" name="Shape 82"/>
         <p:cNvGrpSpPr/>
         <p:nvPr/>
       </p:nvGrpSpPr>
@@ -9025,7 +9031,7 @@
       </p:grpSpPr>
       <p:sp>
         <p:nvSpPr>
-          <p:cNvPr id="89" name="Shape 89"/>
+          <p:cNvPr id="83" name="Shape 83"/>
           <p:cNvSpPr>
             <a:spLocks noGrp="1" noRot="1" noChangeAspect="1"/>
           </p:cNvSpPr>
@@ -9035,8 +9041,8 @@
         </p:nvSpPr>
         <p:spPr>
           <a:xfrm>
-            <a:off x="381187" y="685800"/>
-            <a:ext cx="6096299" cy="3429000"/>
+            <a:off x="381000" y="685800"/>
+            <a:ext cx="6096000" cy="3429000"/>
           </a:xfrm>
           <a:custGeom>
             <a:avLst/>
@@ -9066,7 +9072,7 @@
       </p:sp>
       <p:sp>
         <p:nvSpPr>
-          <p:cNvPr id="90" name="Shape 90"/>
+          <p:cNvPr id="84" name="Shape 84"/>
           <p:cNvSpPr txBox="1">
             <a:spLocks noGrp="1"/>
           </p:cNvSpPr>
@@ -9089,7 +9095,108 @@
           </a:bodyPr>
           <a:lstStyle/>
           <a:p>
-            <a:pPr>
+            <a:pPr lvl="0" rtl="0">
+              <a:spcBef>
+                <a:spcPts val="0"/>
+              </a:spcBef>
+              <a:buNone/>
+            </a:pPr>
+            <a:endParaRPr/>
+          </a:p>
+        </p:txBody>
+      </p:sp>
+    </p:spTree>
+  </p:cSld>
+  <p:clrMapOvr>
+    <a:masterClrMapping/>
+  </p:clrMapOvr>
+</p:notes>
+</file>
+
+<file path=ppt/notesSlides/notesSlide19.xml><?xml version="1.0" encoding="utf-8"?>
+<p:notes xmlns:a="http://schemas.openxmlformats.org/drawingml/2006/main" xmlns:r="http://schemas.openxmlformats.org/officeDocument/2006/relationships" xmlns:p="http://schemas.openxmlformats.org/presentationml/2006/main" showMasterSp="0" showMasterPhAnim="0">
+  <p:cSld>
+    <p:spTree>
+      <p:nvGrpSpPr>
+        <p:cNvPr id="1" name="Shape 82"/>
+        <p:cNvGrpSpPr/>
+        <p:nvPr/>
+      </p:nvGrpSpPr>
+      <p:grpSpPr>
+        <a:xfrm>
+          <a:off x="0" y="0"/>
+          <a:ext cx="0" cy="0"/>
+          <a:chOff x="0" y="0"/>
+          <a:chExt cx="0" cy="0"/>
+        </a:xfrm>
+      </p:grpSpPr>
+      <p:sp>
+        <p:nvSpPr>
+          <p:cNvPr id="83" name="Shape 83"/>
+          <p:cNvSpPr>
+            <a:spLocks noGrp="1" noRot="1" noChangeAspect="1"/>
+          </p:cNvSpPr>
+          <p:nvPr>
+            <p:ph type="sldImg" idx="2"/>
+          </p:nvPr>
+        </p:nvSpPr>
+        <p:spPr>
+          <a:xfrm>
+            <a:off x="381000" y="685800"/>
+            <a:ext cx="6096000" cy="3429000"/>
+          </a:xfrm>
+          <a:custGeom>
+            <a:avLst/>
+            <a:gdLst/>
+            <a:ahLst/>
+            <a:cxnLst/>
+            <a:rect l="0" t="0" r="0" b="0"/>
+            <a:pathLst>
+              <a:path w="120000" h="120000" extrusionOk="0">
+                <a:moveTo>
+                  <a:pt x="0" y="0"/>
+                </a:moveTo>
+                <a:lnTo>
+                  <a:pt x="120000" y="0"/>
+                </a:lnTo>
+                <a:lnTo>
+                  <a:pt x="120000" y="120000"/>
+                </a:lnTo>
+                <a:lnTo>
+                  <a:pt x="0" y="120000"/>
+                </a:lnTo>
+                <a:close/>
+              </a:path>
+            </a:pathLst>
+          </a:custGeom>
+        </p:spPr>
+      </p:sp>
+      <p:sp>
+        <p:nvSpPr>
+          <p:cNvPr id="84" name="Shape 84"/>
+          <p:cNvSpPr txBox="1">
+            <a:spLocks noGrp="1"/>
+          </p:cNvSpPr>
+          <p:nvPr>
+            <p:ph type="body" idx="1"/>
+          </p:nvPr>
+        </p:nvSpPr>
+        <p:spPr>
+          <a:xfrm>
+            <a:off x="685800" y="4343400"/>
+            <a:ext cx="5486399" cy="4114800"/>
+          </a:xfrm>
+          <a:prstGeom prst="rect">
+            <a:avLst/>
+          </a:prstGeom>
+        </p:spPr>
+        <p:txBody>
+          <a:bodyPr lIns="91425" tIns="91425" rIns="91425" bIns="91425" anchor="t" anchorCtr="0">
+            <a:noAutofit/>
+          </a:bodyPr>
+          <a:lstStyle/>
+          <a:p>
+            <a:pPr lvl="0" rtl="0">
               <a:spcBef>
                 <a:spcPts val="0"/>
               </a:spcBef>
@@ -12314,7 +12421,7 @@
               <a:buNone/>
             </a:pPr>
             <a:r>
-              <a:rPr lang="en"/>
+              <a:rPr lang="en" dirty="0"/>
               <a:t>Author based statistics</a:t>
             </a:r>
           </a:p>
@@ -12584,7 +12691,7 @@
           <p:nvPr/>
         </p:nvGraphicFramePr>
         <p:xfrm>
-          <a:off x="304800" y="1276350"/>
+          <a:off x="3162300" y="1543050"/>
           <a:ext cx="5981700" cy="3600450"/>
         </p:xfrm>
         <a:graphic>
@@ -12682,7 +12789,7 @@
           <p:nvPr/>
         </p:nvGraphicFramePr>
         <p:xfrm>
-          <a:off x="381000" y="1200150"/>
+          <a:off x="3145972" y="1548492"/>
           <a:ext cx="5981700" cy="3600450"/>
         </p:xfrm>
         <a:graphic>
@@ -12776,7 +12883,7 @@
           <p:nvPr/>
         </p:nvGraphicFramePr>
         <p:xfrm>
-          <a:off x="381000" y="1123950"/>
+          <a:off x="3162300" y="1543050"/>
           <a:ext cx="5981700" cy="3600450"/>
         </p:xfrm>
         <a:graphic>
@@ -12870,7 +12977,7 @@
           <p:nvPr/>
         </p:nvGraphicFramePr>
         <p:xfrm>
-          <a:off x="381000" y="1200150"/>
+          <a:off x="3162300" y="1543050"/>
           <a:ext cx="5981700" cy="3600450"/>
         </p:xfrm>
         <a:graphic>
@@ -12964,7 +13071,7 @@
           <p:nvPr/>
         </p:nvGraphicFramePr>
         <p:xfrm>
-          <a:off x="381000" y="1200150"/>
+          <a:off x="3162300" y="1543050"/>
           <a:ext cx="5981700" cy="3600450"/>
         </p:xfrm>
         <a:graphic>
@@ -13071,28 +13178,67 @@
           </a:bodyPr>
           <a:lstStyle/>
           <a:p>
-            <a:pPr lvl="0" rtl="0">
-              <a:spcBef>
-                <a:spcPts val="0"/>
-              </a:spcBef>
-              <a:buNone/>
-            </a:pPr>
-            <a:r>
-              <a:rPr lang="en"/>
-              <a:t>&lt;Refer to 6 degrees of freedom paper &gt;</a:t>
+            <a:r>
+              <a:rPr lang="en-US" sz="2800" u="sng" dirty="0" smtClean="0"/>
+              <a:t>Hive:</a:t>
             </a:r>
           </a:p>
           <a:p>
-            <a:pPr lvl="0" rtl="0">
-              <a:spcBef>
-                <a:spcPts val="0"/>
-              </a:spcBef>
-              <a:buNone/>
+            <a:pPr>
+              <a:buFont typeface="Arial" pitchFamily="34" charset="0"/>
+              <a:buChar char="•"/>
             </a:pPr>
             <a:r>
-              <a:rPr lang="en"/>
-              <a:t>Also data processing details, Hive etc etc</a:t>
-            </a:r>
+              <a:rPr lang="en-US" sz="2000" dirty="0" smtClean="0"/>
+              <a:t>As only certain fields were required for Hive analytics, the files were transformed into a tab delimited file having the following format</a:t>
+            </a:r>
+          </a:p>
+          <a:p>
+            <a:r>
+              <a:rPr lang="en-US" sz="1400" i="1" smtClean="0"/>
+              <a:t>	</a:t>
+            </a:r>
+            <a:r>
+              <a:rPr lang="en-US" sz="1400" i="1" dirty="0" smtClean="0"/>
+              <a:t>			key year conference authors-array</a:t>
+            </a:r>
+          </a:p>
+          <a:p>
+            <a:pPr>
+              <a:buFont typeface="Arial" pitchFamily="34" charset="0"/>
+              <a:buChar char="•"/>
+            </a:pPr>
+            <a:endParaRPr lang="en-US" sz="2000" dirty="0" smtClean="0"/>
+          </a:p>
+          <a:p>
+            <a:pPr>
+              <a:buFont typeface="Arial" pitchFamily="34" charset="0"/>
+              <a:buChar char="•"/>
+            </a:pPr>
+            <a:r>
+              <a:rPr lang="en-US" sz="2000" dirty="0" smtClean="0"/>
+              <a:t>Then these were put in the tables through Hive</a:t>
+            </a:r>
+          </a:p>
+          <a:p>
+            <a:pPr>
+              <a:buFont typeface="Arial" pitchFamily="34" charset="0"/>
+              <a:buChar char="•"/>
+            </a:pPr>
+            <a:r>
+              <a:rPr lang="en-US" sz="2000" dirty="0" smtClean="0"/>
+              <a:t>The configured file was also split according to the Tiers and the analytics were also found on the tier files</a:t>
+            </a:r>
+          </a:p>
+          <a:p>
+            <a:r>
+              <a:rPr lang="en-US" sz="1400" dirty="0" smtClean="0"/>
+              <a:t/>
+            </a:r>
+            <a:br>
+              <a:rPr lang="en-US" sz="1400" dirty="0" smtClean="0"/>
+            </a:br>
+            <a:endParaRPr lang="en" sz="1400" dirty="0"/>
           </a:p>
         </p:txBody>
       </p:sp>
@@ -13112,7 +13258,7 @@
   <p:cSld>
     <p:spTree>
       <p:nvGrpSpPr>
-        <p:cNvPr id="1" name="Shape 85"/>
+        <p:cNvPr id="1" name="Shape 79"/>
         <p:cNvGrpSpPr/>
         <p:nvPr/>
       </p:nvGrpSpPr>
@@ -13126,7 +13272,7 @@
       </p:grpSpPr>
       <p:sp>
         <p:nvSpPr>
-          <p:cNvPr id="86" name="Shape 86"/>
+          <p:cNvPr id="80" name="Shape 80"/>
           <p:cNvSpPr txBox="1">
             <a:spLocks noGrp="1"/>
           </p:cNvSpPr>
@@ -13157,32 +13303,86 @@
             </a:pPr>
             <a:r>
               <a:rPr lang="en"/>
-              <a:t>Author based statistics - results</a:t>
+              <a:t>Paper based statistics</a:t>
             </a:r>
           </a:p>
         </p:txBody>
       </p:sp>
+      <p:pic>
+        <p:nvPicPr>
+          <p:cNvPr id="1026" name="Picture 2" descr="C:\Users\Aditya Garg\Documents\GitHub\RTBDProject\ResultGraphs\AvgAuthComb.png"/>
+          <p:cNvPicPr>
+            <a:picLocks noChangeAspect="1" noChangeArrowheads="1"/>
+          </p:cNvPicPr>
+          <p:nvPr/>
+        </p:nvPicPr>
+        <p:blipFill>
+          <a:blip r:embed="rId3"/>
+          <a:srcRect/>
+          <a:stretch>
+            <a:fillRect/>
+          </a:stretch>
+        </p:blipFill>
+        <p:spPr bwMode="auto">
+          <a:xfrm>
+            <a:off x="2396911" y="971550"/>
+            <a:ext cx="6747089" cy="4171950"/>
+          </a:xfrm>
+          <a:prstGeom prst="rect">
+            <a:avLst/>
+          </a:prstGeom>
+          <a:noFill/>
+        </p:spPr>
+      </p:pic>
+    </p:spTree>
+  </p:cSld>
+  <p:clrMapOvr>
+    <a:masterClrMapping/>
+  </p:clrMapOvr>
+  <p:transition spd="slow">
+    <p:cut/>
+  </p:transition>
+</p:sld>
+</file>
+
+<file path=ppt/slides/slide19.xml><?xml version="1.0" encoding="utf-8"?>
+<p:sld xmlns:a="http://schemas.openxmlformats.org/drawingml/2006/main" xmlns:r="http://schemas.openxmlformats.org/officeDocument/2006/relationships" xmlns:p="http://schemas.openxmlformats.org/presentationml/2006/main">
+  <p:cSld>
+    <p:spTree>
+      <p:nvGrpSpPr>
+        <p:cNvPr id="1" name="Shape 79"/>
+        <p:cNvGrpSpPr/>
+        <p:nvPr/>
+      </p:nvGrpSpPr>
+      <p:grpSpPr>
+        <a:xfrm>
+          <a:off x="0" y="0"/>
+          <a:ext cx="0" cy="0"/>
+          <a:chOff x="0" y="0"/>
+          <a:chExt cx="0" cy="0"/>
+        </a:xfrm>
+      </p:grpSpPr>
       <p:sp>
         <p:nvSpPr>
-          <p:cNvPr id="87" name="Shape 87"/>
+          <p:cNvPr id="80" name="Shape 80"/>
           <p:cNvSpPr txBox="1">
             <a:spLocks noGrp="1"/>
           </p:cNvSpPr>
           <p:nvPr>
-            <p:ph type="body" idx="1"/>
+            <p:ph type="title"/>
           </p:nvPr>
         </p:nvSpPr>
         <p:spPr>
           <a:xfrm>
-            <a:off x="457200" y="1200150"/>
-            <a:ext cx="8229600" cy="3725699"/>
+            <a:off x="457200" y="205978"/>
+            <a:ext cx="8229600" cy="857400"/>
           </a:xfrm>
           <a:prstGeom prst="rect">
             <a:avLst/>
           </a:prstGeom>
         </p:spPr>
         <p:txBody>
-          <a:bodyPr lIns="91425" tIns="91425" rIns="91425" bIns="91425" anchor="t" anchorCtr="0">
+          <a:bodyPr lIns="91425" tIns="91425" rIns="91425" bIns="91425" anchor="b" anchorCtr="0">
             <a:noAutofit/>
           </a:bodyPr>
           <a:lstStyle/>
@@ -13193,10 +13393,39 @@
               </a:spcBef>
               <a:buNone/>
             </a:pPr>
-            <a:endParaRPr/>
+            <a:r>
+              <a:rPr lang="en"/>
+              <a:t>Paper based statistics</a:t>
+            </a:r>
           </a:p>
         </p:txBody>
       </p:sp>
+      <p:pic>
+        <p:nvPicPr>
+          <p:cNvPr id="1026" name="Picture 2" descr="C:\Users\Aditya Garg\Documents\GitHub\RTBDProject\ResultGraphs\NumPaperComb.png"/>
+          <p:cNvPicPr>
+            <a:picLocks noChangeAspect="1" noChangeArrowheads="1"/>
+          </p:cNvPicPr>
+          <p:nvPr/>
+        </p:nvPicPr>
+        <p:blipFill>
+          <a:blip r:embed="rId3"/>
+          <a:srcRect/>
+          <a:stretch>
+            <a:fillRect/>
+          </a:stretch>
+        </p:blipFill>
+        <p:spPr bwMode="auto">
+          <a:xfrm>
+            <a:off x="2362200" y="950087"/>
+            <a:ext cx="6781800" cy="4193413"/>
+          </a:xfrm>
+          <a:prstGeom prst="rect">
+            <a:avLst/>
+          </a:prstGeom>
+          <a:noFill/>
+        </p:spPr>
+      </p:pic>
     </p:spTree>
   </p:cSld>
   <p:clrMapOvr>

</xml_diff>

<commit_message>
changes to ppt and converted to pdf
</commit_message>
<xml_diff>
--- a/RTBD.pptx
+++ b/RTBD.pptx
@@ -5,7 +5,7 @@
     <p:sldMasterId id="2147483654" r:id="rId1"/>
   </p:sldMasterIdLst>
   <p:notesMasterIdLst>
-    <p:notesMasterId r:id="rId23"/>
+    <p:notesMasterId r:id="rId24"/>
   </p:notesMasterIdLst>
   <p:sldIdLst>
     <p:sldId id="256" r:id="rId2"/>
@@ -29,6 +29,7 @@
     <p:sldId id="278" r:id="rId20"/>
     <p:sldId id="279" r:id="rId21"/>
     <p:sldId id="280" r:id="rId22"/>
+    <p:sldId id="282" r:id="rId23"/>
   </p:sldIdLst>
   <p:sldSz cx="9144000" cy="5143500" type="screen16x9"/>
   <p:notesSz cx="6858000" cy="9144000"/>
@@ -9421,6 +9422,110 @@
 </file>
 
 <file path=ppt/notesSlides/notesSlide21.xml><?xml version="1.0" encoding="utf-8"?>
+<p:notes xmlns:a="http://schemas.openxmlformats.org/drawingml/2006/main" xmlns:r="http://schemas.openxmlformats.org/officeDocument/2006/relationships" xmlns:p="http://schemas.openxmlformats.org/presentationml/2006/main" showMasterSp="0" showMasterPhAnim="0">
+  <p:cSld>
+    <p:spTree>
+      <p:nvGrpSpPr>
+        <p:cNvPr id="1" name="Shape 31"/>
+        <p:cNvGrpSpPr/>
+        <p:nvPr/>
+      </p:nvGrpSpPr>
+      <p:grpSpPr>
+        <a:xfrm>
+          <a:off x="0" y="0"/>
+          <a:ext cx="0" cy="0"/>
+          <a:chOff x="0" y="0"/>
+          <a:chExt cx="0" cy="0"/>
+        </a:xfrm>
+      </p:grpSpPr>
+      <p:sp>
+        <p:nvSpPr>
+          <p:cNvPr id="32" name="Shape 32"/>
+          <p:cNvSpPr>
+            <a:spLocks noGrp="1" noRot="1" noChangeAspect="1"/>
+          </p:cNvSpPr>
+          <p:nvPr>
+            <p:ph type="sldImg" idx="2"/>
+          </p:nvPr>
+        </p:nvSpPr>
+        <p:spPr>
+          <a:xfrm>
+            <a:off x="381000" y="685800"/>
+            <a:ext cx="6096000" cy="3429000"/>
+          </a:xfrm>
+          <a:custGeom>
+            <a:avLst/>
+            <a:gdLst/>
+            <a:ahLst/>
+            <a:cxnLst/>
+            <a:rect l="0" t="0" r="0" b="0"/>
+            <a:pathLst>
+              <a:path w="120000" h="120000" extrusionOk="0">
+                <a:moveTo>
+                  <a:pt x="0" y="0"/>
+                </a:moveTo>
+                <a:lnTo>
+                  <a:pt x="120000" y="0"/>
+                </a:lnTo>
+                <a:lnTo>
+                  <a:pt x="120000" y="120000"/>
+                </a:lnTo>
+                <a:lnTo>
+                  <a:pt x="0" y="120000"/>
+                </a:lnTo>
+                <a:close/>
+              </a:path>
+            </a:pathLst>
+          </a:custGeom>
+        </p:spPr>
+      </p:sp>
+      <p:sp>
+        <p:nvSpPr>
+          <p:cNvPr id="33" name="Shape 33"/>
+          <p:cNvSpPr txBox="1">
+            <a:spLocks noGrp="1"/>
+          </p:cNvSpPr>
+          <p:nvPr>
+            <p:ph type="body" idx="1"/>
+          </p:nvPr>
+        </p:nvSpPr>
+        <p:spPr>
+          <a:xfrm>
+            <a:off x="685800" y="4343400"/>
+            <a:ext cx="5486399" cy="4114800"/>
+          </a:xfrm>
+          <a:prstGeom prst="rect">
+            <a:avLst/>
+          </a:prstGeom>
+        </p:spPr>
+        <p:txBody>
+          <a:bodyPr lIns="91425" tIns="91425" rIns="91425" bIns="91425" anchor="t" anchorCtr="0">
+            <a:noAutofit/>
+          </a:bodyPr>
+          <a:lstStyle/>
+          <a:p>
+            <a:pPr>
+              <a:spcBef>
+                <a:spcPts val="0"/>
+              </a:spcBef>
+              <a:buNone/>
+            </a:pPr>
+            <a:r>
+              <a:rPr lang="en"/>
+              <a:t>Should we mention the things we thought of, but didn’t get working.. like related work/future work?</a:t>
+            </a:r>
+          </a:p>
+        </p:txBody>
+      </p:sp>
+    </p:spTree>
+  </p:cSld>
+  <p:clrMapOvr>
+    <a:masterClrMapping/>
+  </p:clrMapOvr>
+</p:notes>
+</file>
+
+<file path=ppt/notesSlides/notesSlide22.xml><?xml version="1.0" encoding="utf-8"?>
 <p:notes xmlns:a="http://schemas.openxmlformats.org/drawingml/2006/main" xmlns:r="http://schemas.openxmlformats.org/officeDocument/2006/relationships" xmlns:p="http://schemas.openxmlformats.org/presentationml/2006/main" showMasterSp="0" showMasterPhAnim="0">
   <p:cSld>
     <p:spTree>
@@ -12170,8 +12275,8 @@
         </p:nvSpPr>
         <p:spPr>
           <a:xfrm>
-            <a:off x="6629400" y="3638550"/>
-            <a:ext cx="2286000" cy="1274747"/>
+            <a:off x="5867400" y="3638550"/>
+            <a:ext cx="3048000" cy="1274747"/>
           </a:xfrm>
           <a:prstGeom prst="rect">
             <a:avLst/>
@@ -12297,7 +12402,17 @@
                 <a:latin typeface="Times New Roman" pitchFamily="18" charset="0"/>
                 <a:cs typeface="Times New Roman" pitchFamily="18" charset="0"/>
               </a:rPr>
-              <a:t> Ephraim</a:t>
+              <a:t> Mary </a:t>
+            </a:r>
+            <a:r>
+              <a:rPr lang="en-US" sz="2000" dirty="0" smtClean="0">
+                <a:solidFill>
+                  <a:schemeClr val="tx1"/>
+                </a:solidFill>
+                <a:latin typeface="Times New Roman" pitchFamily="18" charset="0"/>
+                <a:cs typeface="Times New Roman" pitchFamily="18" charset="0"/>
+              </a:rPr>
+              <a:t>Ephraim</a:t>
             </a:r>
             <a:endParaRPr sz="2000">
               <a:solidFill>
@@ -13084,7 +13199,7 @@
         <p:spPr>
           <a:xfrm>
             <a:off x="228600" y="1885950"/>
-            <a:ext cx="2819400" cy="2031325"/>
+            <a:ext cx="2819400" cy="2585323"/>
           </a:xfrm>
           <a:prstGeom prst="rect">
             <a:avLst/>
@@ -13129,7 +13244,44 @@
                 <a:latin typeface="Times New Roman" pitchFamily="18" charset="0"/>
                 <a:cs typeface="Times New Roman" pitchFamily="18" charset="0"/>
               </a:rPr>
-              <a:t>Top tier conferences performing better than lower tier</a:t>
+              <a:t>Top tier conferences performing better than lower </a:t>
+            </a:r>
+            <a:r>
+              <a:rPr lang="en-US" sz="1800" dirty="0" smtClean="0">
+                <a:latin typeface="Times New Roman" pitchFamily="18" charset="0"/>
+                <a:cs typeface="Times New Roman" pitchFamily="18" charset="0"/>
+              </a:rPr>
+              <a:t>tier</a:t>
+            </a:r>
+          </a:p>
+          <a:p>
+            <a:pPr algn="just">
+              <a:buFont typeface="Arial" pitchFamily="34" charset="0"/>
+              <a:buChar char="•"/>
+            </a:pPr>
+            <a:endParaRPr lang="en-US" sz="1800" dirty="0" smtClean="0">
+              <a:latin typeface="Times New Roman" pitchFamily="18" charset="0"/>
+              <a:cs typeface="Times New Roman" pitchFamily="18" charset="0"/>
+            </a:endParaRPr>
+          </a:p>
+          <a:p>
+            <a:pPr algn="just">
+              <a:buFont typeface="Arial" pitchFamily="34" charset="0"/>
+              <a:buChar char="•"/>
+            </a:pPr>
+            <a:r>
+              <a:rPr lang="en-US" sz="1800" dirty="0" err="1" smtClean="0">
+                <a:latin typeface="Times New Roman" pitchFamily="18" charset="0"/>
+                <a:cs typeface="Times New Roman" pitchFamily="18" charset="0"/>
+              </a:rPr>
+              <a:t>Lotka</a:t>
+            </a:r>
+            <a:r>
+              <a:rPr lang="en-US" sz="1800" dirty="0" smtClean="0">
+                <a:latin typeface="Times New Roman" pitchFamily="18" charset="0"/>
+                <a:cs typeface="Times New Roman" pitchFamily="18" charset="0"/>
+              </a:rPr>
+              <a:t> Law of 60%</a:t>
             </a:r>
             <a:endParaRPr lang="en-US" sz="1800" dirty="0">
               <a:latin typeface="Times New Roman" pitchFamily="18" charset="0"/>
@@ -15173,6 +15325,162 @@
               <a:buChar char="•"/>
             </a:pPr>
             <a:endParaRPr sz="1400">
+              <a:latin typeface="Times New Roman" pitchFamily="18" charset="0"/>
+              <a:cs typeface="Times New Roman" pitchFamily="18" charset="0"/>
+            </a:endParaRPr>
+          </a:p>
+        </p:txBody>
+      </p:sp>
+    </p:spTree>
+  </p:cSld>
+  <p:clrMapOvr>
+    <a:masterClrMapping/>
+  </p:clrMapOvr>
+  <p:transition spd="slow">
+    <p:cut/>
+  </p:transition>
+  <p:timing>
+    <p:tnLst>
+      <p:par>
+        <p:cTn id="1" dur="indefinite" restart="never" nodeType="tmRoot"/>
+      </p:par>
+    </p:tnLst>
+  </p:timing>
+</p:sld>
+</file>
+
+<file path=ppt/slides/slide22.xml><?xml version="1.0" encoding="utf-8"?>
+<p:sld xmlns:a="http://schemas.openxmlformats.org/drawingml/2006/main" xmlns:r="http://schemas.openxmlformats.org/officeDocument/2006/relationships" xmlns:p="http://schemas.openxmlformats.org/presentationml/2006/main">
+  <p:cSld>
+    <p:spTree>
+      <p:nvGrpSpPr>
+        <p:cNvPr id="1" name="Shape 28"/>
+        <p:cNvGrpSpPr/>
+        <p:nvPr/>
+      </p:nvGrpSpPr>
+      <p:grpSpPr>
+        <a:xfrm>
+          <a:off x="0" y="0"/>
+          <a:ext cx="0" cy="0"/>
+          <a:chOff x="0" y="0"/>
+          <a:chExt cx="0" cy="0"/>
+        </a:xfrm>
+      </p:grpSpPr>
+      <p:sp>
+        <p:nvSpPr>
+          <p:cNvPr id="29" name="Shape 29"/>
+          <p:cNvSpPr txBox="1">
+            <a:spLocks noGrp="1"/>
+          </p:cNvSpPr>
+          <p:nvPr>
+            <p:ph type="title"/>
+          </p:nvPr>
+        </p:nvSpPr>
+        <p:spPr>
+          <a:xfrm>
+            <a:off x="457200" y="205978"/>
+            <a:ext cx="8229600" cy="857400"/>
+          </a:xfrm>
+          <a:prstGeom prst="rect">
+            <a:avLst/>
+          </a:prstGeom>
+        </p:spPr>
+        <p:txBody>
+          <a:bodyPr lIns="91425" tIns="91425" rIns="91425" bIns="91425" anchor="b" anchorCtr="0">
+            <a:noAutofit/>
+          </a:bodyPr>
+          <a:lstStyle/>
+          <a:p>
+            <a:pPr>
+              <a:spcBef>
+                <a:spcPts val="0"/>
+              </a:spcBef>
+              <a:buNone/>
+            </a:pPr>
+            <a:r>
+              <a:rPr lang="en" dirty="0" smtClean="0"/>
+              <a:t>Special Thanks</a:t>
+            </a:r>
+            <a:endParaRPr lang="en" dirty="0"/>
+          </a:p>
+        </p:txBody>
+      </p:sp>
+      <p:sp>
+        <p:nvSpPr>
+          <p:cNvPr id="30" name="Shape 30"/>
+          <p:cNvSpPr txBox="1">
+            <a:spLocks noGrp="1"/>
+          </p:cNvSpPr>
+          <p:nvPr>
+            <p:ph type="body" idx="1"/>
+          </p:nvPr>
+        </p:nvSpPr>
+        <p:spPr>
+          <a:xfrm>
+            <a:off x="457200" y="1200151"/>
+            <a:ext cx="8229600" cy="2514600"/>
+          </a:xfrm>
+          <a:prstGeom prst="rect">
+            <a:avLst/>
+          </a:prstGeom>
+        </p:spPr>
+        <p:txBody>
+          <a:bodyPr lIns="91425" tIns="91425" rIns="91425" bIns="91425" anchor="t" anchorCtr="0">
+            <a:noAutofit/>
+          </a:bodyPr>
+          <a:lstStyle/>
+          <a:p>
+            <a:pPr>
+              <a:buFont typeface="Arial" pitchFamily="34" charset="0"/>
+              <a:buChar char="•"/>
+            </a:pPr>
+            <a:r>
+              <a:rPr lang="en-US" sz="2400" dirty="0" smtClean="0">
+                <a:latin typeface="Times New Roman" pitchFamily="18" charset="0"/>
+                <a:cs typeface="Times New Roman" pitchFamily="18" charset="0"/>
+              </a:rPr>
+              <a:t>Professor McIntosh for her continuous support in providing guidance and data options.</a:t>
+            </a:r>
+          </a:p>
+          <a:p>
+            <a:pPr>
+              <a:buFont typeface="Arial" pitchFamily="34" charset="0"/>
+              <a:buChar char="•"/>
+            </a:pPr>
+            <a:endParaRPr lang="en-US" sz="2400" dirty="0" smtClean="0">
+              <a:latin typeface="Times New Roman" pitchFamily="18" charset="0"/>
+              <a:cs typeface="Times New Roman" pitchFamily="18" charset="0"/>
+            </a:endParaRPr>
+          </a:p>
+          <a:p>
+            <a:pPr>
+              <a:buFont typeface="Arial" pitchFamily="34" charset="0"/>
+              <a:buChar char="•"/>
+            </a:pPr>
+            <a:r>
+              <a:rPr lang="en-US" sz="2400" dirty="0" smtClean="0">
+                <a:latin typeface="Times New Roman" pitchFamily="18" charset="0"/>
+                <a:cs typeface="Times New Roman" pitchFamily="18" charset="0"/>
+              </a:rPr>
+              <a:t>Penn State University</a:t>
+            </a:r>
+          </a:p>
+          <a:p>
+            <a:pPr>
+              <a:buFont typeface="Arial" pitchFamily="34" charset="0"/>
+              <a:buChar char="•"/>
+            </a:pPr>
+            <a:endParaRPr lang="en-US" sz="2400" dirty="0" smtClean="0">
+              <a:latin typeface="Times New Roman" pitchFamily="18" charset="0"/>
+              <a:cs typeface="Times New Roman" pitchFamily="18" charset="0"/>
+            </a:endParaRPr>
+          </a:p>
+          <a:p>
+            <a:pPr>
+              <a:buFont typeface="Arial" pitchFamily="34" charset="0"/>
+              <a:buChar char="•"/>
+            </a:pPr>
+            <a:endParaRPr sz="2400">
               <a:latin typeface="Times New Roman" pitchFamily="18" charset="0"/>
               <a:cs typeface="Times New Roman" pitchFamily="18" charset="0"/>
             </a:endParaRPr>

</xml_diff>

<commit_message>
tiny changes to ppt
</commit_message>
<xml_diff>
--- a/RTBD.pptx
+++ b/RTBD.pptx
@@ -32,7 +32,7 @@
     <p:sldId id="282" r:id="rId23"/>
   </p:sldIdLst>
   <p:sldSz cx="9144000" cy="5143500" type="screen16x9"/>
-  <p:notesSz cx="6858000" cy="9144000"/>
+  <p:notesSz cx="7315200" cy="9601200"/>
   <p:defaultTextStyle>
     <a:defPPr marR="0" algn="l" rtl="0">
       <a:lnSpc>
@@ -1678,11 +1678,11 @@
           </c:val>
         </c:ser>
         <c:marker val="1"/>
-        <c:axId val="75353088"/>
-        <c:axId val="75355264"/>
+        <c:axId val="84532224"/>
+        <c:axId val="84538496"/>
       </c:lineChart>
       <c:catAx>
-        <c:axId val="75353088"/>
+        <c:axId val="84532224"/>
         <c:scaling>
           <c:orientation val="minMax"/>
         </c:scaling>
@@ -1707,14 +1707,14 @@
         </c:title>
         <c:numFmt formatCode="General" sourceLinked="1"/>
         <c:tickLblPos val="nextTo"/>
-        <c:crossAx val="75355264"/>
+        <c:crossAx val="84538496"/>
         <c:crosses val="autoZero"/>
         <c:auto val="1"/>
         <c:lblAlgn val="ctr"/>
         <c:lblOffset val="100"/>
       </c:catAx>
       <c:valAx>
-        <c:axId val="75355264"/>
+        <c:axId val="84538496"/>
         <c:scaling>
           <c:orientation val="minMax"/>
         </c:scaling>
@@ -1740,7 +1740,7 @@
         </c:title>
         <c:numFmt formatCode="General" sourceLinked="1"/>
         <c:tickLblPos val="nextTo"/>
-        <c:crossAx val="75353088"/>
+        <c:crossAx val="84532224"/>
         <c:crosses val="autoZero"/>
         <c:crossBetween val="between"/>
       </c:valAx>
@@ -1757,6 +1757,7 @@
 
 <file path=ppt/charts/chart2.xml><?xml version="1.0" encoding="utf-8"?>
 <c:chartSpace xmlns:c="http://schemas.openxmlformats.org/drawingml/2006/chart" xmlns:a="http://schemas.openxmlformats.org/drawingml/2006/main" xmlns:r="http://schemas.openxmlformats.org/officeDocument/2006/relationships">
+  <c:date1904 val="1"/>
   <c:lang val="en-US"/>
   <c:chart>
     <c:title>
@@ -1961,40 +1962,40 @@
                 <c:formatCode>General</c:formatCode>
                 <c:ptCount val="45"/>
                 <c:pt idx="0">
-                  <c:v>1.5333333</c:v>
+                  <c:v>1.5333332999999998</c:v>
                 </c:pt>
                 <c:pt idx="1">
                   <c:v>1.1000000000000001</c:v>
                 </c:pt>
                 <c:pt idx="2">
-                  <c:v>1.2592592</c:v>
+                  <c:v>1.2592591999999998</c:v>
                 </c:pt>
                 <c:pt idx="3">
-                  <c:v>1.3333333999999999</c:v>
+                  <c:v>1.3333333999999997</c:v>
                 </c:pt>
                 <c:pt idx="4">
                   <c:v>1.2</c:v>
                 </c:pt>
                 <c:pt idx="5">
-                  <c:v>1.2857143</c:v>
+                  <c:v>1.2857142999999998</c:v>
                 </c:pt>
                 <c:pt idx="6">
-                  <c:v>1.1534392</c:v>
+                  <c:v>1.1534391999999998</c:v>
                 </c:pt>
                 <c:pt idx="7">
                   <c:v>1.0277778</c:v>
                 </c:pt>
                 <c:pt idx="8">
-                  <c:v>1.1295336</c:v>
+                  <c:v>1.1295335999999998</c:v>
                 </c:pt>
                 <c:pt idx="9">
-                  <c:v>1.2535886000000001</c:v>
+                  <c:v>1.2535885999999998</c:v>
                 </c:pt>
                 <c:pt idx="10">
                   <c:v>1.1646091000000001</c:v>
                 </c:pt>
                 <c:pt idx="11">
-                  <c:v>1.3133802000000001</c:v>
+                  <c:v>1.3133801999999999</c:v>
                 </c:pt>
                 <c:pt idx="12">
                   <c:v>1.2288135</c:v>
@@ -2003,7 +2004,7 @@
                   <c:v>1.2965880000000001</c:v>
                 </c:pt>
                 <c:pt idx="14">
-                  <c:v>1.2594696999999999</c:v>
+                  <c:v>1.2594696999999995</c:v>
                 </c:pt>
                 <c:pt idx="15">
                   <c:v>1.1790744</c:v>
@@ -2012,19 +2013,19 @@
                   <c:v>1.1752137</c:v>
                 </c:pt>
                 <c:pt idx="17">
-                  <c:v>1.3136426999999999</c:v>
+                  <c:v>1.3136426999999997</c:v>
                 </c:pt>
                 <c:pt idx="18">
-                  <c:v>1.2722062999999999</c:v>
+                  <c:v>1.2722062999999997</c:v>
                 </c:pt>
                 <c:pt idx="19">
-                  <c:v>1.3315216999999999</c:v>
+                  <c:v>1.3315216999999995</c:v>
                 </c:pt>
                 <c:pt idx="20">
                   <c:v>1.3363533000000001</c:v>
                 </c:pt>
                 <c:pt idx="21">
-                  <c:v>1.3136494999999999</c:v>
+                  <c:v>1.3136494999999997</c:v>
                 </c:pt>
                 <c:pt idx="22">
                   <c:v>1.3222221999999999</c:v>
@@ -2042,58 +2043,58 @@
                   <c:v>1.3460608999999999</c:v>
                 </c:pt>
                 <c:pt idx="27">
-                  <c:v>1.3318681999999999</c:v>
+                  <c:v>1.3318681999999997</c:v>
                 </c:pt>
                 <c:pt idx="28">
-                  <c:v>1.3843171999999999</c:v>
+                  <c:v>1.3843172000000001</c:v>
                 </c:pt>
                 <c:pt idx="29">
-                  <c:v>1.3602282000000001</c:v>
+                  <c:v>1.3602281999999999</c:v>
                 </c:pt>
                 <c:pt idx="30">
-                  <c:v>1.4276644999999999</c:v>
+                  <c:v>1.4276644999999994</c:v>
                 </c:pt>
                 <c:pt idx="31">
-                  <c:v>1.4053899000000001</c:v>
+                  <c:v>1.4053898999999999</c:v>
                 </c:pt>
                 <c:pt idx="32">
-                  <c:v>1.4091532</c:v>
+                  <c:v>1.4091531999999998</c:v>
                 </c:pt>
                 <c:pt idx="33">
-                  <c:v>1.4528627000000001</c:v>
+                  <c:v>1.4528626999999998</c:v>
                 </c:pt>
                 <c:pt idx="34">
-                  <c:v>1.4339293</c:v>
+                  <c:v>1.4339292999999995</c:v>
                 </c:pt>
                 <c:pt idx="35">
-                  <c:v>1.4420018999999999</c:v>
+                  <c:v>1.4420018999999997</c:v>
                 </c:pt>
                 <c:pt idx="36">
-                  <c:v>1.4407300000000001</c:v>
+                  <c:v>1.4407299999999998</c:v>
                 </c:pt>
                 <c:pt idx="37">
-                  <c:v>1.4735007</c:v>
+                  <c:v>1.4735006999999998</c:v>
                 </c:pt>
                 <c:pt idx="38">
-                  <c:v>1.4253210999999999</c:v>
+                  <c:v>1.4253210999999995</c:v>
                 </c:pt>
                 <c:pt idx="39">
-                  <c:v>1.4645902</c:v>
+                  <c:v>1.4645901999999997</c:v>
                 </c:pt>
                 <c:pt idx="40">
-                  <c:v>1.456634</c:v>
+                  <c:v>1.4566339999999998</c:v>
                 </c:pt>
                 <c:pt idx="41">
-                  <c:v>1.4192887999999999</c:v>
+                  <c:v>1.4192887999999997</c:v>
                 </c:pt>
                 <c:pt idx="42">
                   <c:v>1.4342088</c:v>
                 </c:pt>
                 <c:pt idx="43">
-                  <c:v>1.3759733000000001</c:v>
+                  <c:v>1.3759732999999998</c:v>
                 </c:pt>
                 <c:pt idx="44">
-                  <c:v>1.4216337999999999</c:v>
+                  <c:v>1.4216337999999995</c:v>
                 </c:pt>
               </c:numCache>
             </c:numRef>
@@ -2267,16 +2268,16 @@
                 <c:formatCode>General</c:formatCode>
                 <c:ptCount val="45"/>
                 <c:pt idx="0">
-                  <c:v>1.5333333</c:v>
+                  <c:v>1.5333332999999998</c:v>
                 </c:pt>
                 <c:pt idx="1">
                   <c:v>1.1000000000000001</c:v>
                 </c:pt>
                 <c:pt idx="2">
-                  <c:v>1.2592592</c:v>
+                  <c:v>1.2592591999999998</c:v>
                 </c:pt>
                 <c:pt idx="3">
-                  <c:v>1.3333333999999999</c:v>
+                  <c:v>1.3333333999999997</c:v>
                 </c:pt>
                 <c:pt idx="4">
                   <c:v>1.2</c:v>
@@ -2294,22 +2295,22 @@
                   <c:v>1.0971428000000001</c:v>
                 </c:pt>
                 <c:pt idx="9">
-                  <c:v>1.2634407999999999</c:v>
+                  <c:v>1.2634407999999997</c:v>
                 </c:pt>
                 <c:pt idx="10">
-                  <c:v>1.0935252</c:v>
+                  <c:v>1.0935251999999998</c:v>
                 </c:pt>
                 <c:pt idx="11">
-                  <c:v>1.3039216</c:v>
+                  <c:v>1.3039215999999996</c:v>
                 </c:pt>
                 <c:pt idx="12">
-                  <c:v>1.1753247</c:v>
+                  <c:v>1.1753246999999998</c:v>
                 </c:pt>
                 <c:pt idx="13">
-                  <c:v>1.2769953000000001</c:v>
+                  <c:v>1.2769952999999998</c:v>
                 </c:pt>
                 <c:pt idx="14">
-                  <c:v>1.2250923</c:v>
+                  <c:v>1.2250922999999998</c:v>
                 </c:pt>
                 <c:pt idx="15">
                   <c:v>1.13486</c:v>
@@ -2318,40 +2319,40 @@
                   <c:v>1.1565657</c:v>
                 </c:pt>
                 <c:pt idx="17">
-                  <c:v>1.2412935</c:v>
+                  <c:v>1.2412934999999998</c:v>
                 </c:pt>
                 <c:pt idx="18">
-                  <c:v>1.2531645</c:v>
+                  <c:v>1.2531644999999998</c:v>
                 </c:pt>
                 <c:pt idx="19">
                   <c:v>1.2227378</c:v>
                 </c:pt>
                 <c:pt idx="20">
-                  <c:v>1.2711443</c:v>
+                  <c:v>1.2711442999999998</c:v>
                 </c:pt>
                 <c:pt idx="21">
-                  <c:v>1.3950617000000001</c:v>
+                  <c:v>1.3950616999999998</c:v>
                 </c:pt>
                 <c:pt idx="22">
-                  <c:v>1.2415254</c:v>
+                  <c:v>1.2415253999999998</c:v>
                 </c:pt>
                 <c:pt idx="23">
                   <c:v>1.3080261</c:v>
                 </c:pt>
                 <c:pt idx="24">
-                  <c:v>1.3378608000000001</c:v>
+                  <c:v>1.3378607999999999</c:v>
                 </c:pt>
                 <c:pt idx="25">
-                  <c:v>1.3412162000000001</c:v>
+                  <c:v>1.3412161999999999</c:v>
                 </c:pt>
                 <c:pt idx="26">
                   <c:v>1.2606708</c:v>
                 </c:pt>
                 <c:pt idx="27">
-                  <c:v>1.3510972000000001</c:v>
+                  <c:v>1.3510971999999999</c:v>
                 </c:pt>
                 <c:pt idx="28">
-                  <c:v>1.3950617000000001</c:v>
+                  <c:v>1.3950616999999998</c:v>
                 </c:pt>
                 <c:pt idx="29">
                   <c:v>1.3694445</c:v>
@@ -2360,31 +2361,31 @@
                   <c:v>1.3577024</c:v>
                 </c:pt>
                 <c:pt idx="31">
-                  <c:v>1.4111842000000001</c:v>
+                  <c:v>1.4111841999999997</c:v>
                 </c:pt>
                 <c:pt idx="32">
-                  <c:v>1.3873044999999999</c:v>
+                  <c:v>1.3873044999999997</c:v>
                 </c:pt>
                 <c:pt idx="33">
-                  <c:v>1.4390638</c:v>
+                  <c:v>1.4390637999999998</c:v>
                 </c:pt>
                 <c:pt idx="34">
-                  <c:v>1.4364680000000001</c:v>
+                  <c:v>1.4364679999999999</c:v>
                 </c:pt>
                 <c:pt idx="35">
-                  <c:v>1.4345238</c:v>
+                  <c:v>1.4345237999999998</c:v>
                 </c:pt>
                 <c:pt idx="36">
                   <c:v>1.3801653</c:v>
                 </c:pt>
                 <c:pt idx="37">
-                  <c:v>1.3787558</c:v>
+                  <c:v>1.3787558000000002</c:v>
                 </c:pt>
                 <c:pt idx="38">
                   <c:v>1.4283129999999999</c:v>
                 </c:pt>
                 <c:pt idx="39">
-                  <c:v>1.4081167000000001</c:v>
+                  <c:v>1.4081166999999999</c:v>
                 </c:pt>
                 <c:pt idx="40">
                   <c:v>1.3248629999999999</c:v>
@@ -2393,10 +2394,10 @@
                   <c:v>1.3101487000000001</c:v>
                 </c:pt>
                 <c:pt idx="42">
-                  <c:v>1.2901889</c:v>
+                  <c:v>1.2901889000000002</c:v>
                 </c:pt>
                 <c:pt idx="43">
-                  <c:v>1.2454756</c:v>
+                  <c:v>1.2454755999999998</c:v>
                 </c:pt>
                 <c:pt idx="44">
                   <c:v>1.2770728</c:v>
@@ -2573,13 +2574,13 @@
                 <c:formatCode>General</c:formatCode>
                 <c:ptCount val="45"/>
                 <c:pt idx="12">
-                  <c:v>1.1458333999999999</c:v>
+                  <c:v>1.1458333999999997</c:v>
                 </c:pt>
                 <c:pt idx="13">
                   <c:v>0</c:v>
                 </c:pt>
                 <c:pt idx="14">
-                  <c:v>1.2134830999999999</c:v>
+                  <c:v>1.2134830999999997</c:v>
                 </c:pt>
                 <c:pt idx="15">
                   <c:v>0</c:v>
@@ -2588,37 +2589,37 @@
                   <c:v>1.1157895</c:v>
                 </c:pt>
                 <c:pt idx="17">
-                  <c:v>1.0317460000000001</c:v>
+                  <c:v>1.0317459999999998</c:v>
                 </c:pt>
                 <c:pt idx="18">
-                  <c:v>1.0434783000000001</c:v>
+                  <c:v>1.0434782999999999</c:v>
                 </c:pt>
                 <c:pt idx="19">
-                  <c:v>1.0762712000000001</c:v>
+                  <c:v>1.0762711999999999</c:v>
                 </c:pt>
                 <c:pt idx="20">
-                  <c:v>1.1066666999999999</c:v>
+                  <c:v>1.1066666999999997</c:v>
                 </c:pt>
                 <c:pt idx="21">
-                  <c:v>1.0438144</c:v>
+                  <c:v>1.0438143999999998</c:v>
                 </c:pt>
                 <c:pt idx="22">
                   <c:v>1.0653154</c:v>
                 </c:pt>
                 <c:pt idx="23">
-                  <c:v>1.0594714000000001</c:v>
+                  <c:v>1.0594713999999998</c:v>
                 </c:pt>
                 <c:pt idx="24">
                   <c:v>1.1578170999999999</c:v>
                 </c:pt>
                 <c:pt idx="25">
-                  <c:v>1.0748298999999999</c:v>
+                  <c:v>1.0748298999999997</c:v>
                 </c:pt>
                 <c:pt idx="26">
                   <c:v>1.1320182000000001</c:v>
                 </c:pt>
                 <c:pt idx="27">
-                  <c:v>1.1224105</c:v>
+                  <c:v>1.1224105000000002</c:v>
                 </c:pt>
                 <c:pt idx="28">
                   <c:v>1.1406883000000001</c:v>
@@ -2630,46 +2631,46 @@
                   <c:v>1.1932007</c:v>
                 </c:pt>
                 <c:pt idx="31">
-                  <c:v>1.1880805000000001</c:v>
+                  <c:v>1.1880805000000003</c:v>
                 </c:pt>
                 <c:pt idx="32">
-                  <c:v>1.1863573000000001</c:v>
+                  <c:v>1.1863573000000003</c:v>
                 </c:pt>
                 <c:pt idx="33">
-                  <c:v>1.1770244999999999</c:v>
+                  <c:v>1.1770244999999997</c:v>
                 </c:pt>
                 <c:pt idx="34">
-                  <c:v>1.1512936</c:v>
+                  <c:v>1.1512935999999998</c:v>
                 </c:pt>
                 <c:pt idx="35">
                   <c:v>1.2283169</c:v>
                 </c:pt>
                 <c:pt idx="36">
-                  <c:v>1.2179253999999999</c:v>
+                  <c:v>1.2179253999999995</c:v>
                 </c:pt>
                 <c:pt idx="37">
-                  <c:v>1.2480916</c:v>
+                  <c:v>1.2480915999999997</c:v>
                 </c:pt>
                 <c:pt idx="38">
-                  <c:v>1.1883891</c:v>
+                  <c:v>1.1883891000000002</c:v>
                 </c:pt>
                 <c:pt idx="39">
-                  <c:v>1.2593714</c:v>
+                  <c:v>1.2593713999999998</c:v>
                 </c:pt>
                 <c:pt idx="40">
                   <c:v>1.3066514</c:v>
                 </c:pt>
                 <c:pt idx="41">
-                  <c:v>1.2787234000000001</c:v>
+                  <c:v>1.2787233999999998</c:v>
                 </c:pt>
                 <c:pt idx="42">
-                  <c:v>1.2653856000000001</c:v>
+                  <c:v>1.2653855999999999</c:v>
                 </c:pt>
                 <c:pt idx="43">
-                  <c:v>1.2610710999999999</c:v>
+                  <c:v>1.2610710999999997</c:v>
                 </c:pt>
                 <c:pt idx="44">
-                  <c:v>1.3033140000000001</c:v>
+                  <c:v>1.3033139999999999</c:v>
                 </c:pt>
               </c:numCache>
             </c:numRef>
@@ -2855,7 +2856,7 @@
                   <c:v>1.02</c:v>
                 </c:pt>
                 <c:pt idx="16">
-                  <c:v>1.0249999999999999</c:v>
+                  <c:v>1.0249999999999997</c:v>
                 </c:pt>
                 <c:pt idx="17">
                   <c:v>1</c:v>
@@ -2867,25 +2868,25 @@
                   <c:v>1</c:v>
                 </c:pt>
                 <c:pt idx="20">
-                  <c:v>1.0754716</c:v>
+                  <c:v>1.0754715999999997</c:v>
                 </c:pt>
                 <c:pt idx="21">
                   <c:v>1</c:v>
                 </c:pt>
                 <c:pt idx="22">
-                  <c:v>1.0472972</c:v>
+                  <c:v>1.0472971999999998</c:v>
                 </c:pt>
                 <c:pt idx="23">
                   <c:v>1.0884955999999999</c:v>
                 </c:pt>
                 <c:pt idx="24">
-                  <c:v>1.0552763999999999</c:v>
+                  <c:v>1.0552763999999997</c:v>
                 </c:pt>
                 <c:pt idx="25">
-                  <c:v>1.1560975</c:v>
+                  <c:v>1.1560975000000002</c:v>
                 </c:pt>
                 <c:pt idx="26">
-                  <c:v>1.0979730000000001</c:v>
+                  <c:v>1.0979729999999999</c:v>
                 </c:pt>
                 <c:pt idx="27">
                   <c:v>1.0607735</c:v>
@@ -2897,22 +2898,22 @@
                   <c:v>1.1442623000000001</c:v>
                 </c:pt>
                 <c:pt idx="30">
-                  <c:v>1.1097045999999999</c:v>
+                  <c:v>1.1097045999999997</c:v>
                 </c:pt>
                 <c:pt idx="31">
-                  <c:v>1.1475694000000001</c:v>
+                  <c:v>1.1475693999999999</c:v>
                 </c:pt>
                 <c:pt idx="32">
                   <c:v>1.1167883000000001</c:v>
                 </c:pt>
                 <c:pt idx="33">
-                  <c:v>1.1203539</c:v>
+                  <c:v>1.1203539000000002</c:v>
                 </c:pt>
                 <c:pt idx="34">
-                  <c:v>1.1584158</c:v>
+                  <c:v>1.1584158000000002</c:v>
                 </c:pt>
                 <c:pt idx="35">
-                  <c:v>1.1191336000000001</c:v>
+                  <c:v>1.1191335999999998</c:v>
                 </c:pt>
                 <c:pt idx="36">
                   <c:v>1.1129848</c:v>
@@ -2933,13 +2934,13 @@
                   <c:v>1.1242361999999999</c:v>
                 </c:pt>
                 <c:pt idx="42">
-                  <c:v>1.1536843000000001</c:v>
+                  <c:v>1.1536842999999999</c:v>
                 </c:pt>
                 <c:pt idx="43">
                   <c:v>1.1225681000000001</c:v>
                 </c:pt>
                 <c:pt idx="44">
-                  <c:v>1.1642157</c:v>
+                  <c:v>1.1642157000000002</c:v>
                 </c:pt>
               </c:numCache>
             </c:numRef>
@@ -3113,13 +3114,13 @@
                 <c:formatCode>General</c:formatCode>
                 <c:ptCount val="45"/>
                 <c:pt idx="17">
-                  <c:v>1.0238096000000001</c:v>
+                  <c:v>1.0238095999999997</c:v>
                 </c:pt>
                 <c:pt idx="18">
-                  <c:v>1.0208333999999999</c:v>
+                  <c:v>1.0208333999999997</c:v>
                 </c:pt>
                 <c:pt idx="19">
-                  <c:v>1.0099009999999999</c:v>
+                  <c:v>1.0099009999999997</c:v>
                 </c:pt>
                 <c:pt idx="20">
                   <c:v>1.125</c:v>
@@ -3128,43 +3129,43 @@
                   <c:v>0</c:v>
                 </c:pt>
                 <c:pt idx="22">
-                  <c:v>1.0972222</c:v>
+                  <c:v>1.0972221999999998</c:v>
                 </c:pt>
                 <c:pt idx="23">
-                  <c:v>1.0543479</c:v>
+                  <c:v>1.0543479000000002</c:v>
                 </c:pt>
                 <c:pt idx="24">
-                  <c:v>1.1666666000000001</c:v>
+                  <c:v>1.1666665999999999</c:v>
                 </c:pt>
                 <c:pt idx="25">
                   <c:v>1.0785123999999999</c:v>
                 </c:pt>
                 <c:pt idx="26">
-                  <c:v>1.0608366</c:v>
+                  <c:v>1.0608365999999998</c:v>
                 </c:pt>
                 <c:pt idx="27">
                   <c:v>1.0372671</c:v>
                 </c:pt>
                 <c:pt idx="28">
-                  <c:v>1.1551155</c:v>
+                  <c:v>1.1551155000000002</c:v>
                 </c:pt>
                 <c:pt idx="29">
                   <c:v>1.0712074</c:v>
                 </c:pt>
                 <c:pt idx="30">
-                  <c:v>1.1218486999999999</c:v>
+                  <c:v>1.1218486999999997</c:v>
                 </c:pt>
                 <c:pt idx="31">
                   <c:v>1.1705810000000001</c:v>
                 </c:pt>
                 <c:pt idx="32">
-                  <c:v>1.1654846999999999</c:v>
+                  <c:v>1.1654846999999997</c:v>
                 </c:pt>
                 <c:pt idx="33">
                   <c:v>1.1066822999999999</c:v>
                 </c:pt>
                 <c:pt idx="34">
-                  <c:v>1.1034482999999999</c:v>
+                  <c:v>1.1034482999999997</c:v>
                 </c:pt>
                 <c:pt idx="35">
                   <c:v>1.1030445</c:v>
@@ -3194,18 +3195,18 @@
                   <c:v>1.0980148000000001</c:v>
                 </c:pt>
                 <c:pt idx="44">
-                  <c:v>1.1192367999999999</c:v>
+                  <c:v>1.1192367999999997</c:v>
                 </c:pt>
               </c:numCache>
             </c:numRef>
           </c:val>
         </c:ser>
         <c:marker val="1"/>
-        <c:axId val="124890112"/>
-        <c:axId val="124908672"/>
+        <c:axId val="84665088"/>
+        <c:axId val="84667008"/>
       </c:lineChart>
       <c:catAx>
-        <c:axId val="124890112"/>
+        <c:axId val="84665088"/>
         <c:scaling>
           <c:orientation val="minMax"/>
         </c:scaling>
@@ -3230,14 +3231,14 @@
         </c:title>
         <c:numFmt formatCode="General" sourceLinked="1"/>
         <c:tickLblPos val="nextTo"/>
-        <c:crossAx val="124908672"/>
+        <c:crossAx val="84667008"/>
         <c:crosses val="autoZero"/>
         <c:auto val="1"/>
         <c:lblAlgn val="ctr"/>
         <c:lblOffset val="100"/>
       </c:catAx>
       <c:valAx>
-        <c:axId val="124908672"/>
+        <c:axId val="84667008"/>
         <c:scaling>
           <c:orientation val="minMax"/>
         </c:scaling>
@@ -3263,7 +3264,7 @@
         </c:title>
         <c:numFmt formatCode="General" sourceLinked="1"/>
         <c:tickLblPos val="nextTo"/>
-        <c:crossAx val="124890112"/>
+        <c:crossAx val="84665088"/>
         <c:crosses val="autoZero"/>
         <c:crossBetween val="between"/>
       </c:valAx>
@@ -3280,6 +3281,7 @@
 
 <file path=ppt/charts/chart3.xml><?xml version="1.0" encoding="utf-8"?>
 <c:chartSpace xmlns:c="http://schemas.openxmlformats.org/drawingml/2006/chart" xmlns:a="http://schemas.openxmlformats.org/drawingml/2006/main" xmlns:r="http://schemas.openxmlformats.org/officeDocument/2006/relationships">
+  <c:date1904 val="1"/>
   <c:lang val="en-US"/>
   <c:chart>
     <c:title>
@@ -3488,25 +3490,25 @@
                 <c:formatCode>General</c:formatCode>
                 <c:ptCount val="45"/>
                 <c:pt idx="0">
-                  <c:v>0.17391305000000001</c:v>
+                  <c:v>0.17391305000000004</c:v>
                 </c:pt>
                 <c:pt idx="1">
-                  <c:v>0.54545456000000003</c:v>
+                  <c:v>0.54545455999999992</c:v>
                 </c:pt>
                 <c:pt idx="2">
-                  <c:v>0.29411766</c:v>
+                  <c:v>0.29411766000000006</c:v>
                 </c:pt>
                 <c:pt idx="3">
                   <c:v>1.1363635999999999</c:v>
                 </c:pt>
                 <c:pt idx="4">
-                  <c:v>0.16666666999999999</c:v>
+                  <c:v>0.16666666999999996</c:v>
                 </c:pt>
                 <c:pt idx="5">
-                  <c:v>0.77777779999999996</c:v>
+                  <c:v>0.77777780000000007</c:v>
                 </c:pt>
                 <c:pt idx="6">
-                  <c:v>1.1743119</c:v>
+                  <c:v>1.1743119000000002</c:v>
                 </c:pt>
                 <c:pt idx="7">
                   <c:v>1.3153154</c:v>
@@ -3515,7 +3517,7 @@
                   <c:v>1.4954128</c:v>
                 </c:pt>
                 <c:pt idx="9">
-                  <c:v>1.1908396000000001</c:v>
+                  <c:v>1.1908395999999999</c:v>
                 </c:pt>
                 <c:pt idx="10">
                   <c:v>2.0989399999999998</c:v>
@@ -3524,16 +3526,16 @@
                   <c:v>1.5335121</c:v>
                 </c:pt>
                 <c:pt idx="12">
-                  <c:v>1.0298849999999999</c:v>
+                  <c:v>1.0298849999999997</c:v>
                 </c:pt>
                 <c:pt idx="13">
-                  <c:v>1.6923077</c:v>
+                  <c:v>1.6923077000000002</c:v>
                 </c:pt>
                 <c:pt idx="14">
-                  <c:v>1.7082706999999999</c:v>
+                  <c:v>1.7082706999999997</c:v>
                 </c:pt>
                 <c:pt idx="15">
-                  <c:v>2.9522184999999999</c:v>
+                  <c:v>2.952218499999999</c:v>
                 </c:pt>
                 <c:pt idx="16">
                   <c:v>1.9163635999999999</c:v>
@@ -3542,22 +3544,22 @@
                   <c:v>2.1970022</c:v>
                 </c:pt>
                 <c:pt idx="18">
-                  <c:v>1.7837837999999999</c:v>
+                  <c:v>1.7837837999999997</c:v>
                 </c:pt>
                 <c:pt idx="19">
-                  <c:v>2.0865307</c:v>
+                  <c:v>2.0865307000000004</c:v>
                 </c:pt>
                 <c:pt idx="20">
-                  <c:v>1.9779660999999999</c:v>
+                  <c:v>1.9779660999999997</c:v>
                 </c:pt>
                 <c:pt idx="21">
                   <c:v>1.9395726</c:v>
                 </c:pt>
                 <c:pt idx="22">
-                  <c:v>1.6845508</c:v>
+                  <c:v>1.6845508000000002</c:v>
                 </c:pt>
                 <c:pt idx="23">
-                  <c:v>1.8872093000000001</c:v>
+                  <c:v>1.8872092999999999</c:v>
                 </c:pt>
                 <c:pt idx="24">
                   <c:v>1.9656085000000001</c:v>
@@ -3572,7 +3574,7 @@
                   <c:v>2.3622112</c:v>
                 </c:pt>
                 <c:pt idx="28">
-                  <c:v>2.4158108</c:v>
+                  <c:v>2.4158107999999996</c:v>
                 </c:pt>
                 <c:pt idx="29">
                   <c:v>2.4032353999999998</c:v>
@@ -3581,34 +3583,34 @@
                   <c:v>2.4905219999999999</c:v>
                 </c:pt>
                 <c:pt idx="31">
-                  <c:v>2.4018766999999999</c:v>
+                  <c:v>2.4018766999999994</c:v>
                 </c:pt>
                 <c:pt idx="32">
                   <c:v>2.463244</c:v>
                 </c:pt>
                 <c:pt idx="33">
-                  <c:v>2.5999660000000002</c:v>
+                  <c:v>2.5999659999999998</c:v>
                 </c:pt>
                 <c:pt idx="34">
-                  <c:v>2.6943429999999999</c:v>
+                  <c:v>2.6943429999999995</c:v>
                 </c:pt>
                 <c:pt idx="35">
-                  <c:v>2.7635770000000002</c:v>
+                  <c:v>2.7635770000000006</c:v>
                 </c:pt>
                 <c:pt idx="36">
-                  <c:v>2.8496174999999999</c:v>
+                  <c:v>2.8496174999999995</c:v>
                 </c:pt>
                 <c:pt idx="37">
                   <c:v>2.6204448</c:v>
                 </c:pt>
                 <c:pt idx="38">
-                  <c:v>2.8344011</c:v>
+                  <c:v>2.8344010999999996</c:v>
                 </c:pt>
                 <c:pt idx="39">
-                  <c:v>2.8538169999999998</c:v>
+                  <c:v>2.8538169999999994</c:v>
                 </c:pt>
                 <c:pt idx="40">
-                  <c:v>2.9095659999999999</c:v>
+                  <c:v>2.9095659999999994</c:v>
                 </c:pt>
                 <c:pt idx="41">
                   <c:v>3.0385646999999998</c:v>
@@ -3794,31 +3796,31 @@
                 <c:formatCode>General</c:formatCode>
                 <c:ptCount val="45"/>
                 <c:pt idx="0">
-                  <c:v>0.17391305000000001</c:v>
+                  <c:v>0.17391305000000004</c:v>
                 </c:pt>
                 <c:pt idx="1">
-                  <c:v>0.54545456000000003</c:v>
+                  <c:v>0.54545455999999992</c:v>
                 </c:pt>
                 <c:pt idx="2">
-                  <c:v>0.29411766</c:v>
+                  <c:v>0.29411766000000006</c:v>
                 </c:pt>
                 <c:pt idx="3">
                   <c:v>1.1363635999999999</c:v>
                 </c:pt>
                 <c:pt idx="4">
-                  <c:v>0.16666666999999999</c:v>
+                  <c:v>0.16666666999999996</c:v>
                 </c:pt>
                 <c:pt idx="5">
-                  <c:v>0.72499999999999998</c:v>
+                  <c:v>0.72500000000000009</c:v>
                 </c:pt>
                 <c:pt idx="6">
-                  <c:v>1.2717949</c:v>
+                  <c:v>1.2717948999999997</c:v>
                 </c:pt>
                 <c:pt idx="7">
                   <c:v>0.86956520000000004</c:v>
                 </c:pt>
                 <c:pt idx="8">
-                  <c:v>1.5416666000000001</c:v>
+                  <c:v>1.5416665999999997</c:v>
                 </c:pt>
                 <c:pt idx="9">
                   <c:v>1.2340424999999999</c:v>
@@ -3833,22 +3835,22 @@
                   <c:v>0.93922649999999996</c:v>
                 </c:pt>
                 <c:pt idx="13">
-                  <c:v>1.4191176999999999</c:v>
+                  <c:v>1.4191176999999997</c:v>
                 </c:pt>
                 <c:pt idx="14">
                   <c:v>1.6385542</c:v>
                 </c:pt>
                 <c:pt idx="15">
-                  <c:v>2.192825</c:v>
+                  <c:v>2.1928249999999996</c:v>
                 </c:pt>
                 <c:pt idx="16">
                   <c:v>1.4061135</c:v>
                 </c:pt>
                 <c:pt idx="17">
-                  <c:v>2.2885770000000001</c:v>
+                  <c:v>2.2885770000000005</c:v>
                 </c:pt>
                 <c:pt idx="18">
-                  <c:v>1.5838383</c:v>
+                  <c:v>1.5838382999999998</c:v>
                 </c:pt>
                 <c:pt idx="19">
                   <c:v>1.9582542000000001</c:v>
@@ -3860,43 +3862,43 @@
                   <c:v>1.8761061000000001</c:v>
                 </c:pt>
                 <c:pt idx="22">
-                  <c:v>1.7542663000000001</c:v>
+                  <c:v>1.7542662999999998</c:v>
                 </c:pt>
                 <c:pt idx="23">
-                  <c:v>1.7545606</c:v>
+                  <c:v>1.7545605999999998</c:v>
                 </c:pt>
                 <c:pt idx="24">
-                  <c:v>2.2081217999999998</c:v>
+                  <c:v>2.2081218000000007</c:v>
                 </c:pt>
                 <c:pt idx="25">
                   <c:v>3.2745593</c:v>
                 </c:pt>
                 <c:pt idx="26">
-                  <c:v>2.43289</c:v>
+                  <c:v>2.4328899999999996</c:v>
                 </c:pt>
                 <c:pt idx="27">
                   <c:v>2.9071924999999998</c:v>
                 </c:pt>
                 <c:pt idx="28">
-                  <c:v>3.2920353000000002</c:v>
+                  <c:v>3.2920352999999998</c:v>
                 </c:pt>
                 <c:pt idx="29">
                   <c:v>3.0385396</c:v>
                 </c:pt>
                 <c:pt idx="30">
-                  <c:v>3.4365385000000002</c:v>
+                  <c:v>3.4365384999999997</c:v>
                 </c:pt>
                 <c:pt idx="31">
                   <c:v>3.006993</c:v>
                 </c:pt>
                 <c:pt idx="32">
-                  <c:v>3.0331564000000002</c:v>
+                  <c:v>3.0331563999999998</c:v>
                 </c:pt>
                 <c:pt idx="33">
                   <c:v>3.2540662</c:v>
                 </c:pt>
                 <c:pt idx="34">
-                  <c:v>3.2573713999999998</c:v>
+                  <c:v>3.2573714000000002</c:v>
                 </c:pt>
                 <c:pt idx="35">
                   <c:v>3.1304748</c:v>
@@ -3905,7 +3907,7 @@
                   <c:v>3.3807678000000001</c:v>
                 </c:pt>
                 <c:pt idx="37">
-                  <c:v>2.8305709999999999</c:v>
+                  <c:v>2.8305709999999995</c:v>
                 </c:pt>
                 <c:pt idx="38">
                   <c:v>3.0557314999999998</c:v>
@@ -3917,10 +3919,10 @@
                   <c:v>3.2824369999999998</c:v>
                 </c:pt>
                 <c:pt idx="41">
-                  <c:v>3.3916528000000001</c:v>
+                  <c:v>3.3916527999999992</c:v>
                 </c:pt>
                 <c:pt idx="42">
-                  <c:v>3.4116387000000001</c:v>
+                  <c:v>3.4116386999999997</c:v>
                 </c:pt>
                 <c:pt idx="43">
                   <c:v>3.6609538000000001</c:v>
@@ -4106,7 +4108,7 @@
                   <c:v>0</c:v>
                 </c:pt>
                 <c:pt idx="14">
-                  <c:v>2.0185184</c:v>
+                  <c:v>2.0185183999999996</c:v>
                 </c:pt>
                 <c:pt idx="15">
                   <c:v>0</c:v>
@@ -4115,43 +4117,43 @@
                   <c:v>1.6792452</c:v>
                 </c:pt>
                 <c:pt idx="17">
-                  <c:v>2.8307693</c:v>
+                  <c:v>2.8307692999999996</c:v>
                 </c:pt>
                 <c:pt idx="18">
-                  <c:v>0.16666666999999999</c:v>
+                  <c:v>0.16666666999999996</c:v>
                 </c:pt>
                 <c:pt idx="19">
-                  <c:v>1.9842519999999999</c:v>
+                  <c:v>1.9842520000000001</c:v>
                 </c:pt>
                 <c:pt idx="20">
                   <c:v>2.1144577999999998</c:v>
                 </c:pt>
                 <c:pt idx="21">
-                  <c:v>1.6296295999999999</c:v>
+                  <c:v>1.6296295999999997</c:v>
                 </c:pt>
                 <c:pt idx="22">
                   <c:v>1.7885835000000001</c:v>
                 </c:pt>
                 <c:pt idx="23">
-                  <c:v>1.7297298000000001</c:v>
+                  <c:v>1.7297297999999997</c:v>
                 </c:pt>
                 <c:pt idx="24">
                   <c:v>1.9057325000000001</c:v>
                 </c:pt>
                 <c:pt idx="25">
-                  <c:v>2.3955696</c:v>
+                  <c:v>2.3955695999999995</c:v>
                 </c:pt>
                 <c:pt idx="26">
-                  <c:v>2.1179624000000001</c:v>
+                  <c:v>2.1179623999999997</c:v>
                 </c:pt>
                 <c:pt idx="27">
-                  <c:v>2.1308725000000002</c:v>
+                  <c:v>2.1308724999999997</c:v>
                 </c:pt>
                 <c:pt idx="28">
-                  <c:v>2.094055</c:v>
+                  <c:v>2.0940549999999996</c:v>
                 </c:pt>
                 <c:pt idx="29">
-                  <c:v>2.007533</c:v>
+                  <c:v>2.0075330000000005</c:v>
                 </c:pt>
                 <c:pt idx="30">
                   <c:v>2.1250868000000001</c:v>
@@ -4160,7 +4162,7 @@
                   <c:v>2.2644951</c:v>
                 </c:pt>
                 <c:pt idx="32">
-                  <c:v>2.2133965</c:v>
+                  <c:v>2.2133965000000004</c:v>
                 </c:pt>
                 <c:pt idx="33">
                   <c:v>2.4949333999999999</c:v>
@@ -4169,34 +4171,34 @@
                   <c:v>2.6888130000000001</c:v>
                 </c:pt>
                 <c:pt idx="35">
-                  <c:v>2.7335877000000002</c:v>
+                  <c:v>2.7335877000000006</c:v>
                 </c:pt>
                 <c:pt idx="36">
-                  <c:v>2.5760179000000001</c:v>
+                  <c:v>2.5760178999999996</c:v>
                 </c:pt>
                 <c:pt idx="37">
-                  <c:v>2.6123853000000001</c:v>
+                  <c:v>2.6123852999999997</c:v>
                 </c:pt>
                 <c:pt idx="38">
-                  <c:v>2.5719829999999999</c:v>
+                  <c:v>2.5719829999999995</c:v>
                 </c:pt>
                 <c:pt idx="39">
-                  <c:v>2.5315694999999998</c:v>
+                  <c:v>2.5315694999999994</c:v>
                 </c:pt>
                 <c:pt idx="40">
                   <c:v>2.888938</c:v>
                 </c:pt>
                 <c:pt idx="41">
-                  <c:v>2.9545994000000002</c:v>
+                  <c:v>2.9545993999999998</c:v>
                 </c:pt>
                 <c:pt idx="42">
-                  <c:v>2.8023766999999999</c:v>
+                  <c:v>2.8023766999999995</c:v>
                 </c:pt>
                 <c:pt idx="43">
                   <c:v>2.9869335000000001</c:v>
                 </c:pt>
                 <c:pt idx="44">
-                  <c:v>3.1696430000000002</c:v>
+                  <c:v>3.1696429999999998</c:v>
                 </c:pt>
               </c:numCache>
             </c:numRef>
@@ -4373,19 +4375,19 @@
                   <c:v>1.3</c:v>
                 </c:pt>
                 <c:pt idx="13">
-                  <c:v>2.2941177000000001</c:v>
+                  <c:v>2.2941177000000006</c:v>
                 </c:pt>
                 <c:pt idx="14">
                   <c:v>0</c:v>
                 </c:pt>
                 <c:pt idx="15">
-                  <c:v>10.862745</c:v>
+                  <c:v>10.862745000000002</c:v>
                 </c:pt>
                 <c:pt idx="16">
-                  <c:v>6.9756099999999996</c:v>
+                  <c:v>6.9756100000000005</c:v>
                 </c:pt>
                 <c:pt idx="17">
-                  <c:v>1.9</c:v>
+                  <c:v>1.9000000000000001</c:v>
                 </c:pt>
                 <c:pt idx="18">
                   <c:v>0</c:v>
@@ -4397,19 +4399,19 @@
                   <c:v>2</c:v>
                 </c:pt>
                 <c:pt idx="21">
-                  <c:v>1.548387</c:v>
+                  <c:v>1.5483870000000002</c:v>
                 </c:pt>
                 <c:pt idx="22">
                   <c:v>1.8580645</c:v>
                 </c:pt>
                 <c:pt idx="23">
-                  <c:v>1.9674796999999999</c:v>
+                  <c:v>1.9674796999999997</c:v>
                 </c:pt>
                 <c:pt idx="24">
                   <c:v>2.2571428</c:v>
                 </c:pt>
                 <c:pt idx="25">
-                  <c:v>1.5021096</c:v>
+                  <c:v>1.5021095999999998</c:v>
                 </c:pt>
                 <c:pt idx="26">
                   <c:v>2.7076924</c:v>
@@ -4418,34 +4420,34 @@
                   <c:v>2.1458333000000001</c:v>
                 </c:pt>
                 <c:pt idx="28">
-                  <c:v>1.9771428</c:v>
+                  <c:v>1.9771428000000002</c:v>
                 </c:pt>
                 <c:pt idx="29">
-                  <c:v>2.1318052000000001</c:v>
+                  <c:v>2.1318051999999996</c:v>
                 </c:pt>
                 <c:pt idx="30">
                   <c:v>2.0038022999999998</c:v>
                 </c:pt>
                 <c:pt idx="31">
-                  <c:v>2.3721633</c:v>
+                  <c:v>2.3721632999999995</c:v>
                 </c:pt>
                 <c:pt idx="32">
                   <c:v>2.1176472</c:v>
                 </c:pt>
                 <c:pt idx="33">
-                  <c:v>2.1516587999999999</c:v>
+                  <c:v>2.1516587999999994</c:v>
                 </c:pt>
                 <c:pt idx="34">
-                  <c:v>2.0410256000000002</c:v>
+                  <c:v>2.0410255999999998</c:v>
                 </c:pt>
                 <c:pt idx="35">
                   <c:v>2.1451614000000001</c:v>
                 </c:pt>
                 <c:pt idx="36">
-                  <c:v>2.3060605999999999</c:v>
+                  <c:v>2.3060605999999995</c:v>
                 </c:pt>
                 <c:pt idx="37">
-                  <c:v>2.2163590000000002</c:v>
+                  <c:v>2.2163589999999997</c:v>
                 </c:pt>
                 <c:pt idx="38">
                   <c:v>2.2852350000000001</c:v>
@@ -4460,10 +4462,10 @@
                   <c:v>2.3913042999999998</c:v>
                 </c:pt>
                 <c:pt idx="42">
-                  <c:v>2.4927008000000002</c:v>
+                  <c:v>2.4927007999999997</c:v>
                 </c:pt>
                 <c:pt idx="43">
-                  <c:v>2.4263431999999998</c:v>
+                  <c:v>2.4263431999999994</c:v>
                 </c:pt>
                 <c:pt idx="44">
                   <c:v>2.9642105000000001</c:v>
@@ -4640,10 +4642,10 @@
                 <c:formatCode>General</c:formatCode>
                 <c:ptCount val="45"/>
                 <c:pt idx="17">
-                  <c:v>2.4186046000000001</c:v>
+                  <c:v>2.4186045999999997</c:v>
                 </c:pt>
                 <c:pt idx="18">
-                  <c:v>1.2653061000000001</c:v>
+                  <c:v>1.2653060999999999</c:v>
                 </c:pt>
                 <c:pt idx="19">
                   <c:v>3.5882353999999999</c:v>
@@ -4658,13 +4660,13 @@
                   <c:v>1.1392405000000001</c:v>
                 </c:pt>
                 <c:pt idx="23">
-                  <c:v>1.6597938999999999</c:v>
+                  <c:v>1.6597938999999997</c:v>
                 </c:pt>
                 <c:pt idx="24">
-                  <c:v>2.2142856000000002</c:v>
+                  <c:v>2.2142855999999997</c:v>
                 </c:pt>
                 <c:pt idx="25">
-                  <c:v>1.4942529</c:v>
+                  <c:v>1.4942529000000002</c:v>
                 </c:pt>
                 <c:pt idx="26">
                   <c:v>1.9354838000000001</c:v>
@@ -4676,10 +4678,10 @@
                   <c:v>1.8742856999999999</c:v>
                 </c:pt>
                 <c:pt idx="29">
-                  <c:v>2.0635838999999998</c:v>
+                  <c:v>2.0635839000000002</c:v>
                 </c:pt>
                 <c:pt idx="30">
-                  <c:v>2.2696629000000001</c:v>
+                  <c:v>2.2696628999999997</c:v>
                 </c:pt>
                 <c:pt idx="31">
                   <c:v>1.8986273</c:v>
@@ -4694,31 +4696,31 @@
                   <c:v>2.2455356000000002</c:v>
                 </c:pt>
                 <c:pt idx="35">
-                  <c:v>2.3248408</c:v>
+                  <c:v>2.3248407999999996</c:v>
                 </c:pt>
                 <c:pt idx="36">
-                  <c:v>2.3941069000000001</c:v>
+                  <c:v>2.3941068999999997</c:v>
                 </c:pt>
                 <c:pt idx="37">
-                  <c:v>2.4412664999999998</c:v>
+                  <c:v>2.4412664999999993</c:v>
                 </c:pt>
                 <c:pt idx="38">
-                  <c:v>2.3614090000000001</c:v>
+                  <c:v>2.3614089999999996</c:v>
                 </c:pt>
                 <c:pt idx="39">
-                  <c:v>2.3622048000000002</c:v>
+                  <c:v>2.3622047999999998</c:v>
                 </c:pt>
                 <c:pt idx="40">
-                  <c:v>2.7175370000000001</c:v>
+                  <c:v>2.7175370000000005</c:v>
                 </c:pt>
                 <c:pt idx="41">
                   <c:v>2.1294363000000001</c:v>
                 </c:pt>
                 <c:pt idx="42">
-                  <c:v>2.8550932000000002</c:v>
+                  <c:v>2.8550931999999998</c:v>
                 </c:pt>
                 <c:pt idx="43">
-                  <c:v>2.5514123</c:v>
+                  <c:v>2.5514122999999995</c:v>
                 </c:pt>
                 <c:pt idx="44">
                   <c:v>2.4375</c:v>
@@ -4728,11 +4730,11 @@
           </c:val>
         </c:ser>
         <c:marker val="1"/>
-        <c:axId val="43252352"/>
-        <c:axId val="53412608"/>
+        <c:axId val="85354752"/>
+        <c:axId val="85361024"/>
       </c:lineChart>
       <c:catAx>
-        <c:axId val="43252352"/>
+        <c:axId val="85354752"/>
         <c:scaling>
           <c:orientation val="minMax"/>
         </c:scaling>
@@ -4757,14 +4759,14 @@
         </c:title>
         <c:numFmt formatCode="General" sourceLinked="1"/>
         <c:tickLblPos val="nextTo"/>
-        <c:crossAx val="53412608"/>
+        <c:crossAx val="85361024"/>
         <c:crosses val="autoZero"/>
         <c:auto val="1"/>
         <c:lblAlgn val="ctr"/>
         <c:lblOffset val="100"/>
       </c:catAx>
       <c:valAx>
-        <c:axId val="53412608"/>
+        <c:axId val="85361024"/>
         <c:scaling>
           <c:orientation val="minMax"/>
         </c:scaling>
@@ -4790,7 +4792,7 @@
         </c:title>
         <c:numFmt formatCode="General" sourceLinked="1"/>
         <c:tickLblPos val="nextTo"/>
-        <c:crossAx val="43252352"/>
+        <c:crossAx val="85354752"/>
         <c:crosses val="autoZero"/>
         <c:crossBetween val="between"/>
       </c:valAx>
@@ -4807,6 +4809,7 @@
 
 <file path=ppt/charts/chart4.xml><?xml version="1.0" encoding="utf-8"?>
 <c:chartSpace xmlns:c="http://schemas.openxmlformats.org/drawingml/2006/chart" xmlns:a="http://schemas.openxmlformats.org/drawingml/2006/main" xmlns:r="http://schemas.openxmlformats.org/officeDocument/2006/relationships">
+  <c:date1904 val="1"/>
   <c:lang val="en-US"/>
   <c:chart>
     <c:title>
@@ -5018,13 +5021,13 @@
                   <c:v>0.90476190000000001</c:v>
                 </c:pt>
                 <c:pt idx="1">
-                  <c:v>0.72</c:v>
+                  <c:v>0.72000000000000008</c:v>
                 </c:pt>
                 <c:pt idx="2">
-                  <c:v>0.82758622999999998</c:v>
+                  <c:v>0.82758622999999987</c:v>
                 </c:pt>
                 <c:pt idx="3">
-                  <c:v>0.59259260000000002</c:v>
+                  <c:v>0.59259259999999991</c:v>
                 </c:pt>
                 <c:pt idx="4">
                   <c:v>0.90909094000000001</c:v>
@@ -5036,31 +5039,31 @@
                   <c:v>0.5496183</c:v>
                 </c:pt>
                 <c:pt idx="7">
-                  <c:v>0.46774194000000002</c:v>
+                  <c:v>0.46774193999999997</c:v>
                 </c:pt>
                 <c:pt idx="8">
                   <c:v>0.48760330000000002</c:v>
                 </c:pt>
                 <c:pt idx="9">
-                  <c:v>0.59627330000000001</c:v>
+                  <c:v>0.5962732999999999</c:v>
                 </c:pt>
                 <c:pt idx="10">
-                  <c:v>0.46308726</c:v>
+                  <c:v>0.46308726000000006</c:v>
                 </c:pt>
                 <c:pt idx="11">
                   <c:v>0.57603689999999996</c:v>
                 </c:pt>
                 <c:pt idx="12">
-                  <c:v>0.54307114999999995</c:v>
+                  <c:v>0.54307114999999984</c:v>
                 </c:pt>
                 <c:pt idx="13">
-                  <c:v>0.49450549999999999</c:v>
+                  <c:v>0.4945055000000001</c:v>
                 </c:pt>
                 <c:pt idx="14">
                   <c:v>0.43323442000000001</c:v>
                 </c:pt>
                 <c:pt idx="15">
-                  <c:v>0.39852399999999999</c:v>
+                  <c:v>0.39852400000000016</c:v>
                 </c:pt>
                 <c:pt idx="16">
                   <c:v>0.4014337</c:v>
@@ -5069,22 +5072,22 @@
                   <c:v>0.40178570000000002</c:v>
                 </c:pt>
                 <c:pt idx="18">
-                  <c:v>0.35071089999999999</c:v>
+                  <c:v>0.3507109000000001</c:v>
                 </c:pt>
                 <c:pt idx="19">
-                  <c:v>0.29945551999999998</c:v>
+                  <c:v>0.29945552000000003</c:v>
                 </c:pt>
                 <c:pt idx="20">
-                  <c:v>0.33211678</c:v>
+                  <c:v>0.33211678000000011</c:v>
                 </c:pt>
                 <c:pt idx="21">
-                  <c:v>0.29508197000000003</c:v>
+                  <c:v>0.29508197000000014</c:v>
                 </c:pt>
                 <c:pt idx="22">
-                  <c:v>0.29542302999999998</c:v>
+                  <c:v>0.29542303000000003</c:v>
                 </c:pt>
                 <c:pt idx="23">
-                  <c:v>0.32115867999999997</c:v>
+                  <c:v>0.32115868000000009</c:v>
                 </c:pt>
                 <c:pt idx="24">
                   <c:v>0.27709612</c:v>
@@ -5096,58 +5099,58 @@
                   <c:v>0.21908126999999999</c:v>
                 </c:pt>
                 <c:pt idx="27">
-                  <c:v>0.24220374</c:v>
+                  <c:v>0.24220374000000003</c:v>
                 </c:pt>
                 <c:pt idx="28">
-                  <c:v>0.19274193000000001</c:v>
+                  <c:v>0.19274193000000003</c:v>
                 </c:pt>
                 <c:pt idx="29">
-                  <c:v>0.17367170000000001</c:v>
+                  <c:v>0.17367169999999998</c:v>
                 </c:pt>
                 <c:pt idx="30">
-                  <c:v>0.1802974</c:v>
+                  <c:v>0.18029740000000005</c:v>
                 </c:pt>
                 <c:pt idx="31">
                   <c:v>0.1883746</c:v>
                 </c:pt>
                 <c:pt idx="32">
-                  <c:v>0.16648993000000001</c:v>
+                  <c:v>0.16648993000000004</c:v>
                 </c:pt>
                 <c:pt idx="33">
                   <c:v>0.15242164999999999</c:v>
                 </c:pt>
                 <c:pt idx="34">
-                  <c:v>0.15173596</c:v>
+                  <c:v>0.15173596000000003</c:v>
                 </c:pt>
                 <c:pt idx="35">
-                  <c:v>0.1095008</c:v>
+                  <c:v>0.10950080000000001</c:v>
                 </c:pt>
                 <c:pt idx="36">
-                  <c:v>0.10484178</c:v>
+                  <c:v>0.10484178000000001</c:v>
                 </c:pt>
                 <c:pt idx="37">
-                  <c:v>9.1723399999999997E-2</c:v>
+                  <c:v>9.1723400000000024E-2</c:v>
                 </c:pt>
                 <c:pt idx="38">
-                  <c:v>8.5435583999999995E-2</c:v>
+                  <c:v>8.5435584000000009E-2</c:v>
                 </c:pt>
                 <c:pt idx="39">
                   <c:v>0.103067905</c:v>
                 </c:pt>
                 <c:pt idx="40">
-                  <c:v>9.3842514000000002E-2</c:v>
+                  <c:v>9.3842513999999988E-2</c:v>
                 </c:pt>
                 <c:pt idx="41">
-                  <c:v>9.5622899999999997E-2</c:v>
+                  <c:v>9.5622900000000038E-2</c:v>
                 </c:pt>
                 <c:pt idx="42">
-                  <c:v>9.1988130000000001E-2</c:v>
+                  <c:v>9.1988129999999987E-2</c:v>
                 </c:pt>
                 <c:pt idx="43">
-                  <c:v>7.9018260000000007E-2</c:v>
+                  <c:v>7.9018260000000021E-2</c:v>
                 </c:pt>
                 <c:pt idx="44">
-                  <c:v>8.2352939999999999E-2</c:v>
+                  <c:v>8.2352940000000027E-2</c:v>
                 </c:pt>
               </c:numCache>
             </c:numRef>
@@ -5324,25 +5327,25 @@
                   <c:v>0.90476190000000001</c:v>
                 </c:pt>
                 <c:pt idx="1">
-                  <c:v>0.72</c:v>
+                  <c:v>0.72000000000000008</c:v>
                 </c:pt>
                 <c:pt idx="2">
-                  <c:v>0.82758622999999998</c:v>
+                  <c:v>0.82758622999999987</c:v>
                 </c:pt>
                 <c:pt idx="3">
-                  <c:v>0.59259260000000002</c:v>
+                  <c:v>0.59259259999999991</c:v>
                 </c:pt>
                 <c:pt idx="4">
                   <c:v>0.90909094000000001</c:v>
                 </c:pt>
                 <c:pt idx="5">
-                  <c:v>0.6181818</c:v>
+                  <c:v>0.61818180000000011</c:v>
                 </c:pt>
                 <c:pt idx="6">
-                  <c:v>0.48648649999999999</c:v>
+                  <c:v>0.48648650000000015</c:v>
                 </c:pt>
                 <c:pt idx="7">
-                  <c:v>0.48837209999999998</c:v>
+                  <c:v>0.48837210000000009</c:v>
                 </c:pt>
                 <c:pt idx="8">
                   <c:v>0.48113210000000001</c:v>
@@ -5357,31 +5360,31 @@
                   <c:v>0.57046980000000003</c:v>
                 </c:pt>
                 <c:pt idx="12">
-                  <c:v>0.63865550000000004</c:v>
+                  <c:v>0.63865550000000015</c:v>
                 </c:pt>
                 <c:pt idx="13">
                   <c:v>0.44966444</c:v>
                 </c:pt>
                 <c:pt idx="14">
-                  <c:v>0.43195265999999999</c:v>
+                  <c:v>0.4319526600000001</c:v>
                 </c:pt>
                 <c:pt idx="15">
-                  <c:v>0.37962963999999999</c:v>
+                  <c:v>0.3796296400000001</c:v>
                 </c:pt>
                 <c:pt idx="16">
-                  <c:v>0.28947368000000001</c:v>
+                  <c:v>0.28947368000000007</c:v>
                 </c:pt>
                 <c:pt idx="17">
-                  <c:v>0.31838566000000001</c:v>
+                  <c:v>0.31838566000000013</c:v>
                 </c:pt>
                 <c:pt idx="18">
-                  <c:v>0.33744857</c:v>
+                  <c:v>0.33744857000000011</c:v>
                 </c:pt>
                 <c:pt idx="19">
-                  <c:v>0.29387753999999999</c:v>
+                  <c:v>0.2938775400000001</c:v>
                 </c:pt>
                 <c:pt idx="20">
-                  <c:v>0.37354084999999998</c:v>
+                  <c:v>0.37354085000000004</c:v>
                 </c:pt>
                 <c:pt idx="21">
                   <c:v>0.26104417000000002</c:v>
@@ -5399,28 +5402,28 @@
                   <c:v>0.23129252</c:v>
                 </c:pt>
                 <c:pt idx="26">
-                  <c:v>0.22291021</c:v>
+                  <c:v>0.22291021000000003</c:v>
                 </c:pt>
                 <c:pt idx="27">
                   <c:v>0.24437300000000001</c:v>
                 </c:pt>
                 <c:pt idx="28">
-                  <c:v>0.11784512</c:v>
+                  <c:v>0.11784512000000001</c:v>
                 </c:pt>
                 <c:pt idx="29">
-                  <c:v>0.21159421</c:v>
+                  <c:v>0.21159421000000003</c:v>
                 </c:pt>
                 <c:pt idx="30">
-                  <c:v>0.19943820000000001</c:v>
+                  <c:v>0.19943820000000004</c:v>
                 </c:pt>
                 <c:pt idx="31">
                   <c:v>0.18013857</c:v>
                 </c:pt>
                 <c:pt idx="32">
-                  <c:v>0.18091450000000001</c:v>
+                  <c:v>0.18091450000000003</c:v>
                 </c:pt>
                 <c:pt idx="33">
-                  <c:v>0.19275123</c:v>
+                  <c:v>0.19275123000000002</c:v>
                 </c:pt>
                 <c:pt idx="34">
                   <c:v>0.17530487</c:v>
@@ -5429,31 +5432,31 @@
                   <c:v>0.12063952999999999</c:v>
                 </c:pt>
                 <c:pt idx="36">
-                  <c:v>8.4023669999999995E-2</c:v>
+                  <c:v>8.4023670000000023E-2</c:v>
                 </c:pt>
                 <c:pt idx="37">
                   <c:v>6.9101679999999999E-2</c:v>
                 </c:pt>
                 <c:pt idx="38">
-                  <c:v>5.9322033000000003E-2</c:v>
+                  <c:v>5.9322033000000017E-2</c:v>
                 </c:pt>
                 <c:pt idx="39">
-                  <c:v>8.8552914999999996E-2</c:v>
+                  <c:v>8.8552915000000024E-2</c:v>
                 </c:pt>
                 <c:pt idx="40">
-                  <c:v>8.4398979999999998E-2</c:v>
+                  <c:v>8.4398980000000026E-2</c:v>
                 </c:pt>
                 <c:pt idx="41">
-                  <c:v>7.6833524E-2</c:v>
+                  <c:v>7.6833524000000014E-2</c:v>
                 </c:pt>
                 <c:pt idx="42">
-                  <c:v>5.9113300000000001E-2</c:v>
+                  <c:v>5.9113300000000008E-2</c:v>
                 </c:pt>
                 <c:pt idx="43">
-                  <c:v>7.9118030000000006E-2</c:v>
+                  <c:v>7.911803000000002E-2</c:v>
                 </c:pt>
                 <c:pt idx="44">
-                  <c:v>8.7008340000000003E-2</c:v>
+                  <c:v>8.7008340000000017E-2</c:v>
                 </c:pt>
               </c:numCache>
             </c:numRef>
@@ -5627,19 +5630,19 @@
                 <c:formatCode>General</c:formatCode>
                 <c:ptCount val="45"/>
                 <c:pt idx="12">
-                  <c:v>0.52238804000000005</c:v>
+                  <c:v>0.52238803999999994</c:v>
                 </c:pt>
                 <c:pt idx="13">
                   <c:v>0</c:v>
                 </c:pt>
                 <c:pt idx="14">
-                  <c:v>0.48214287</c:v>
+                  <c:v>0.48214287000000006</c:v>
                 </c:pt>
                 <c:pt idx="15">
                   <c:v>0</c:v>
                 </c:pt>
                 <c:pt idx="16">
-                  <c:v>0.41818179999999999</c:v>
+                  <c:v>0.4181818000000001</c:v>
                 </c:pt>
                 <c:pt idx="17">
                   <c:v>0.52173910000000001</c:v>
@@ -5651,22 +5654,22 @@
                   <c:v>0.2982456</c:v>
                 </c:pt>
                 <c:pt idx="20">
-                  <c:v>0.31034482000000002</c:v>
+                  <c:v>0.31034482000000008</c:v>
                 </c:pt>
                 <c:pt idx="21">
-                  <c:v>0.31282051999999999</c:v>
+                  <c:v>0.31282052000000016</c:v>
                 </c:pt>
                 <c:pt idx="22">
                   <c:v>0.27014217000000001</c:v>
                 </c:pt>
                 <c:pt idx="23">
-                  <c:v>0.26146789999999998</c:v>
+                  <c:v>0.26146790000000003</c:v>
                 </c:pt>
                 <c:pt idx="24">
-                  <c:v>0.21276596</c:v>
+                  <c:v>0.21276596000000003</c:v>
                 </c:pt>
                 <c:pt idx="25">
-                  <c:v>0.18431373000000001</c:v>
+                  <c:v>0.18431373000000004</c:v>
                 </c:pt>
                 <c:pt idx="26">
                   <c:v>0.17567568</c:v>
@@ -5675,34 +5678,34 @@
                   <c:v>0.17826085999999999</c:v>
                 </c:pt>
                 <c:pt idx="28">
-                  <c:v>0.22004356999999999</c:v>
+                  <c:v>0.22004356999999997</c:v>
                 </c:pt>
                 <c:pt idx="29">
-                  <c:v>0.15914490000000001</c:v>
+                  <c:v>0.15914490000000003</c:v>
                 </c:pt>
                 <c:pt idx="30">
-                  <c:v>0.17406749999999999</c:v>
+                  <c:v>0.17406750000000001</c:v>
                 </c:pt>
                 <c:pt idx="31">
-                  <c:v>0.18398637000000001</c:v>
+                  <c:v>0.18398637000000004</c:v>
                 </c:pt>
                 <c:pt idx="32">
                   <c:v>0.13333333999999999</c:v>
                 </c:pt>
                 <c:pt idx="33">
-                  <c:v>0.123664126</c:v>
+                  <c:v>0.12366412600000003</c:v>
                 </c:pt>
                 <c:pt idx="34">
-                  <c:v>0.12569061000000001</c:v>
+                  <c:v>0.12569060999999998</c:v>
                 </c:pt>
                 <c:pt idx="35">
-                  <c:v>7.0438799999999996E-2</c:v>
+                  <c:v>7.043880000000001E-2</c:v>
                 </c:pt>
                 <c:pt idx="36">
                   <c:v>8.7912089999999998E-2</c:v>
                 </c:pt>
                 <c:pt idx="37">
-                  <c:v>7.7464790000000006E-2</c:v>
+                  <c:v>7.7464790000000019E-2</c:v>
                 </c:pt>
                 <c:pt idx="38">
                   <c:v>7.7223849999999997E-2</c:v>
@@ -5714,16 +5717,16 @@
                   <c:v>6.5201980000000007E-2</c:v>
                 </c:pt>
                 <c:pt idx="41">
-                  <c:v>6.9400630000000005E-2</c:v>
+                  <c:v>6.9400630000000033E-2</c:v>
                 </c:pt>
                 <c:pt idx="42">
-                  <c:v>7.9131654999999995E-2</c:v>
+                  <c:v>7.9131655000000009E-2</c:v>
                 </c:pt>
                 <c:pt idx="43">
-                  <c:v>4.5170259999999997E-2</c:v>
+                  <c:v>4.517025999999999E-2</c:v>
                 </c:pt>
                 <c:pt idx="44">
-                  <c:v>6.005398E-2</c:v>
+                  <c:v>6.0053980000000014E-2</c:v>
                 </c:pt>
               </c:numCache>
             </c:numRef>
@@ -5897,7 +5900,7 @@
                 <c:formatCode>General</c:formatCode>
                 <c:ptCount val="45"/>
                 <c:pt idx="12">
-                  <c:v>0.54545456000000003</c:v>
+                  <c:v>0.54545455999999992</c:v>
                 </c:pt>
                 <c:pt idx="13">
                   <c:v>0.4</c:v>
@@ -5912,7 +5915,7 @@
                   <c:v>0.25</c:v>
                 </c:pt>
                 <c:pt idx="17">
-                  <c:v>0.75</c:v>
+                  <c:v>0.75000000000000011</c:v>
                 </c:pt>
                 <c:pt idx="18">
                   <c:v>0</c:v>
@@ -5921,7 +5924,7 @@
                   <c:v>0.4</c:v>
                 </c:pt>
                 <c:pt idx="20">
-                  <c:v>0.17391305000000001</c:v>
+                  <c:v>0.17391305000000004</c:v>
                 </c:pt>
                 <c:pt idx="21">
                   <c:v>0.4</c:v>
@@ -5930,10 +5933,10 @@
                   <c:v>0.23880596000000001</c:v>
                 </c:pt>
                 <c:pt idx="23">
-                  <c:v>0.17307692999999999</c:v>
+                  <c:v>0.17307692999999996</c:v>
                 </c:pt>
                 <c:pt idx="24">
-                  <c:v>0.28735632</c:v>
+                  <c:v>0.28735632000000005</c:v>
                 </c:pt>
                 <c:pt idx="25">
                   <c:v>0.30769232000000002</c:v>
@@ -5945,7 +5948,7 @@
                   <c:v>0.25301205999999998</c:v>
                 </c:pt>
                 <c:pt idx="28">
-                  <c:v>0.21379310000000001</c:v>
+                  <c:v>0.21379310000000004</c:v>
                 </c:pt>
                 <c:pt idx="29">
                   <c:v>0.13235295</c:v>
@@ -5954,43 +5957,43 @@
                   <c:v>0.19354837999999999</c:v>
                 </c:pt>
                 <c:pt idx="31">
-                  <c:v>0.14741035999999999</c:v>
+                  <c:v>0.14741036000000002</c:v>
                 </c:pt>
                 <c:pt idx="32">
                   <c:v>0.13559321999999999</c:v>
                 </c:pt>
                 <c:pt idx="33">
-                  <c:v>0.123931624</c:v>
+                  <c:v>0.12393162400000002</c:v>
                 </c:pt>
                 <c:pt idx="34">
-                  <c:v>0.14096916000000001</c:v>
+                  <c:v>0.14096916000000004</c:v>
                 </c:pt>
                 <c:pt idx="35">
-                  <c:v>0.11814346000000001</c:v>
+                  <c:v>0.11814346000000002</c:v>
                 </c:pt>
                 <c:pt idx="36">
-                  <c:v>0.11965812000000001</c:v>
+                  <c:v>0.11965812000000002</c:v>
                 </c:pt>
                 <c:pt idx="37">
-                  <c:v>9.2592590000000002E-2</c:v>
+                  <c:v>9.2592590000000016E-2</c:v>
                 </c:pt>
                 <c:pt idx="38">
-                  <c:v>0.10232558</c:v>
+                  <c:v>0.10232558000000001</c:v>
                 </c:pt>
                 <c:pt idx="39">
-                  <c:v>0.17777778</c:v>
+                  <c:v>0.17777778000000002</c:v>
                 </c:pt>
                 <c:pt idx="40">
-                  <c:v>0.15879828000000001</c:v>
+                  <c:v>0.15879828000000007</c:v>
                 </c:pt>
                 <c:pt idx="41">
-                  <c:v>0.16915422999999999</c:v>
+                  <c:v>0.16915422999999996</c:v>
                 </c:pt>
                 <c:pt idx="42">
-                  <c:v>0.15706806000000001</c:v>
+                  <c:v>0.15706806000000004</c:v>
                 </c:pt>
                 <c:pt idx="43">
-                  <c:v>0.13592233000000001</c:v>
+                  <c:v>0.13592233000000004</c:v>
                 </c:pt>
                 <c:pt idx="44">
                   <c:v>8.4415585000000001E-2</c:v>
@@ -6173,10 +6176,10 @@
                   <c:v>0.30769232000000002</c:v>
                 </c:pt>
                 <c:pt idx="19">
-                  <c:v>0.31578946000000002</c:v>
+                  <c:v>0.31578946000000008</c:v>
                 </c:pt>
                 <c:pt idx="20">
-                  <c:v>0.48749999999999999</c:v>
+                  <c:v>0.4875000000000001</c:v>
                 </c:pt>
                 <c:pt idx="21">
                   <c:v>0</c:v>
@@ -6188,28 +6191,28 @@
                   <c:v>0.38775510000000002</c:v>
                 </c:pt>
                 <c:pt idx="24">
-                  <c:v>0.21739130000000001</c:v>
+                  <c:v>0.21739130000000004</c:v>
                 </c:pt>
                 <c:pt idx="25">
                   <c:v>0.40151515999999998</c:v>
                 </c:pt>
                 <c:pt idx="26">
-                  <c:v>0.26271185000000002</c:v>
+                  <c:v>0.26271184999999997</c:v>
                 </c:pt>
                 <c:pt idx="27">
-                  <c:v>0.36708861999999998</c:v>
+                  <c:v>0.36708862000000009</c:v>
                 </c:pt>
                 <c:pt idx="28">
-                  <c:v>0.25165564000000001</c:v>
+                  <c:v>0.25165563999999996</c:v>
                 </c:pt>
                 <c:pt idx="29">
                   <c:v>0.29333332000000001</c:v>
                 </c:pt>
                 <c:pt idx="30">
-                  <c:v>0.15686275</c:v>
+                  <c:v>0.15686275000000002</c:v>
                 </c:pt>
                 <c:pt idx="31">
-                  <c:v>0.19035532999999999</c:v>
+                  <c:v>0.19035532999999996</c:v>
                 </c:pt>
                 <c:pt idx="32">
                   <c:v>0.18421051999999999</c:v>
@@ -6218,28 +6221,28 @@
                   <c:v>0.19125684000000001</c:v>
                 </c:pt>
                 <c:pt idx="34">
-                  <c:v>0.13173652999999999</c:v>
+                  <c:v>0.13173652999999996</c:v>
                 </c:pt>
                 <c:pt idx="35">
-                  <c:v>0.14845939</c:v>
+                  <c:v>0.14845939000000005</c:v>
                 </c:pt>
                 <c:pt idx="36">
-                  <c:v>0.15979381000000001</c:v>
+                  <c:v>0.15979381000000004</c:v>
                 </c:pt>
                 <c:pt idx="37">
                   <c:v>0.105882354</c:v>
                 </c:pt>
                 <c:pt idx="38">
-                  <c:v>8.9686096000000007E-2</c:v>
+                  <c:v>8.9686096000000021E-2</c:v>
                 </c:pt>
                 <c:pt idx="39">
-                  <c:v>0.15948276</c:v>
+                  <c:v>0.15948276000000003</c:v>
                 </c:pt>
                 <c:pt idx="40">
-                  <c:v>9.1666670000000006E-2</c:v>
+                  <c:v>9.166667000000002E-2</c:v>
                 </c:pt>
                 <c:pt idx="41">
-                  <c:v>0.15384616000000001</c:v>
+                  <c:v>0.15384616000000004</c:v>
                 </c:pt>
                 <c:pt idx="42">
                   <c:v>0.13675213999999999</c:v>
@@ -6248,18 +6251,18 @@
                   <c:v>0.10891089</c:v>
                 </c:pt>
                 <c:pt idx="44">
-                  <c:v>9.1286309999999996E-2</c:v>
+                  <c:v>9.1286310000000009E-2</c:v>
                 </c:pt>
               </c:numCache>
             </c:numRef>
           </c:val>
         </c:ser>
         <c:marker val="1"/>
-        <c:axId val="51605504"/>
-        <c:axId val="51607424"/>
+        <c:axId val="85233664"/>
+        <c:axId val="85235584"/>
       </c:lineChart>
       <c:catAx>
-        <c:axId val="51605504"/>
+        <c:axId val="85233664"/>
         <c:scaling>
           <c:orientation val="minMax"/>
         </c:scaling>
@@ -6284,14 +6287,14 @@
         </c:title>
         <c:numFmt formatCode="General" sourceLinked="1"/>
         <c:tickLblPos val="nextTo"/>
-        <c:crossAx val="51607424"/>
+        <c:crossAx val="85235584"/>
         <c:crosses val="autoZero"/>
         <c:auto val="1"/>
         <c:lblAlgn val="ctr"/>
         <c:lblOffset val="100"/>
       </c:catAx>
       <c:valAx>
-        <c:axId val="51607424"/>
+        <c:axId val="85235584"/>
         <c:scaling>
           <c:orientation val="minMax"/>
         </c:scaling>
@@ -6317,7 +6320,7 @@
         </c:title>
         <c:numFmt formatCode="General" sourceLinked="1"/>
         <c:tickLblPos val="nextTo"/>
-        <c:crossAx val="51605504"/>
+        <c:crossAx val="85233664"/>
         <c:crosses val="autoZero"/>
         <c:crossBetween val="between"/>
       </c:valAx>
@@ -6542,70 +6545,70 @@
                 <c:formatCode>General</c:formatCode>
                 <c:ptCount val="45"/>
                 <c:pt idx="0">
-                  <c:v>0.39473686000000002</c:v>
+                  <c:v>0.39473686000000008</c:v>
                 </c:pt>
                 <c:pt idx="1">
-                  <c:v>0.43103448</c:v>
+                  <c:v>0.43103448000000005</c:v>
                 </c:pt>
                 <c:pt idx="2">
-                  <c:v>0.39285713</c:v>
+                  <c:v>0.39285713000000005</c:v>
                 </c:pt>
                 <c:pt idx="3">
                   <c:v>0.35294120000000001</c:v>
                 </c:pt>
                 <c:pt idx="4">
-                  <c:v>0.33333333999999998</c:v>
+                  <c:v>0.33333334000000003</c:v>
                 </c:pt>
                 <c:pt idx="5">
-                  <c:v>0.38285713999999998</c:v>
+                  <c:v>0.38285714000000004</c:v>
                 </c:pt>
                 <c:pt idx="6">
-                  <c:v>0.42021278000000001</c:v>
+                  <c:v>0.42021278000000006</c:v>
                 </c:pt>
                 <c:pt idx="7">
                   <c:v>0.4</c:v>
                 </c:pt>
                 <c:pt idx="8">
-                  <c:v>0.4043716</c:v>
+                  <c:v>0.40437160000000005</c:v>
                 </c:pt>
                 <c:pt idx="9">
-                  <c:v>0.34499999999999997</c:v>
+                  <c:v>0.34500000000000003</c:v>
                 </c:pt>
                 <c:pt idx="10">
-                  <c:v>0.34490739999999998</c:v>
+                  <c:v>0.34490740000000003</c:v>
                 </c:pt>
                 <c:pt idx="11">
-                  <c:v>0.32549729999999999</c:v>
+                  <c:v>0.3254973000000001</c:v>
                 </c:pt>
                 <c:pt idx="12">
-                  <c:v>0.35650887999999997</c:v>
+                  <c:v>0.35650888000000008</c:v>
                 </c:pt>
                 <c:pt idx="13">
-                  <c:v>0.3090909</c:v>
+                  <c:v>0.30909090000000006</c:v>
                 </c:pt>
                 <c:pt idx="14">
-                  <c:v>0.33366733999999998</c:v>
+                  <c:v>0.33366734000000003</c:v>
                 </c:pt>
                 <c:pt idx="15">
-                  <c:v>0.33484676000000002</c:v>
+                  <c:v>0.33484676000000013</c:v>
                 </c:pt>
                 <c:pt idx="16">
                   <c:v>0.30904523</c:v>
                 </c:pt>
                 <c:pt idx="17">
-                  <c:v>0.29615672999999998</c:v>
+                  <c:v>0.29615673000000003</c:v>
                 </c:pt>
                 <c:pt idx="18">
-                  <c:v>0.30078739999999998</c:v>
+                  <c:v>0.30078740000000004</c:v>
                 </c:pt>
                 <c:pt idx="19">
                   <c:v>0.28613054999999998</c:v>
                 </c:pt>
                 <c:pt idx="20">
-                  <c:v>0.26111459999999997</c:v>
+                  <c:v>0.26111460000000003</c:v>
                 </c:pt>
                 <c:pt idx="21">
-                  <c:v>0.28541337999999999</c:v>
+                  <c:v>0.28541338000000011</c:v>
                 </c:pt>
                 <c:pt idx="22">
                   <c:v>0.28610983000000001</c:v>
@@ -6614,13 +6617,13 @@
                   <c:v>0.28393005999999998</c:v>
                 </c:pt>
                 <c:pt idx="24">
-                  <c:v>0.28114104000000001</c:v>
+                  <c:v>0.28114103999999995</c:v>
                 </c:pt>
                 <c:pt idx="25">
-                  <c:v>0.28283426</c:v>
+                  <c:v>0.28283426000000006</c:v>
                 </c:pt>
                 <c:pt idx="26">
-                  <c:v>0.27681119999999998</c:v>
+                  <c:v>0.27681120000000004</c:v>
                 </c:pt>
                 <c:pt idx="27">
                   <c:v>0.26723096000000002</c:v>
@@ -6632,49 +6635,49 @@
                   <c:v>0.26990375</c:v>
                 </c:pt>
                 <c:pt idx="30">
-                  <c:v>0.25944539999999999</c:v>
+                  <c:v>0.25944540000000005</c:v>
                 </c:pt>
                 <c:pt idx="31">
-                  <c:v>0.27752396000000001</c:v>
+                  <c:v>0.27752396000000007</c:v>
                 </c:pt>
                 <c:pt idx="32">
                   <c:v>0.26793850000000002</c:v>
                 </c:pt>
                 <c:pt idx="33">
-                  <c:v>0.26292726</c:v>
+                  <c:v>0.26292726000000005</c:v>
                 </c:pt>
                 <c:pt idx="34">
                   <c:v>0.27176080000000002</c:v>
                 </c:pt>
                 <c:pt idx="35">
-                  <c:v>0.26227534000000002</c:v>
+                  <c:v>0.26227533999999997</c:v>
                 </c:pt>
                 <c:pt idx="36">
                   <c:v>0.26093808000000002</c:v>
                 </c:pt>
                 <c:pt idx="37">
-                  <c:v>0.25572382999999999</c:v>
+                  <c:v>0.25572383000000004</c:v>
                 </c:pt>
                 <c:pt idx="38">
-                  <c:v>0.26038070000000002</c:v>
+                  <c:v>0.26038070000000008</c:v>
                 </c:pt>
                 <c:pt idx="39">
-                  <c:v>0.2389471</c:v>
+                  <c:v>0.23894710000000005</c:v>
                 </c:pt>
                 <c:pt idx="40">
                   <c:v>0.24907141999999999</c:v>
                 </c:pt>
                 <c:pt idx="41">
-                  <c:v>0.24722503000000001</c:v>
+                  <c:v>0.24722503000000004</c:v>
                 </c:pt>
                 <c:pt idx="42">
-                  <c:v>0.24600504000000001</c:v>
+                  <c:v>0.24600504000000004</c:v>
                 </c:pt>
                 <c:pt idx="43">
                   <c:v>0.2606097</c:v>
                 </c:pt>
                 <c:pt idx="44">
-                  <c:v>0.25238840000000001</c:v>
+                  <c:v>0.25238840000000007</c:v>
                 </c:pt>
               </c:numCache>
             </c:numRef>
@@ -6848,70 +6851,70 @@
                 <c:formatCode>General</c:formatCode>
                 <c:ptCount val="45"/>
                 <c:pt idx="0">
-                  <c:v>0.39473686000000002</c:v>
+                  <c:v>0.39473686000000008</c:v>
                 </c:pt>
                 <c:pt idx="1">
-                  <c:v>0.43103448</c:v>
+                  <c:v>0.43103448000000005</c:v>
                 </c:pt>
                 <c:pt idx="2">
-                  <c:v>0.39285713</c:v>
+                  <c:v>0.39285713000000005</c:v>
                 </c:pt>
                 <c:pt idx="3">
                   <c:v>0.35294120000000001</c:v>
                 </c:pt>
                 <c:pt idx="4">
-                  <c:v>0.33333333999999998</c:v>
+                  <c:v>0.33333334000000003</c:v>
                 </c:pt>
                 <c:pt idx="5">
-                  <c:v>0.375</c:v>
+                  <c:v>0.37500000000000006</c:v>
                 </c:pt>
                 <c:pt idx="6">
-                  <c:v>0.43478260000000002</c:v>
+                  <c:v>0.43478260000000007</c:v>
                 </c:pt>
                 <c:pt idx="7">
                   <c:v>0.41025642000000001</c:v>
                 </c:pt>
                 <c:pt idx="8">
-                  <c:v>0.42168674</c:v>
+                  <c:v>0.42168674000000006</c:v>
                 </c:pt>
                 <c:pt idx="9">
-                  <c:v>0.35792350000000001</c:v>
+                  <c:v>0.35792350000000006</c:v>
                 </c:pt>
                 <c:pt idx="10">
-                  <c:v>0.35593219999999998</c:v>
+                  <c:v>0.35593220000000003</c:v>
                 </c:pt>
                 <c:pt idx="11">
-                  <c:v>0.32658228</c:v>
+                  <c:v>0.32658228000000011</c:v>
                 </c:pt>
                 <c:pt idx="12">
-                  <c:v>0.32962963000000001</c:v>
+                  <c:v>0.32962963000000006</c:v>
                 </c:pt>
                 <c:pt idx="13">
-                  <c:v>0.30788802999999998</c:v>
+                  <c:v>0.30788803000000009</c:v>
                 </c:pt>
                 <c:pt idx="14">
-                  <c:v>0.33600000000000002</c:v>
+                  <c:v>0.33600000000000008</c:v>
                 </c:pt>
                 <c:pt idx="15">
-                  <c:v>0.35362317999999998</c:v>
+                  <c:v>0.35362318000000004</c:v>
                 </c:pt>
                 <c:pt idx="16">
-                  <c:v>0.29102167000000001</c:v>
+                  <c:v>0.29102167000000007</c:v>
                 </c:pt>
                 <c:pt idx="17">
-                  <c:v>0.30014025999999999</c:v>
+                  <c:v>0.30014026000000005</c:v>
                 </c:pt>
                 <c:pt idx="18">
-                  <c:v>0.30183357</c:v>
+                  <c:v>0.30183357000000005</c:v>
                 </c:pt>
                 <c:pt idx="19">
-                  <c:v>0.28396739999999998</c:v>
+                  <c:v>0.28396740000000004</c:v>
                 </c:pt>
                 <c:pt idx="20">
-                  <c:v>0.24631268000000001</c:v>
+                  <c:v>0.24631268000000003</c:v>
                 </c:pt>
                 <c:pt idx="21">
-                  <c:v>0.23337856000000001</c:v>
+                  <c:v>0.23337855999999998</c:v>
                 </c:pt>
                 <c:pt idx="22">
                   <c:v>0.26289308</c:v>
@@ -6920,40 +6923,40 @@
                   <c:v>0.25371285999999998</c:v>
                 </c:pt>
                 <c:pt idx="24">
-                  <c:v>0.26697673999999999</c:v>
+                  <c:v>0.2669767400000001</c:v>
                 </c:pt>
                 <c:pt idx="25">
-                  <c:v>0.26070765000000001</c:v>
+                  <c:v>0.26070764999999996</c:v>
                 </c:pt>
                 <c:pt idx="26">
                   <c:v>0.27709790000000001</c:v>
                 </c:pt>
                 <c:pt idx="27">
-                  <c:v>0.25303291999999999</c:v>
+                  <c:v>0.25303292000000005</c:v>
                 </c:pt>
                 <c:pt idx="28">
-                  <c:v>0.25474033000000001</c:v>
+                  <c:v>0.25474032999999996</c:v>
                 </c:pt>
                 <c:pt idx="29">
-                  <c:v>0.25132876999999998</c:v>
+                  <c:v>0.25132877000000009</c:v>
                 </c:pt>
                 <c:pt idx="30">
-                  <c:v>0.24909746999999999</c:v>
+                  <c:v>0.24909747000000002</c:v>
                 </c:pt>
                 <c:pt idx="31">
                   <c:v>0.26161790000000001</c:v>
                 </c:pt>
                 <c:pt idx="32">
-                  <c:v>0.27079304999999998</c:v>
+                  <c:v>0.27079304999999992</c:v>
                 </c:pt>
                 <c:pt idx="33">
                   <c:v>0.26866284000000001</c:v>
                 </c:pt>
                 <c:pt idx="34">
-                  <c:v>0.26271185000000002</c:v>
+                  <c:v>0.26271184999999997</c:v>
                 </c:pt>
                 <c:pt idx="35">
-                  <c:v>0.25591766999999999</c:v>
+                  <c:v>0.2559176700000001</c:v>
                 </c:pt>
                 <c:pt idx="36">
                   <c:v>0.28071954999999998</c:v>
@@ -6962,10 +6965,10 @@
                   <c:v>0.28911194000000001</c:v>
                 </c:pt>
                 <c:pt idx="38">
-                  <c:v>0.25641629999999999</c:v>
+                  <c:v>0.2564163000000001</c:v>
                 </c:pt>
                 <c:pt idx="39">
-                  <c:v>0.24902724000000001</c:v>
+                  <c:v>0.24902724000000004</c:v>
                 </c:pt>
                 <c:pt idx="40">
                   <c:v>0.25933146000000001</c:v>
@@ -6980,7 +6983,7 @@
                   <c:v>0.28862974000000002</c:v>
                 </c:pt>
                 <c:pt idx="44">
-                  <c:v>0.27636625999999997</c:v>
+                  <c:v>0.27636626000000003</c:v>
                 </c:pt>
               </c:numCache>
             </c:numRef>
@@ -7160,7 +7163,7 @@
                   <c:v>0</c:v>
                 </c:pt>
                 <c:pt idx="14">
-                  <c:v>0.39664804999999997</c:v>
+                  <c:v>0.39664805000000003</c:v>
                 </c:pt>
                 <c:pt idx="15">
                   <c:v>0</c:v>
@@ -7169,88 +7172,88 @@
                   <c:v>0.45360824</c:v>
                 </c:pt>
                 <c:pt idx="17">
-                  <c:v>0.43231439999999999</c:v>
+                  <c:v>0.43231440000000015</c:v>
                 </c:pt>
                 <c:pt idx="18">
-                  <c:v>0.47826087</c:v>
+                  <c:v>0.47826087000000006</c:v>
                 </c:pt>
                 <c:pt idx="19">
-                  <c:v>0.42792794000000001</c:v>
+                  <c:v>0.42792794000000006</c:v>
                 </c:pt>
                 <c:pt idx="20">
                   <c:v>0.42659760000000002</c:v>
                 </c:pt>
                 <c:pt idx="21">
-                  <c:v>0.42225393999999999</c:v>
+                  <c:v>0.42225394000000005</c:v>
                 </c:pt>
                 <c:pt idx="22">
                   <c:v>0.40428212000000002</c:v>
                 </c:pt>
                 <c:pt idx="23">
-                  <c:v>0.39572865000000002</c:v>
+                  <c:v>0.39572865000000007</c:v>
                 </c:pt>
                 <c:pt idx="24">
-                  <c:v>0.38527800000000001</c:v>
+                  <c:v>0.38527800000000006</c:v>
                 </c:pt>
                 <c:pt idx="25">
-                  <c:v>0.37301588000000002</c:v>
+                  <c:v>0.37301588000000008</c:v>
                 </c:pt>
                 <c:pt idx="26">
-                  <c:v>0.33094170000000001</c:v>
+                  <c:v>0.33094170000000006</c:v>
                 </c:pt>
                 <c:pt idx="27">
                   <c:v>0.34216334999999998</c:v>
                 </c:pt>
                 <c:pt idx="28">
-                  <c:v>0.36756453</c:v>
+                  <c:v>0.36756453000000006</c:v>
                 </c:pt>
                 <c:pt idx="29">
-                  <c:v>0.33666459999999998</c:v>
+                  <c:v>0.33666460000000009</c:v>
                 </c:pt>
                 <c:pt idx="30">
-                  <c:v>0.33502771999999997</c:v>
+                  <c:v>0.33502772000000008</c:v>
                 </c:pt>
                 <c:pt idx="31">
-                  <c:v>0.33318852999999998</c:v>
+                  <c:v>0.33318853000000009</c:v>
                 </c:pt>
                 <c:pt idx="32">
-                  <c:v>0.33055556000000003</c:v>
+                  <c:v>0.33055556000000014</c:v>
                 </c:pt>
                 <c:pt idx="33">
-                  <c:v>0.33815741999999999</c:v>
+                  <c:v>0.3381574200000001</c:v>
                 </c:pt>
                 <c:pt idx="34">
-                  <c:v>0.34454050000000003</c:v>
+                  <c:v>0.34454050000000008</c:v>
                 </c:pt>
                 <c:pt idx="35">
-                  <c:v>0.32456817999999998</c:v>
+                  <c:v>0.32456818000000009</c:v>
                 </c:pt>
                 <c:pt idx="36">
-                  <c:v>0.32107532</c:v>
+                  <c:v>0.32107532000000005</c:v>
                 </c:pt>
                 <c:pt idx="37">
-                  <c:v>0.31139772999999998</c:v>
+                  <c:v>0.31139773000000004</c:v>
                 </c:pt>
                 <c:pt idx="38">
-                  <c:v>0.33797386000000001</c:v>
+                  <c:v>0.33797386000000013</c:v>
                 </c:pt>
                 <c:pt idx="39">
-                  <c:v>0.31095919999999999</c:v>
+                  <c:v>0.3109592000000001</c:v>
                 </c:pt>
                 <c:pt idx="40">
-                  <c:v>0.29828359999999998</c:v>
+                  <c:v>0.29828360000000004</c:v>
                 </c:pt>
                 <c:pt idx="41">
-                  <c:v>0.29460092999999998</c:v>
+                  <c:v>0.29460093000000004</c:v>
                 </c:pt>
                 <c:pt idx="42">
-                  <c:v>0.28699197999999998</c:v>
+                  <c:v>0.28699198000000004</c:v>
                 </c:pt>
                 <c:pt idx="43">
-                  <c:v>0.29229880000000003</c:v>
+                  <c:v>0.29229880000000008</c:v>
                 </c:pt>
                 <c:pt idx="44">
-                  <c:v>0.28225133000000002</c:v>
+                  <c:v>0.28225132999999997</c:v>
                 </c:pt>
               </c:numCache>
             </c:numRef>
@@ -7427,40 +7430,40 @@
                   <c:v>0.5</c:v>
                 </c:pt>
                 <c:pt idx="13">
-                  <c:v>0.46031746000000001</c:v>
+                  <c:v>0.46031746000000007</c:v>
                 </c:pt>
                 <c:pt idx="14">
                   <c:v>0</c:v>
                 </c:pt>
                 <c:pt idx="15">
-                  <c:v>0.45161289999999998</c:v>
+                  <c:v>0.45161290000000004</c:v>
                 </c:pt>
                 <c:pt idx="16">
                   <c:v>0.41428572000000002</c:v>
                 </c:pt>
                 <c:pt idx="17">
-                  <c:v>0.42857142999999998</c:v>
+                  <c:v>0.42857143000000003</c:v>
                 </c:pt>
                 <c:pt idx="18">
                   <c:v>0</c:v>
                 </c:pt>
                 <c:pt idx="19">
-                  <c:v>0.44117646999999999</c:v>
+                  <c:v>0.4411764700000001</c:v>
                 </c:pt>
                 <c:pt idx="20">
-                  <c:v>0.48181816999999999</c:v>
+                  <c:v>0.48181817000000016</c:v>
                 </c:pt>
                 <c:pt idx="21">
-                  <c:v>0.42592594</c:v>
+                  <c:v>0.42592594000000006</c:v>
                 </c:pt>
                 <c:pt idx="22">
-                  <c:v>0.45229681999999999</c:v>
+                  <c:v>0.45229682000000004</c:v>
                 </c:pt>
                 <c:pt idx="23">
                   <c:v>0.44594594999999998</c:v>
                 </c:pt>
                 <c:pt idx="24">
-                  <c:v>0.43548387</c:v>
+                  <c:v>0.43548387000000011</c:v>
                 </c:pt>
                 <c:pt idx="25">
                   <c:v>0.4</c:v>
@@ -7472,13 +7475,13 @@
                   <c:v>0.4</c:v>
                 </c:pt>
                 <c:pt idx="28">
-                  <c:v>0.41176469999999998</c:v>
+                  <c:v>0.41176470000000004</c:v>
                 </c:pt>
                 <c:pt idx="29">
-                  <c:v>0.36545454999999999</c:v>
+                  <c:v>0.3654545500000001</c:v>
                 </c:pt>
                 <c:pt idx="30">
-                  <c:v>0.40698983999999999</c:v>
+                  <c:v>0.4069898400000001</c:v>
                 </c:pt>
                 <c:pt idx="31">
                   <c:v>0.365643</c:v>
@@ -7487,40 +7490,40 @@
                   <c:v>0.35352114000000001</c:v>
                 </c:pt>
                 <c:pt idx="33">
-                  <c:v>0.36445785000000003</c:v>
+                  <c:v>0.36445785000000008</c:v>
                 </c:pt>
                 <c:pt idx="34">
                   <c:v>0.34855235000000001</c:v>
                 </c:pt>
                 <c:pt idx="35">
-                  <c:v>0.35884178</c:v>
+                  <c:v>0.35884178000000005</c:v>
                 </c:pt>
                 <c:pt idx="36">
-                  <c:v>0.36046509999999998</c:v>
+                  <c:v>0.36046510000000004</c:v>
                 </c:pt>
                 <c:pt idx="37">
-                  <c:v>0.33972126000000002</c:v>
+                  <c:v>0.33972126000000008</c:v>
                 </c:pt>
                 <c:pt idx="38">
                   <c:v>0.35076252000000002</c:v>
                 </c:pt>
                 <c:pt idx="39">
-                  <c:v>0.33371299999999998</c:v>
+                  <c:v>0.33371300000000009</c:v>
                 </c:pt>
                 <c:pt idx="40">
                   <c:v>0.35079050000000001</c:v>
                 </c:pt>
                 <c:pt idx="41">
-                  <c:v>0.36842105000000003</c:v>
+                  <c:v>0.36842105000000008</c:v>
                 </c:pt>
                 <c:pt idx="42">
-                  <c:v>0.33333333999999998</c:v>
+                  <c:v>0.33333334000000003</c:v>
                 </c:pt>
                 <c:pt idx="43">
                   <c:v>0.35746104000000001</c:v>
                 </c:pt>
                 <c:pt idx="44">
-                  <c:v>0.35197817999999997</c:v>
+                  <c:v>0.35197818000000008</c:v>
                 </c:pt>
               </c:numCache>
             </c:numRef>
@@ -7700,16 +7703,16 @@
                   <c:v>0.46153845999999998</c:v>
                 </c:pt>
                 <c:pt idx="19">
-                  <c:v>0.41379312000000001</c:v>
+                  <c:v>0.41379311999999996</c:v>
                 </c:pt>
                 <c:pt idx="20">
-                  <c:v>0.41379312000000001</c:v>
+                  <c:v>0.41379311999999996</c:v>
                 </c:pt>
                 <c:pt idx="21">
                   <c:v>0</c:v>
                 </c:pt>
                 <c:pt idx="22">
-                  <c:v>0.38759690000000002</c:v>
+                  <c:v>0.38759690000000008</c:v>
                 </c:pt>
                 <c:pt idx="23">
                   <c:v>0.41212120000000002</c:v>
@@ -7718,75 +7721,75 @@
                   <c:v>0.34883720000000001</c:v>
                 </c:pt>
                 <c:pt idx="25">
-                  <c:v>0.42384105999999999</c:v>
+                  <c:v>0.42384106000000005</c:v>
                 </c:pt>
                 <c:pt idx="26">
                   <c:v>0.41875000000000001</c:v>
                 </c:pt>
                 <c:pt idx="27">
-                  <c:v>0.40989399999999998</c:v>
+                  <c:v>0.40989400000000004</c:v>
                 </c:pt>
                 <c:pt idx="28">
-                  <c:v>0.38271606000000002</c:v>
+                  <c:v>0.38271606000000008</c:v>
                 </c:pt>
                 <c:pt idx="29">
                   <c:v>0.41455162000000001</c:v>
                 </c:pt>
                 <c:pt idx="30">
-                  <c:v>0.37176471999999999</c:v>
+                  <c:v>0.3717647200000001</c:v>
                 </c:pt>
                 <c:pt idx="31">
-                  <c:v>0.39333760000000001</c:v>
+                  <c:v>0.39333760000000006</c:v>
                 </c:pt>
                 <c:pt idx="32">
                   <c:v>0.37277353000000002</c:v>
                 </c:pt>
                 <c:pt idx="33">
-                  <c:v>0.39292603999999998</c:v>
+                  <c:v>0.39292604000000009</c:v>
                 </c:pt>
                 <c:pt idx="34">
-                  <c:v>0.40583553999999999</c:v>
+                  <c:v>0.40583554000000005</c:v>
                 </c:pt>
                 <c:pt idx="35">
-                  <c:v>0.37615894999999999</c:v>
+                  <c:v>0.3761589500000001</c:v>
                 </c:pt>
                 <c:pt idx="36">
-                  <c:v>0.37942857000000002</c:v>
+                  <c:v>0.37942857000000013</c:v>
                 </c:pt>
                 <c:pt idx="37">
-                  <c:v>0.40304878</c:v>
+                  <c:v>0.40304878000000005</c:v>
                 </c:pt>
                 <c:pt idx="38">
-                  <c:v>0.3804554</c:v>
+                  <c:v>0.38045540000000005</c:v>
                 </c:pt>
                 <c:pt idx="39">
                   <c:v>0.36180905000000002</c:v>
                 </c:pt>
                 <c:pt idx="40">
-                  <c:v>0.38162252000000002</c:v>
+                  <c:v>0.38162252000000008</c:v>
                 </c:pt>
                 <c:pt idx="41">
-                  <c:v>0.35618277999999998</c:v>
+                  <c:v>0.35618278000000009</c:v>
                 </c:pt>
                 <c:pt idx="42">
-                  <c:v>0.36865940000000003</c:v>
+                  <c:v>0.36865940000000008</c:v>
                 </c:pt>
                 <c:pt idx="43">
-                  <c:v>0.39836844999999999</c:v>
+                  <c:v>0.39836845000000015</c:v>
                 </c:pt>
                 <c:pt idx="44">
-                  <c:v>0.38137080000000001</c:v>
+                  <c:v>0.38137080000000012</c:v>
                 </c:pt>
               </c:numCache>
             </c:numRef>
           </c:val>
         </c:ser>
         <c:marker val="1"/>
-        <c:axId val="51108480"/>
-        <c:axId val="51111808"/>
+        <c:axId val="84834176"/>
+        <c:axId val="84836352"/>
       </c:lineChart>
       <c:catAx>
-        <c:axId val="51108480"/>
+        <c:axId val="84834176"/>
         <c:scaling>
           <c:orientation val="minMax"/>
         </c:scaling>
@@ -7811,14 +7814,14 @@
         </c:title>
         <c:numFmt formatCode="General" sourceLinked="1"/>
         <c:tickLblPos val="nextTo"/>
-        <c:crossAx val="51111808"/>
+        <c:crossAx val="84836352"/>
         <c:crosses val="autoZero"/>
         <c:auto val="1"/>
         <c:lblAlgn val="ctr"/>
         <c:lblOffset val="100"/>
       </c:catAx>
       <c:valAx>
-        <c:axId val="51111808"/>
+        <c:axId val="84836352"/>
         <c:scaling>
           <c:orientation val="minMax"/>
         </c:scaling>
@@ -7844,7 +7847,7 @@
         </c:title>
         <c:numFmt formatCode="General" sourceLinked="1"/>
         <c:tickLblPos val="nextTo"/>
-        <c:crossAx val="51108480"/>
+        <c:crossAx val="84834176"/>
         <c:crosses val="autoZero"/>
         <c:crossBetween val="between"/>
       </c:valAx>
@@ -7893,8 +7896,8 @@
         </p:nvSpPr>
         <p:spPr>
           <a:xfrm>
-            <a:off x="381187" y="685800"/>
-            <a:ext cx="6096299" cy="3429000"/>
+            <a:off x="457200" y="720725"/>
+            <a:ext cx="6400800" cy="3600450"/>
           </a:xfrm>
           <a:custGeom>
             <a:avLst/>
@@ -7934,15 +7937,15 @@
         </p:nvSpPr>
         <p:spPr>
           <a:xfrm>
-            <a:off x="685800" y="4343400"/>
-            <a:ext cx="5486399" cy="4114800"/>
+            <a:off x="731521" y="4560570"/>
+            <a:ext cx="5852159" cy="4320540"/>
           </a:xfrm>
           <a:prstGeom prst="rect">
             <a:avLst/>
           </a:prstGeom>
         </p:spPr>
         <p:txBody>
-          <a:bodyPr lIns="91425" tIns="91425" rIns="91425" bIns="91425" anchor="t" anchorCtr="0"/>
+          <a:bodyPr lIns="96645" tIns="96645" rIns="96645" bIns="96645" anchor="t" anchorCtr="0"/>
           <a:lstStyle>
             <a:lvl1pPr>
               <a:spcBef>
@@ -8131,8 +8134,8 @@
         </p:nvSpPr>
         <p:spPr>
           <a:xfrm>
-            <a:off x="381000" y="685800"/>
-            <a:ext cx="6096000" cy="3429000"/>
+            <a:off x="457200" y="720725"/>
+            <a:ext cx="6400800" cy="3600450"/>
           </a:xfrm>
           <a:custGeom>
             <a:avLst/>
@@ -8172,25 +8175,19 @@
         </p:nvSpPr>
         <p:spPr>
           <a:xfrm>
-            <a:off x="685800" y="4343400"/>
-            <a:ext cx="5486399" cy="4114800"/>
+            <a:off x="731521" y="4560570"/>
+            <a:ext cx="5852159" cy="4320540"/>
           </a:xfrm>
           <a:prstGeom prst="rect">
             <a:avLst/>
           </a:prstGeom>
         </p:spPr>
         <p:txBody>
-          <a:bodyPr lIns="91425" tIns="91425" rIns="91425" bIns="91425" anchor="t" anchorCtr="0">
+          <a:bodyPr lIns="96645" tIns="96645" rIns="96645" bIns="96645" anchor="t" anchorCtr="0">
             <a:noAutofit/>
           </a:bodyPr>
           <a:lstStyle/>
           <a:p>
-            <a:pPr>
-              <a:spcBef>
-                <a:spcPts val="0"/>
-              </a:spcBef>
-              <a:buNone/>
-            </a:pPr>
             <a:endParaRPr/>
           </a:p>
         </p:txBody>
@@ -8232,8 +8229,8 @@
         </p:nvSpPr>
         <p:spPr>
           <a:xfrm>
-            <a:off x="381187" y="685800"/>
-            <a:ext cx="6096299" cy="3429000"/>
+            <a:off x="457200" y="720725"/>
+            <a:ext cx="6400800" cy="3600450"/>
           </a:xfrm>
           <a:custGeom>
             <a:avLst/>
@@ -8273,25 +8270,19 @@
         </p:nvSpPr>
         <p:spPr>
           <a:xfrm>
-            <a:off x="685800" y="4343400"/>
-            <a:ext cx="5486399" cy="4114800"/>
+            <a:off x="731521" y="4560570"/>
+            <a:ext cx="5852159" cy="4320540"/>
           </a:xfrm>
           <a:prstGeom prst="rect">
             <a:avLst/>
           </a:prstGeom>
         </p:spPr>
         <p:txBody>
-          <a:bodyPr lIns="91425" tIns="91425" rIns="91425" bIns="91425" anchor="t" anchorCtr="0">
+          <a:bodyPr lIns="96645" tIns="96645" rIns="96645" bIns="96645" anchor="t" anchorCtr="0">
             <a:noAutofit/>
           </a:bodyPr>
           <a:lstStyle/>
           <a:p>
-            <a:pPr>
-              <a:spcBef>
-                <a:spcPts val="0"/>
-              </a:spcBef>
-              <a:buNone/>
-            </a:pPr>
             <a:endParaRPr/>
           </a:p>
         </p:txBody>
@@ -8333,8 +8324,8 @@
         </p:nvSpPr>
         <p:spPr>
           <a:xfrm>
-            <a:off x="381000" y="685800"/>
-            <a:ext cx="6096000" cy="3429000"/>
+            <a:off x="457200" y="720725"/>
+            <a:ext cx="6400800" cy="3600450"/>
           </a:xfrm>
           <a:custGeom>
             <a:avLst/>
@@ -8374,25 +8365,19 @@
         </p:nvSpPr>
         <p:spPr>
           <a:xfrm>
-            <a:off x="685800" y="4343400"/>
-            <a:ext cx="5486399" cy="4114800"/>
+            <a:off x="731521" y="4560570"/>
+            <a:ext cx="5852159" cy="4320540"/>
           </a:xfrm>
           <a:prstGeom prst="rect">
             <a:avLst/>
           </a:prstGeom>
         </p:spPr>
         <p:txBody>
-          <a:bodyPr lIns="91425" tIns="91425" rIns="91425" bIns="91425" anchor="t" anchorCtr="0">
+          <a:bodyPr lIns="96645" tIns="96645" rIns="96645" bIns="96645" anchor="t" anchorCtr="0">
             <a:noAutofit/>
           </a:bodyPr>
           <a:lstStyle/>
           <a:p>
-            <a:pPr>
-              <a:spcBef>
-                <a:spcPts val="0"/>
-              </a:spcBef>
-              <a:buNone/>
-            </a:pPr>
             <a:endParaRPr/>
           </a:p>
         </p:txBody>
@@ -8434,8 +8419,8 @@
         </p:nvSpPr>
         <p:spPr>
           <a:xfrm>
-            <a:off x="381000" y="685800"/>
-            <a:ext cx="6096000" cy="3429000"/>
+            <a:off x="457200" y="720725"/>
+            <a:ext cx="6400800" cy="3600450"/>
           </a:xfrm>
           <a:custGeom>
             <a:avLst/>
@@ -8475,25 +8460,19 @@
         </p:nvSpPr>
         <p:spPr>
           <a:xfrm>
-            <a:off x="685800" y="4343400"/>
-            <a:ext cx="5486399" cy="4114800"/>
+            <a:off x="731521" y="4560570"/>
+            <a:ext cx="5852159" cy="4320540"/>
           </a:xfrm>
           <a:prstGeom prst="rect">
             <a:avLst/>
           </a:prstGeom>
         </p:spPr>
         <p:txBody>
-          <a:bodyPr lIns="91425" tIns="91425" rIns="91425" bIns="91425" anchor="t" anchorCtr="0">
+          <a:bodyPr lIns="96645" tIns="96645" rIns="96645" bIns="96645" anchor="t" anchorCtr="0">
             <a:noAutofit/>
           </a:bodyPr>
           <a:lstStyle/>
           <a:p>
-            <a:pPr>
-              <a:spcBef>
-                <a:spcPts val="0"/>
-              </a:spcBef>
-              <a:buNone/>
-            </a:pPr>
             <a:endParaRPr/>
           </a:p>
         </p:txBody>
@@ -8535,8 +8514,8 @@
         </p:nvSpPr>
         <p:spPr>
           <a:xfrm>
-            <a:off x="381000" y="685800"/>
-            <a:ext cx="6096000" cy="3429000"/>
+            <a:off x="457200" y="720725"/>
+            <a:ext cx="6400800" cy="3600450"/>
           </a:xfrm>
           <a:custGeom>
             <a:avLst/>
@@ -8576,25 +8555,19 @@
         </p:nvSpPr>
         <p:spPr>
           <a:xfrm>
-            <a:off x="685800" y="4343400"/>
-            <a:ext cx="5486399" cy="4114800"/>
+            <a:off x="731521" y="4560570"/>
+            <a:ext cx="5852159" cy="4320540"/>
           </a:xfrm>
           <a:prstGeom prst="rect">
             <a:avLst/>
           </a:prstGeom>
         </p:spPr>
         <p:txBody>
-          <a:bodyPr lIns="91425" tIns="91425" rIns="91425" bIns="91425" anchor="t" anchorCtr="0">
+          <a:bodyPr lIns="96645" tIns="96645" rIns="96645" bIns="96645" anchor="t" anchorCtr="0">
             <a:noAutofit/>
           </a:bodyPr>
           <a:lstStyle/>
           <a:p>
-            <a:pPr>
-              <a:spcBef>
-                <a:spcPts val="0"/>
-              </a:spcBef>
-              <a:buNone/>
-            </a:pPr>
             <a:endParaRPr/>
           </a:p>
         </p:txBody>
@@ -8636,8 +8609,8 @@
         </p:nvSpPr>
         <p:spPr>
           <a:xfrm>
-            <a:off x="381000" y="685800"/>
-            <a:ext cx="6096000" cy="3429000"/>
+            <a:off x="457200" y="720725"/>
+            <a:ext cx="6400800" cy="3600450"/>
           </a:xfrm>
           <a:custGeom>
             <a:avLst/>
@@ -8677,25 +8650,19 @@
         </p:nvSpPr>
         <p:spPr>
           <a:xfrm>
-            <a:off x="685800" y="4343400"/>
-            <a:ext cx="5486399" cy="4114800"/>
+            <a:off x="731521" y="4560570"/>
+            <a:ext cx="5852159" cy="4320540"/>
           </a:xfrm>
           <a:prstGeom prst="rect">
             <a:avLst/>
           </a:prstGeom>
         </p:spPr>
         <p:txBody>
-          <a:bodyPr lIns="91425" tIns="91425" rIns="91425" bIns="91425" anchor="t" anchorCtr="0">
+          <a:bodyPr lIns="96645" tIns="96645" rIns="96645" bIns="96645" anchor="t" anchorCtr="0">
             <a:noAutofit/>
           </a:bodyPr>
           <a:lstStyle/>
           <a:p>
-            <a:pPr>
-              <a:spcBef>
-                <a:spcPts val="0"/>
-              </a:spcBef>
-              <a:buNone/>
-            </a:pPr>
             <a:endParaRPr/>
           </a:p>
         </p:txBody>
@@ -8737,8 +8704,8 @@
         </p:nvSpPr>
         <p:spPr>
           <a:xfrm>
-            <a:off x="381000" y="685800"/>
-            <a:ext cx="6096000" cy="3429000"/>
+            <a:off x="457200" y="720725"/>
+            <a:ext cx="6400800" cy="3600450"/>
           </a:xfrm>
           <a:custGeom>
             <a:avLst/>
@@ -8778,25 +8745,19 @@
         </p:nvSpPr>
         <p:spPr>
           <a:xfrm>
-            <a:off x="685800" y="4343400"/>
-            <a:ext cx="5486399" cy="4114800"/>
+            <a:off x="731521" y="4560570"/>
+            <a:ext cx="5852159" cy="4320540"/>
           </a:xfrm>
           <a:prstGeom prst="rect">
             <a:avLst/>
           </a:prstGeom>
         </p:spPr>
         <p:txBody>
-          <a:bodyPr lIns="91425" tIns="91425" rIns="91425" bIns="91425" anchor="t" anchorCtr="0">
+          <a:bodyPr lIns="96645" tIns="96645" rIns="96645" bIns="96645" anchor="t" anchorCtr="0">
             <a:noAutofit/>
           </a:bodyPr>
           <a:lstStyle/>
           <a:p>
-            <a:pPr>
-              <a:spcBef>
-                <a:spcPts val="0"/>
-              </a:spcBef>
-              <a:buNone/>
-            </a:pPr>
             <a:endParaRPr/>
           </a:p>
         </p:txBody>
@@ -8838,8 +8799,8 @@
         </p:nvSpPr>
         <p:spPr>
           <a:xfrm>
-            <a:off x="381000" y="685800"/>
-            <a:ext cx="6096000" cy="3429000"/>
+            <a:off x="457200" y="720725"/>
+            <a:ext cx="6400800" cy="3600450"/>
           </a:xfrm>
           <a:custGeom>
             <a:avLst/>
@@ -8879,25 +8840,19 @@
         </p:nvSpPr>
         <p:spPr>
           <a:xfrm>
-            <a:off x="685800" y="4343400"/>
-            <a:ext cx="5486399" cy="4114800"/>
+            <a:off x="731521" y="4560570"/>
+            <a:ext cx="5852159" cy="4320540"/>
           </a:xfrm>
           <a:prstGeom prst="rect">
             <a:avLst/>
           </a:prstGeom>
         </p:spPr>
         <p:txBody>
-          <a:bodyPr lIns="91425" tIns="91425" rIns="91425" bIns="91425" anchor="t" anchorCtr="0">
+          <a:bodyPr lIns="96645" tIns="96645" rIns="96645" bIns="96645" anchor="t" anchorCtr="0">
             <a:noAutofit/>
           </a:bodyPr>
           <a:lstStyle/>
           <a:p>
-            <a:pPr>
-              <a:spcBef>
-                <a:spcPts val="0"/>
-              </a:spcBef>
-              <a:buNone/>
-            </a:pPr>
             <a:endParaRPr/>
           </a:p>
         </p:txBody>
@@ -8939,8 +8894,8 @@
         </p:nvSpPr>
         <p:spPr>
           <a:xfrm>
-            <a:off x="381000" y="685800"/>
-            <a:ext cx="6096000" cy="3429000"/>
+            <a:off x="457200" y="720725"/>
+            <a:ext cx="6400800" cy="3600450"/>
           </a:xfrm>
           <a:custGeom>
             <a:avLst/>
@@ -8980,25 +8935,19 @@
         </p:nvSpPr>
         <p:spPr>
           <a:xfrm>
-            <a:off x="685800" y="4343400"/>
-            <a:ext cx="5486399" cy="4114800"/>
+            <a:off x="731521" y="4560570"/>
+            <a:ext cx="5852159" cy="4320540"/>
           </a:xfrm>
           <a:prstGeom prst="rect">
             <a:avLst/>
           </a:prstGeom>
         </p:spPr>
         <p:txBody>
-          <a:bodyPr lIns="91425" tIns="91425" rIns="91425" bIns="91425" anchor="t" anchorCtr="0">
+          <a:bodyPr lIns="96645" tIns="96645" rIns="96645" bIns="96645" anchor="t" anchorCtr="0">
             <a:noAutofit/>
           </a:bodyPr>
           <a:lstStyle/>
           <a:p>
-            <a:pPr lvl="0" rtl="0">
-              <a:spcBef>
-                <a:spcPts val="0"/>
-              </a:spcBef>
-              <a:buNone/>
-            </a:pPr>
             <a:endParaRPr/>
           </a:p>
         </p:txBody>
@@ -9040,8 +8989,8 @@
         </p:nvSpPr>
         <p:spPr>
           <a:xfrm>
-            <a:off x="381000" y="685800"/>
-            <a:ext cx="6096000" cy="3429000"/>
+            <a:off x="457200" y="720725"/>
+            <a:ext cx="6400800" cy="3600450"/>
           </a:xfrm>
           <a:custGeom>
             <a:avLst/>
@@ -9081,25 +9030,19 @@
         </p:nvSpPr>
         <p:spPr>
           <a:xfrm>
-            <a:off x="685800" y="4343400"/>
-            <a:ext cx="5486399" cy="4114800"/>
+            <a:off x="731521" y="4560570"/>
+            <a:ext cx="5852159" cy="4320540"/>
           </a:xfrm>
           <a:prstGeom prst="rect">
             <a:avLst/>
           </a:prstGeom>
         </p:spPr>
         <p:txBody>
-          <a:bodyPr lIns="91425" tIns="91425" rIns="91425" bIns="91425" anchor="t" anchorCtr="0">
+          <a:bodyPr lIns="96645" tIns="96645" rIns="96645" bIns="96645" anchor="t" anchorCtr="0">
             <a:noAutofit/>
           </a:bodyPr>
           <a:lstStyle/>
           <a:p>
-            <a:pPr lvl="0" rtl="0">
-              <a:spcBef>
-                <a:spcPts val="0"/>
-              </a:spcBef>
-              <a:buNone/>
-            </a:pPr>
             <a:endParaRPr/>
           </a:p>
         </p:txBody>
@@ -9141,8 +9084,8 @@
         </p:nvSpPr>
         <p:spPr>
           <a:xfrm>
-            <a:off x="381000" y="685800"/>
-            <a:ext cx="6096000" cy="3429000"/>
+            <a:off x="457200" y="720725"/>
+            <a:ext cx="6400800" cy="3600450"/>
           </a:xfrm>
           <a:custGeom>
             <a:avLst/>
@@ -9182,25 +9125,19 @@
         </p:nvSpPr>
         <p:spPr>
           <a:xfrm>
-            <a:off x="685800" y="4343400"/>
-            <a:ext cx="5486399" cy="4114800"/>
+            <a:off x="731521" y="4560570"/>
+            <a:ext cx="5852159" cy="4320540"/>
           </a:xfrm>
           <a:prstGeom prst="rect">
             <a:avLst/>
           </a:prstGeom>
         </p:spPr>
         <p:txBody>
-          <a:bodyPr lIns="91425" tIns="91425" rIns="91425" bIns="91425" anchor="t" anchorCtr="0">
+          <a:bodyPr lIns="96645" tIns="96645" rIns="96645" bIns="96645" anchor="t" anchorCtr="0">
             <a:noAutofit/>
           </a:bodyPr>
           <a:lstStyle/>
           <a:p>
-            <a:pPr lvl="0" rtl="0">
-              <a:spcBef>
-                <a:spcPts val="0"/>
-              </a:spcBef>
-              <a:buNone/>
-            </a:pPr>
             <a:endParaRPr/>
           </a:p>
         </p:txBody>
@@ -9242,8 +9179,8 @@
         </p:nvSpPr>
         <p:spPr>
           <a:xfrm>
-            <a:off x="381000" y="685800"/>
-            <a:ext cx="6096000" cy="3429000"/>
+            <a:off x="457200" y="720725"/>
+            <a:ext cx="6400800" cy="3600450"/>
           </a:xfrm>
           <a:custGeom>
             <a:avLst/>
@@ -9283,27 +9220,21 @@
         </p:nvSpPr>
         <p:spPr>
           <a:xfrm>
-            <a:off x="685800" y="4343400"/>
-            <a:ext cx="5486399" cy="4114800"/>
+            <a:off x="731521" y="4560570"/>
+            <a:ext cx="5852159" cy="4320540"/>
           </a:xfrm>
           <a:prstGeom prst="rect">
             <a:avLst/>
           </a:prstGeom>
         </p:spPr>
         <p:txBody>
-          <a:bodyPr lIns="91425" tIns="91425" rIns="91425" bIns="91425" anchor="t" anchorCtr="0">
+          <a:bodyPr lIns="96645" tIns="96645" rIns="96645" bIns="96645" anchor="t" anchorCtr="0">
             <a:noAutofit/>
           </a:bodyPr>
           <a:lstStyle/>
           <a:p>
-            <a:pPr>
-              <a:spcBef>
-                <a:spcPts val="0"/>
-              </a:spcBef>
-              <a:buNone/>
-            </a:pPr>
-            <a:r>
-              <a:rPr lang="en"/>
+            <a:r>
+              <a:rPr lang="en" dirty="0"/>
               <a:t>Should we mention the things we thought of, but didn’t get working.. like related work/future work?</a:t>
             </a:r>
           </a:p>
@@ -9346,8 +9277,8 @@
         </p:nvSpPr>
         <p:spPr>
           <a:xfrm>
-            <a:off x="381000" y="685800"/>
-            <a:ext cx="6096000" cy="3429000"/>
+            <a:off x="457200" y="720725"/>
+            <a:ext cx="6400800" cy="3600450"/>
           </a:xfrm>
           <a:custGeom>
             <a:avLst/>
@@ -9387,27 +9318,21 @@
         </p:nvSpPr>
         <p:spPr>
           <a:xfrm>
-            <a:off x="685800" y="4343400"/>
-            <a:ext cx="5486399" cy="4114800"/>
+            <a:off x="731521" y="4560570"/>
+            <a:ext cx="5852159" cy="4320540"/>
           </a:xfrm>
           <a:prstGeom prst="rect">
             <a:avLst/>
           </a:prstGeom>
         </p:spPr>
         <p:txBody>
-          <a:bodyPr lIns="91425" tIns="91425" rIns="91425" bIns="91425" anchor="t" anchorCtr="0">
+          <a:bodyPr lIns="96645" tIns="96645" rIns="96645" bIns="96645" anchor="t" anchorCtr="0">
             <a:noAutofit/>
           </a:bodyPr>
           <a:lstStyle/>
           <a:p>
-            <a:pPr>
-              <a:spcBef>
-                <a:spcPts val="0"/>
-              </a:spcBef>
-              <a:buNone/>
-            </a:pPr>
-            <a:r>
-              <a:rPr lang="en"/>
+            <a:r>
+              <a:rPr lang="en" dirty="0"/>
               <a:t>Should we mention the things we thought of, but didn’t get working.. like related work/future work?</a:t>
             </a:r>
           </a:p>
@@ -9450,8 +9375,8 @@
         </p:nvSpPr>
         <p:spPr>
           <a:xfrm>
-            <a:off x="381000" y="685800"/>
-            <a:ext cx="6096000" cy="3429000"/>
+            <a:off x="457200" y="720725"/>
+            <a:ext cx="6400800" cy="3600450"/>
           </a:xfrm>
           <a:custGeom>
             <a:avLst/>
@@ -9491,27 +9416,21 @@
         </p:nvSpPr>
         <p:spPr>
           <a:xfrm>
-            <a:off x="685800" y="4343400"/>
-            <a:ext cx="5486399" cy="4114800"/>
+            <a:off x="731521" y="4560570"/>
+            <a:ext cx="5852159" cy="4320540"/>
           </a:xfrm>
           <a:prstGeom prst="rect">
             <a:avLst/>
           </a:prstGeom>
         </p:spPr>
         <p:txBody>
-          <a:bodyPr lIns="91425" tIns="91425" rIns="91425" bIns="91425" anchor="t" anchorCtr="0">
+          <a:bodyPr lIns="96645" tIns="96645" rIns="96645" bIns="96645" anchor="t" anchorCtr="0">
             <a:noAutofit/>
           </a:bodyPr>
           <a:lstStyle/>
           <a:p>
-            <a:pPr>
-              <a:spcBef>
-                <a:spcPts val="0"/>
-              </a:spcBef>
-              <a:buNone/>
-            </a:pPr>
-            <a:r>
-              <a:rPr lang="en"/>
+            <a:r>
+              <a:rPr lang="en" dirty="0"/>
               <a:t>Should we mention the things we thought of, but didn’t get working.. like related work/future work?</a:t>
             </a:r>
           </a:p>
@@ -9554,8 +9473,8 @@
         </p:nvSpPr>
         <p:spPr>
           <a:xfrm>
-            <a:off x="381000" y="685800"/>
-            <a:ext cx="6096000" cy="3429000"/>
+            <a:off x="457200" y="720725"/>
+            <a:ext cx="6400800" cy="3600450"/>
           </a:xfrm>
           <a:custGeom>
             <a:avLst/>
@@ -9595,27 +9514,21 @@
         </p:nvSpPr>
         <p:spPr>
           <a:xfrm>
-            <a:off x="685800" y="4343400"/>
-            <a:ext cx="5486399" cy="4114800"/>
+            <a:off x="731521" y="4560570"/>
+            <a:ext cx="5852159" cy="4320540"/>
           </a:xfrm>
           <a:prstGeom prst="rect">
             <a:avLst/>
           </a:prstGeom>
         </p:spPr>
         <p:txBody>
-          <a:bodyPr lIns="91425" tIns="91425" rIns="91425" bIns="91425" anchor="t" anchorCtr="0">
+          <a:bodyPr lIns="96645" tIns="96645" rIns="96645" bIns="96645" anchor="t" anchorCtr="0">
             <a:noAutofit/>
           </a:bodyPr>
           <a:lstStyle/>
           <a:p>
-            <a:pPr>
-              <a:spcBef>
-                <a:spcPts val="0"/>
-              </a:spcBef>
-              <a:buNone/>
-            </a:pPr>
-            <a:r>
-              <a:rPr lang="en"/>
+            <a:r>
+              <a:rPr lang="en" dirty="0"/>
               <a:t>Should we mention the things we thought of, but didn’t get working.. like related work/future work?</a:t>
             </a:r>
           </a:p>
@@ -9658,8 +9571,8 @@
         </p:nvSpPr>
         <p:spPr>
           <a:xfrm>
-            <a:off x="381000" y="685800"/>
-            <a:ext cx="6096000" cy="3429000"/>
+            <a:off x="457200" y="720725"/>
+            <a:ext cx="6400800" cy="3600450"/>
           </a:xfrm>
           <a:custGeom>
             <a:avLst/>
@@ -9699,51 +9612,33 @@
         </p:nvSpPr>
         <p:spPr>
           <a:xfrm>
-            <a:off x="685800" y="4343400"/>
-            <a:ext cx="5486399" cy="4114800"/>
+            <a:off x="731521" y="4560570"/>
+            <a:ext cx="5852159" cy="4320540"/>
           </a:xfrm>
           <a:prstGeom prst="rect">
             <a:avLst/>
           </a:prstGeom>
         </p:spPr>
         <p:txBody>
-          <a:bodyPr lIns="91425" tIns="91425" rIns="91425" bIns="91425" anchor="t" anchorCtr="0">
+          <a:bodyPr lIns="96645" tIns="96645" rIns="96645" bIns="96645" anchor="t" anchorCtr="0">
             <a:noAutofit/>
           </a:bodyPr>
           <a:lstStyle/>
           <a:p>
-            <a:pPr lvl="0" rtl="0">
-              <a:spcBef>
-                <a:spcPts val="0"/>
-              </a:spcBef>
-              <a:buNone/>
-            </a:pPr>
-            <a:r>
-              <a:rPr lang="en"/>
+            <a:r>
+              <a:rPr lang="en" dirty="0"/>
               <a:t>Need to add more colums to include Google Scholar, ResearchIndex and whatever is there in Diablo’s paper</a:t>
             </a:r>
           </a:p>
           <a:p>
-            <a:pPr lvl="0" rtl="0">
-              <a:spcBef>
-                <a:spcPts val="0"/>
-              </a:spcBef>
-              <a:buNone/>
-            </a:pPr>
-            <a:r>
-              <a:rPr lang="en"/>
+            <a:r>
+              <a:rPr lang="en" dirty="0"/>
               <a:t>What was the size of the Citeseer data first downloaded ?</a:t>
             </a:r>
           </a:p>
           <a:p>
-            <a:pPr>
-              <a:spcBef>
-                <a:spcPts val="0"/>
-              </a:spcBef>
-              <a:buNone/>
-            </a:pPr>
-            <a:r>
-              <a:rPr lang="en"/>
+            <a:r>
+              <a:rPr lang="en" dirty="0"/>
               <a:t>We tried a few things that didn’t work for us, when you see the # our ppt it’s for an approach we tried but didn’t work</a:t>
             </a:r>
           </a:p>
@@ -9786,8 +9681,8 @@
         </p:nvSpPr>
         <p:spPr>
           <a:xfrm>
-            <a:off x="381000" y="685800"/>
-            <a:ext cx="6096000" cy="3429000"/>
+            <a:off x="457200" y="720725"/>
+            <a:ext cx="6400800" cy="3600450"/>
           </a:xfrm>
           <a:custGeom>
             <a:avLst/>
@@ -9827,51 +9722,33 @@
         </p:nvSpPr>
         <p:spPr>
           <a:xfrm>
-            <a:off x="685800" y="4343400"/>
-            <a:ext cx="5486399" cy="4114800"/>
+            <a:off x="731521" y="4560570"/>
+            <a:ext cx="5852159" cy="4320540"/>
           </a:xfrm>
           <a:prstGeom prst="rect">
             <a:avLst/>
           </a:prstGeom>
         </p:spPr>
         <p:txBody>
-          <a:bodyPr lIns="91425" tIns="91425" rIns="91425" bIns="91425" anchor="t" anchorCtr="0">
+          <a:bodyPr lIns="96645" tIns="96645" rIns="96645" bIns="96645" anchor="t" anchorCtr="0">
             <a:noAutofit/>
           </a:bodyPr>
           <a:lstStyle/>
           <a:p>
-            <a:pPr lvl="0" rtl="0">
-              <a:spcBef>
-                <a:spcPts val="0"/>
-              </a:spcBef>
-              <a:buNone/>
-            </a:pPr>
-            <a:r>
-              <a:rPr lang="en"/>
+            <a:r>
+              <a:rPr lang="en" dirty="0"/>
               <a:t>Need to add more colums to include Google Scholar, ResearchIndex and whatever is there in Diablo’s paper</a:t>
             </a:r>
           </a:p>
           <a:p>
-            <a:pPr lvl="0" rtl="0">
-              <a:spcBef>
-                <a:spcPts val="0"/>
-              </a:spcBef>
-              <a:buNone/>
-            </a:pPr>
-            <a:r>
-              <a:rPr lang="en"/>
+            <a:r>
+              <a:rPr lang="en" dirty="0"/>
               <a:t>What was the size of the Citeseer data first downloaded ?</a:t>
             </a:r>
           </a:p>
           <a:p>
-            <a:pPr>
-              <a:spcBef>
-                <a:spcPts val="0"/>
-              </a:spcBef>
-              <a:buNone/>
-            </a:pPr>
-            <a:r>
-              <a:rPr lang="en"/>
+            <a:r>
+              <a:rPr lang="en" dirty="0"/>
               <a:t>We tried a few things that didn’t work for us, when you see the # our ppt it’s for an approach we tried but didn’t work</a:t>
             </a:r>
           </a:p>
@@ -9914,8 +9791,8 @@
         </p:nvSpPr>
         <p:spPr>
           <a:xfrm>
-            <a:off x="381000" y="685800"/>
-            <a:ext cx="6096000" cy="3429000"/>
+            <a:off x="457200" y="720725"/>
+            <a:ext cx="6400800" cy="3600450"/>
           </a:xfrm>
           <a:custGeom>
             <a:avLst/>
@@ -9955,51 +9832,33 @@
         </p:nvSpPr>
         <p:spPr>
           <a:xfrm>
-            <a:off x="685800" y="4343400"/>
-            <a:ext cx="5486399" cy="4114800"/>
+            <a:off x="731521" y="4560570"/>
+            <a:ext cx="5852159" cy="4320540"/>
           </a:xfrm>
           <a:prstGeom prst="rect">
             <a:avLst/>
           </a:prstGeom>
         </p:spPr>
         <p:txBody>
-          <a:bodyPr lIns="91425" tIns="91425" rIns="91425" bIns="91425" anchor="t" anchorCtr="0">
+          <a:bodyPr lIns="96645" tIns="96645" rIns="96645" bIns="96645" anchor="t" anchorCtr="0">
             <a:noAutofit/>
           </a:bodyPr>
           <a:lstStyle/>
           <a:p>
-            <a:pPr lvl="0" rtl="0">
-              <a:spcBef>
-                <a:spcPts val="0"/>
-              </a:spcBef>
-              <a:buNone/>
-            </a:pPr>
-            <a:r>
-              <a:rPr lang="en"/>
+            <a:r>
+              <a:rPr lang="en" dirty="0"/>
               <a:t>Need to add more colums to include Google Scholar, ResearchIndex and whatever is there in Diablo’s paper</a:t>
             </a:r>
           </a:p>
           <a:p>
-            <a:pPr lvl="0" rtl="0">
-              <a:spcBef>
-                <a:spcPts val="0"/>
-              </a:spcBef>
-              <a:buNone/>
-            </a:pPr>
-            <a:r>
-              <a:rPr lang="en"/>
+            <a:r>
+              <a:rPr lang="en" dirty="0"/>
               <a:t>What was the size of the Citeseer data first downloaded ?</a:t>
             </a:r>
           </a:p>
           <a:p>
-            <a:pPr>
-              <a:spcBef>
-                <a:spcPts val="0"/>
-              </a:spcBef>
-              <a:buNone/>
-            </a:pPr>
-            <a:r>
-              <a:rPr lang="en"/>
+            <a:r>
+              <a:rPr lang="en" dirty="0"/>
               <a:t>We tried a few things that didn’t work for us, when you see the # our ppt it’s for an approach we tried but didn’t work</a:t>
             </a:r>
           </a:p>
@@ -10042,8 +9901,8 @@
         </p:nvSpPr>
         <p:spPr>
           <a:xfrm>
-            <a:off x="381000" y="685800"/>
-            <a:ext cx="6096000" cy="3429000"/>
+            <a:off x="457200" y="720725"/>
+            <a:ext cx="6400800" cy="3600450"/>
           </a:xfrm>
           <a:custGeom>
             <a:avLst/>
@@ -10083,27 +9942,21 @@
         </p:nvSpPr>
         <p:spPr>
           <a:xfrm>
-            <a:off x="685800" y="4343400"/>
-            <a:ext cx="5486399" cy="4114800"/>
+            <a:off x="731521" y="4560570"/>
+            <a:ext cx="5852159" cy="4320540"/>
           </a:xfrm>
           <a:prstGeom prst="rect">
             <a:avLst/>
           </a:prstGeom>
         </p:spPr>
         <p:txBody>
-          <a:bodyPr lIns="91425" tIns="91425" rIns="91425" bIns="91425" anchor="t" anchorCtr="0">
+          <a:bodyPr lIns="96645" tIns="96645" rIns="96645" bIns="96645" anchor="t" anchorCtr="0">
             <a:noAutofit/>
           </a:bodyPr>
           <a:lstStyle/>
           <a:p>
-            <a:pPr>
-              <a:spcBef>
-                <a:spcPts val="0"/>
-              </a:spcBef>
-              <a:buNone/>
-            </a:pPr>
-            <a:r>
-              <a:rPr lang="en"/>
+            <a:r>
+              <a:rPr lang="en" dirty="0"/>
               <a:t>Need to put in the chart</a:t>
             </a:r>
           </a:p>
@@ -10146,8 +9999,8 @@
         </p:nvSpPr>
         <p:spPr>
           <a:xfrm>
-            <a:off x="381000" y="685800"/>
-            <a:ext cx="6096000" cy="3429000"/>
+            <a:off x="457200" y="720725"/>
+            <a:ext cx="6400800" cy="3600450"/>
           </a:xfrm>
           <a:custGeom>
             <a:avLst/>
@@ -10187,27 +10040,21 @@
         </p:nvSpPr>
         <p:spPr>
           <a:xfrm>
-            <a:off x="685800" y="4343400"/>
-            <a:ext cx="5486399" cy="4114800"/>
+            <a:off x="731521" y="4560570"/>
+            <a:ext cx="5852159" cy="4320540"/>
           </a:xfrm>
           <a:prstGeom prst="rect">
             <a:avLst/>
           </a:prstGeom>
         </p:spPr>
         <p:txBody>
-          <a:bodyPr lIns="91425" tIns="91425" rIns="91425" bIns="91425" anchor="t" anchorCtr="0">
+          <a:bodyPr lIns="96645" tIns="96645" rIns="96645" bIns="96645" anchor="t" anchorCtr="0">
             <a:noAutofit/>
           </a:bodyPr>
           <a:lstStyle/>
           <a:p>
-            <a:pPr>
-              <a:spcBef>
-                <a:spcPts val="0"/>
-              </a:spcBef>
-              <a:buNone/>
-            </a:pPr>
-            <a:r>
-              <a:rPr lang="en"/>
+            <a:r>
+              <a:rPr lang="en" dirty="0"/>
               <a:t>Need to put in the chart</a:t>
             </a:r>
           </a:p>
@@ -10250,8 +10097,8 @@
         </p:nvSpPr>
         <p:spPr>
           <a:xfrm>
-            <a:off x="381000" y="685800"/>
-            <a:ext cx="6096000" cy="3429000"/>
+            <a:off x="457200" y="720725"/>
+            <a:ext cx="6400800" cy="3600450"/>
           </a:xfrm>
           <a:custGeom>
             <a:avLst/>
@@ -10291,39 +10138,27 @@
         </p:nvSpPr>
         <p:spPr>
           <a:xfrm>
-            <a:off x="685800" y="4343400"/>
-            <a:ext cx="5486399" cy="4114800"/>
+            <a:off x="731521" y="4560570"/>
+            <a:ext cx="5852159" cy="4320540"/>
           </a:xfrm>
           <a:prstGeom prst="rect">
             <a:avLst/>
           </a:prstGeom>
         </p:spPr>
         <p:txBody>
-          <a:bodyPr lIns="91425" tIns="91425" rIns="91425" bIns="91425" anchor="t" anchorCtr="0">
+          <a:bodyPr lIns="96645" tIns="96645" rIns="96645" bIns="96645" anchor="t" anchorCtr="0">
             <a:noAutofit/>
           </a:bodyPr>
           <a:lstStyle/>
           <a:p>
-            <a:pPr lvl="0" rtl="0">
-              <a:spcBef>
-                <a:spcPts val="0"/>
-              </a:spcBef>
-              <a:buNone/>
-            </a:pPr>
-            <a:r>
-              <a:rPr lang="en"/>
+            <a:r>
+              <a:rPr lang="en" dirty="0"/>
               <a:t>Replace intersection and union with correct signs</a:t>
             </a:r>
           </a:p>
           <a:p>
-            <a:pPr>
-              <a:spcBef>
-                <a:spcPts val="0"/>
-              </a:spcBef>
-              <a:buNone/>
-            </a:pPr>
-            <a:r>
-              <a:rPr lang="en"/>
+            <a:r>
+              <a:rPr lang="en" dirty="0"/>
               <a:t>Colour of the boxes represent degree of similarity. This has been normalized to 0.3 to highlight similarities.</a:t>
             </a:r>
           </a:p>
@@ -10366,8 +10201,8 @@
         </p:nvSpPr>
         <p:spPr>
           <a:xfrm>
-            <a:off x="381000" y="685800"/>
-            <a:ext cx="6096000" cy="3429000"/>
+            <a:off x="457200" y="720725"/>
+            <a:ext cx="6400800" cy="3600450"/>
           </a:xfrm>
           <a:custGeom>
             <a:avLst/>
@@ -10407,39 +10242,27 @@
         </p:nvSpPr>
         <p:spPr>
           <a:xfrm>
-            <a:off x="685800" y="4343400"/>
-            <a:ext cx="5486399" cy="4114800"/>
+            <a:off x="731521" y="4560570"/>
+            <a:ext cx="5852159" cy="4320540"/>
           </a:xfrm>
           <a:prstGeom prst="rect">
             <a:avLst/>
           </a:prstGeom>
         </p:spPr>
         <p:txBody>
-          <a:bodyPr lIns="91425" tIns="91425" rIns="91425" bIns="91425" anchor="t" anchorCtr="0">
+          <a:bodyPr lIns="96645" tIns="96645" rIns="96645" bIns="96645" anchor="t" anchorCtr="0">
             <a:noAutofit/>
           </a:bodyPr>
           <a:lstStyle/>
           <a:p>
-            <a:pPr lvl="0" rtl="0">
-              <a:spcBef>
-                <a:spcPts val="0"/>
-              </a:spcBef>
-              <a:buNone/>
-            </a:pPr>
-            <a:r>
-              <a:rPr lang="en"/>
+            <a:r>
+              <a:rPr lang="en" dirty="0"/>
               <a:t>Replace intersection and union with correct signs</a:t>
             </a:r>
           </a:p>
           <a:p>
-            <a:pPr>
-              <a:spcBef>
-                <a:spcPts val="0"/>
-              </a:spcBef>
-              <a:buNone/>
-            </a:pPr>
-            <a:r>
-              <a:rPr lang="en"/>
+            <a:r>
+              <a:rPr lang="en" dirty="0"/>
               <a:t>Colour of the boxes represent degree of similarity. This has been normalized to 0.3 to highlight similarities.</a:t>
             </a:r>
           </a:p>
@@ -12402,17 +12225,7 @@
                 <a:latin typeface="Times New Roman" pitchFamily="18" charset="0"/>
                 <a:cs typeface="Times New Roman" pitchFamily="18" charset="0"/>
               </a:rPr>
-              <a:t> Mary </a:t>
-            </a:r>
-            <a:r>
-              <a:rPr lang="en-US" sz="2000" dirty="0" smtClean="0">
-                <a:solidFill>
-                  <a:schemeClr val="tx1"/>
-                </a:solidFill>
-                <a:latin typeface="Times New Roman" pitchFamily="18" charset="0"/>
-                <a:cs typeface="Times New Roman" pitchFamily="18" charset="0"/>
-              </a:rPr>
-              <a:t>Ephraim</a:t>
+              <a:t> Mary Ephraim</a:t>
             </a:r>
             <a:endParaRPr sz="2000">
               <a:solidFill>
@@ -13221,7 +13034,21 @@
                 <a:latin typeface="Times New Roman" pitchFamily="18" charset="0"/>
                 <a:cs typeface="Times New Roman" pitchFamily="18" charset="0"/>
               </a:rPr>
-              <a:t>Steady amount of research per author, good as number of authors increasing</a:t>
+              <a:t>Steady amount of research per </a:t>
+            </a:r>
+            <a:r>
+              <a:rPr lang="en-US" sz="1800" dirty="0" smtClean="0">
+                <a:latin typeface="Times New Roman" pitchFamily="18" charset="0"/>
+                <a:cs typeface="Times New Roman" pitchFamily="18" charset="0"/>
+              </a:rPr>
+              <a:t>author; </a:t>
+            </a:r>
+            <a:r>
+              <a:rPr lang="en-US" sz="1800" dirty="0" smtClean="0">
+                <a:latin typeface="Times New Roman" pitchFamily="18" charset="0"/>
+                <a:cs typeface="Times New Roman" pitchFamily="18" charset="0"/>
+              </a:rPr>
+              <a:t>good as number of authors increasing</a:t>
             </a:r>
           </a:p>
           <a:p>
@@ -13244,14 +13071,7 @@
                 <a:latin typeface="Times New Roman" pitchFamily="18" charset="0"/>
                 <a:cs typeface="Times New Roman" pitchFamily="18" charset="0"/>
               </a:rPr>
-              <a:t>Top tier conferences performing better than lower </a:t>
-            </a:r>
-            <a:r>
-              <a:rPr lang="en-US" sz="1800" dirty="0" smtClean="0">
-                <a:latin typeface="Times New Roman" pitchFamily="18" charset="0"/>
-                <a:cs typeface="Times New Roman" pitchFamily="18" charset="0"/>
-              </a:rPr>
-              <a:t>tier</a:t>
+              <a:t>Top tier conferences performing better than lower tier</a:t>
             </a:r>
           </a:p>
           <a:p>
@@ -13438,14 +13258,7 @@
                 <a:latin typeface="Times New Roman" pitchFamily="18" charset="0"/>
                 <a:cs typeface="Times New Roman" pitchFamily="18" charset="0"/>
               </a:rPr>
-              <a:t>Many conferences also have limit on maximum number of </a:t>
-            </a:r>
-            <a:r>
-              <a:rPr lang="en-US" sz="1800" dirty="0" smtClean="0">
-                <a:latin typeface="Times New Roman" pitchFamily="18" charset="0"/>
-                <a:cs typeface="Times New Roman" pitchFamily="18" charset="0"/>
-              </a:rPr>
-              <a:t>collaborators</a:t>
+              <a:t>Many conferences also have limit on maximum number of collaborators</a:t>
             </a:r>
           </a:p>
           <a:p>
@@ -13775,14 +13588,7 @@
                 <a:latin typeface="Times New Roman" pitchFamily="18" charset="0"/>
                 <a:cs typeface="Times New Roman" pitchFamily="18" charset="0"/>
               </a:rPr>
-              <a:t>Higher in </a:t>
-            </a:r>
-            <a:r>
-              <a:rPr lang="en-US" sz="1800" dirty="0" smtClean="0">
-                <a:latin typeface="Times New Roman" pitchFamily="18" charset="0"/>
-                <a:cs typeface="Times New Roman" pitchFamily="18" charset="0"/>
-              </a:rPr>
-              <a:t>lower ranked conferences. Makes sense since usually people will enter with lower ranked conferences</a:t>
+              <a:t>Higher in lower ranked conferences. Makes sense since usually people will enter with lower ranked conferences</a:t>
             </a:r>
             <a:endParaRPr lang="en-US" sz="1800" dirty="0">
               <a:latin typeface="Times New Roman" pitchFamily="18" charset="0"/>
@@ -14098,14 +13904,7 @@
                 <a:latin typeface="Times New Roman" pitchFamily="18" charset="0"/>
                 <a:cs typeface="Times New Roman" pitchFamily="18" charset="0"/>
               </a:rPr>
-              <a:t>Steady increase shows increasing trend of collaboration amongst authors</a:t>
-            </a:r>
-            <a:r>
-              <a:rPr lang="en-US" sz="1800" dirty="0" smtClean="0">
-                <a:latin typeface="Times New Roman" pitchFamily="18" charset="0"/>
-                <a:cs typeface="Times New Roman" pitchFamily="18" charset="0"/>
-              </a:rPr>
-              <a:t>.</a:t>
+              <a:t>Steady increase shows increasing trend of collaboration amongst authors.</a:t>
             </a:r>
           </a:p>
           <a:p>
@@ -14128,14 +13927,7 @@
                 <a:latin typeface="Times New Roman" pitchFamily="18" charset="0"/>
                 <a:cs typeface="Times New Roman" pitchFamily="18" charset="0"/>
               </a:rPr>
-              <a:t>Publish </a:t>
-            </a:r>
-            <a:r>
-              <a:rPr lang="en-US" sz="1800" dirty="0" smtClean="0">
-                <a:latin typeface="Times New Roman" pitchFamily="18" charset="0"/>
-                <a:cs typeface="Times New Roman" pitchFamily="18" charset="0"/>
-              </a:rPr>
-              <a:t>or Perish Theory</a:t>
+              <a:t>Publish or Perish Theory</a:t>
             </a:r>
             <a:endParaRPr lang="en-US" sz="1800" dirty="0">
               <a:latin typeface="Times New Roman" pitchFamily="18" charset="0"/>
@@ -14266,14 +14058,7 @@
                 <a:latin typeface="Times New Roman" pitchFamily="18" charset="0"/>
                 <a:cs typeface="Times New Roman" pitchFamily="18" charset="0"/>
               </a:rPr>
-              <a:t>Healthy and steady increase in number of papers </a:t>
-            </a:r>
-            <a:r>
-              <a:rPr lang="en-US" sz="1800" dirty="0" smtClean="0">
-                <a:latin typeface="Times New Roman" pitchFamily="18" charset="0"/>
-                <a:cs typeface="Times New Roman" pitchFamily="18" charset="0"/>
-              </a:rPr>
-              <a:t>published</a:t>
+              <a:t>Healthy and steady increase in number of papers published</a:t>
             </a:r>
           </a:p>
           <a:p>
@@ -14296,21 +14081,7 @@
                 <a:latin typeface="Times New Roman" pitchFamily="18" charset="0"/>
                 <a:cs typeface="Times New Roman" pitchFamily="18" charset="0"/>
               </a:rPr>
-              <a:t>More </a:t>
-            </a:r>
-            <a:r>
-              <a:rPr lang="en-US" sz="1800" dirty="0" smtClean="0">
-                <a:latin typeface="Times New Roman" pitchFamily="18" charset="0"/>
-                <a:cs typeface="Times New Roman" pitchFamily="18" charset="0"/>
-              </a:rPr>
-              <a:t>papers published in top tier conferences</a:t>
-            </a:r>
-            <a:r>
-              <a:rPr lang="en-US" sz="1800" dirty="0" smtClean="0">
-                <a:latin typeface="Times New Roman" pitchFamily="18" charset="0"/>
-                <a:cs typeface="Times New Roman" pitchFamily="18" charset="0"/>
-              </a:rPr>
-              <a:t>. </a:t>
+              <a:t>More papers published in top tier conferences. </a:t>
             </a:r>
             <a:endParaRPr lang="en-US" sz="1800" dirty="0">
               <a:latin typeface="Times New Roman" pitchFamily="18" charset="0"/>

</xml_diff>

<commit_message>
Final slide, and paper
</commit_message>
<xml_diff>
--- a/RTBD.pptx
+++ b/RTBD.pptx
@@ -1678,11 +1678,11 @@
           </c:val>
         </c:ser>
         <c:marker val="1"/>
-        <c:axId val="84532224"/>
-        <c:axId val="84538496"/>
+        <c:axId val="85384192"/>
+        <c:axId val="85406848"/>
       </c:lineChart>
       <c:catAx>
-        <c:axId val="84532224"/>
+        <c:axId val="85384192"/>
         <c:scaling>
           <c:orientation val="minMax"/>
         </c:scaling>
@@ -1707,14 +1707,14 @@
         </c:title>
         <c:numFmt formatCode="General" sourceLinked="1"/>
         <c:tickLblPos val="nextTo"/>
-        <c:crossAx val="84538496"/>
+        <c:crossAx val="85406848"/>
         <c:crosses val="autoZero"/>
         <c:auto val="1"/>
         <c:lblAlgn val="ctr"/>
         <c:lblOffset val="100"/>
       </c:catAx>
       <c:valAx>
-        <c:axId val="84538496"/>
+        <c:axId val="85406848"/>
         <c:scaling>
           <c:orientation val="minMax"/>
         </c:scaling>
@@ -1740,7 +1740,7 @@
         </c:title>
         <c:numFmt formatCode="General" sourceLinked="1"/>
         <c:tickLblPos val="nextTo"/>
-        <c:crossAx val="84532224"/>
+        <c:crossAx val="85384192"/>
         <c:crosses val="autoZero"/>
         <c:crossBetween val="between"/>
       </c:valAx>
@@ -1962,7 +1962,7 @@
                 <c:formatCode>General</c:formatCode>
                 <c:ptCount val="45"/>
                 <c:pt idx="0">
-                  <c:v>1.5333332999999998</c:v>
+                  <c:v>1.5333332999999996</c:v>
                 </c:pt>
                 <c:pt idx="1">
                   <c:v>1.1000000000000001</c:v>
@@ -1971,13 +1971,13 @@
                   <c:v>1.2592591999999998</c:v>
                 </c:pt>
                 <c:pt idx="3">
-                  <c:v>1.3333333999999997</c:v>
+                  <c:v>1.3333333999999994</c:v>
                 </c:pt>
                 <c:pt idx="4">
                   <c:v>1.2</c:v>
                 </c:pt>
                 <c:pt idx="5">
-                  <c:v>1.2857142999999998</c:v>
+                  <c:v>1.2857142999999995</c:v>
                 </c:pt>
                 <c:pt idx="6">
                   <c:v>1.1534391999999998</c:v>
@@ -2004,7 +2004,7 @@
                   <c:v>1.2965880000000001</c:v>
                 </c:pt>
                 <c:pt idx="14">
-                  <c:v>1.2594696999999995</c:v>
+                  <c:v>1.259469699999999</c:v>
                 </c:pt>
                 <c:pt idx="15">
                   <c:v>1.1790744</c:v>
@@ -2013,19 +2013,19 @@
                   <c:v>1.1752137</c:v>
                 </c:pt>
                 <c:pt idx="17">
-                  <c:v>1.3136426999999997</c:v>
+                  <c:v>1.3136426999999995</c:v>
                 </c:pt>
                 <c:pt idx="18">
-                  <c:v>1.2722062999999997</c:v>
+                  <c:v>1.2722062999999995</c:v>
                 </c:pt>
                 <c:pt idx="19">
-                  <c:v>1.3315216999999995</c:v>
+                  <c:v>1.331521699999999</c:v>
                 </c:pt>
                 <c:pt idx="20">
                   <c:v>1.3363533000000001</c:v>
                 </c:pt>
                 <c:pt idx="21">
-                  <c:v>1.3136494999999997</c:v>
+                  <c:v>1.3136494999999995</c:v>
                 </c:pt>
                 <c:pt idx="22">
                   <c:v>1.3222221999999999</c:v>
@@ -2043,7 +2043,7 @@
                   <c:v>1.3460608999999999</c:v>
                 </c:pt>
                 <c:pt idx="27">
-                  <c:v>1.3318681999999997</c:v>
+                  <c:v>1.3318681999999995</c:v>
                 </c:pt>
                 <c:pt idx="28">
                   <c:v>1.3843172000000001</c:v>
@@ -2052,49 +2052,49 @@
                   <c:v>1.3602281999999999</c:v>
                 </c:pt>
                 <c:pt idx="30">
-                  <c:v>1.4276644999999994</c:v>
+                  <c:v>1.427664499999999</c:v>
                 </c:pt>
                 <c:pt idx="31">
-                  <c:v>1.4053898999999999</c:v>
+                  <c:v>1.4053898999999996</c:v>
                 </c:pt>
                 <c:pt idx="32">
                   <c:v>1.4091531999999998</c:v>
                 </c:pt>
                 <c:pt idx="33">
-                  <c:v>1.4528626999999998</c:v>
+                  <c:v>1.4528626999999996</c:v>
                 </c:pt>
                 <c:pt idx="34">
-                  <c:v>1.4339292999999995</c:v>
+                  <c:v>1.4339292999999989</c:v>
                 </c:pt>
                 <c:pt idx="35">
-                  <c:v>1.4420018999999997</c:v>
+                  <c:v>1.4420018999999995</c:v>
                 </c:pt>
                 <c:pt idx="36">
-                  <c:v>1.4407299999999998</c:v>
+                  <c:v>1.4407299999999996</c:v>
                 </c:pt>
                 <c:pt idx="37">
-                  <c:v>1.4735006999999998</c:v>
+                  <c:v>1.4735006999999996</c:v>
                 </c:pt>
                 <c:pt idx="38">
-                  <c:v>1.4253210999999995</c:v>
+                  <c:v>1.425321099999999</c:v>
                 </c:pt>
                 <c:pt idx="39">
-                  <c:v>1.4645901999999997</c:v>
+                  <c:v>1.4645901999999995</c:v>
                 </c:pt>
                 <c:pt idx="40">
                   <c:v>1.4566339999999998</c:v>
                 </c:pt>
                 <c:pt idx="41">
-                  <c:v>1.4192887999999997</c:v>
+                  <c:v>1.4192887999999995</c:v>
                 </c:pt>
                 <c:pt idx="42">
                   <c:v>1.4342088</c:v>
                 </c:pt>
                 <c:pt idx="43">
-                  <c:v>1.3759732999999998</c:v>
+                  <c:v>1.3759732999999996</c:v>
                 </c:pt>
                 <c:pt idx="44">
-                  <c:v>1.4216337999999995</c:v>
+                  <c:v>1.4216337999999991</c:v>
                 </c:pt>
               </c:numCache>
             </c:numRef>
@@ -2268,7 +2268,7 @@
                 <c:formatCode>General</c:formatCode>
                 <c:ptCount val="45"/>
                 <c:pt idx="0">
-                  <c:v>1.5333332999999998</c:v>
+                  <c:v>1.5333332999999996</c:v>
                 </c:pt>
                 <c:pt idx="1">
                   <c:v>1.1000000000000001</c:v>
@@ -2277,7 +2277,7 @@
                   <c:v>1.2592591999999998</c:v>
                 </c:pt>
                 <c:pt idx="3">
-                  <c:v>1.3333333999999997</c:v>
+                  <c:v>1.3333333999999994</c:v>
                 </c:pt>
                 <c:pt idx="4">
                   <c:v>1.2</c:v>
@@ -2295,22 +2295,22 @@
                   <c:v>1.0971428000000001</c:v>
                 </c:pt>
                 <c:pt idx="9">
-                  <c:v>1.2634407999999997</c:v>
+                  <c:v>1.2634407999999995</c:v>
                 </c:pt>
                 <c:pt idx="10">
                   <c:v>1.0935251999999998</c:v>
                 </c:pt>
                 <c:pt idx="11">
-                  <c:v>1.3039215999999996</c:v>
+                  <c:v>1.3039215999999993</c:v>
                 </c:pt>
                 <c:pt idx="12">
-                  <c:v>1.1753246999999998</c:v>
+                  <c:v>1.1753246999999996</c:v>
                 </c:pt>
                 <c:pt idx="13">
-                  <c:v>1.2769952999999998</c:v>
+                  <c:v>1.2769952999999996</c:v>
                 </c:pt>
                 <c:pt idx="14">
-                  <c:v>1.2250922999999998</c:v>
+                  <c:v>1.2250922999999996</c:v>
                 </c:pt>
                 <c:pt idx="15">
                   <c:v>1.13486</c:v>
@@ -2319,28 +2319,28 @@
                   <c:v>1.1565657</c:v>
                 </c:pt>
                 <c:pt idx="17">
-                  <c:v>1.2412934999999998</c:v>
+                  <c:v>1.2412934999999996</c:v>
                 </c:pt>
                 <c:pt idx="18">
-                  <c:v>1.2531644999999998</c:v>
+                  <c:v>1.2531644999999996</c:v>
                 </c:pt>
                 <c:pt idx="19">
                   <c:v>1.2227378</c:v>
                 </c:pt>
                 <c:pt idx="20">
-                  <c:v>1.2711442999999998</c:v>
+                  <c:v>1.2711442999999996</c:v>
                 </c:pt>
                 <c:pt idx="21">
-                  <c:v>1.3950616999999998</c:v>
+                  <c:v>1.3950616999999996</c:v>
                 </c:pt>
                 <c:pt idx="22">
-                  <c:v>1.2415253999999998</c:v>
+                  <c:v>1.2415253999999996</c:v>
                 </c:pt>
                 <c:pt idx="23">
                   <c:v>1.3080261</c:v>
                 </c:pt>
                 <c:pt idx="24">
-                  <c:v>1.3378607999999999</c:v>
+                  <c:v>1.3378607999999996</c:v>
                 </c:pt>
                 <c:pt idx="25">
                   <c:v>1.3412161999999999</c:v>
@@ -2352,7 +2352,7 @@
                   <c:v>1.3510971999999999</c:v>
                 </c:pt>
                 <c:pt idx="28">
-                  <c:v>1.3950616999999998</c:v>
+                  <c:v>1.3950616999999996</c:v>
                 </c:pt>
                 <c:pt idx="29">
                   <c:v>1.3694445</c:v>
@@ -2361,31 +2361,31 @@
                   <c:v>1.3577024</c:v>
                 </c:pt>
                 <c:pt idx="31">
-                  <c:v>1.4111841999999997</c:v>
+                  <c:v>1.4111841999999994</c:v>
                 </c:pt>
                 <c:pt idx="32">
-                  <c:v>1.3873044999999997</c:v>
+                  <c:v>1.3873044999999995</c:v>
                 </c:pt>
                 <c:pt idx="33">
-                  <c:v>1.4390637999999998</c:v>
+                  <c:v>1.4390637999999996</c:v>
                 </c:pt>
                 <c:pt idx="34">
                   <c:v>1.4364679999999999</c:v>
                 </c:pt>
                 <c:pt idx="35">
-                  <c:v>1.4345237999999998</c:v>
+                  <c:v>1.4345237999999996</c:v>
                 </c:pt>
                 <c:pt idx="36">
                   <c:v>1.3801653</c:v>
                 </c:pt>
                 <c:pt idx="37">
-                  <c:v>1.3787558000000002</c:v>
+                  <c:v>1.3787558000000004</c:v>
                 </c:pt>
                 <c:pt idx="38">
                   <c:v>1.4283129999999999</c:v>
                 </c:pt>
                 <c:pt idx="39">
-                  <c:v>1.4081166999999999</c:v>
+                  <c:v>1.4081166999999997</c:v>
                 </c:pt>
                 <c:pt idx="40">
                   <c:v>1.3248629999999999</c:v>
@@ -2394,7 +2394,7 @@
                   <c:v>1.3101487000000001</c:v>
                 </c:pt>
                 <c:pt idx="42">
-                  <c:v>1.2901889000000002</c:v>
+                  <c:v>1.2901889000000004</c:v>
                 </c:pt>
                 <c:pt idx="43">
                   <c:v>1.2454755999999998</c:v>
@@ -2574,13 +2574,13 @@
                 <c:formatCode>General</c:formatCode>
                 <c:ptCount val="45"/>
                 <c:pt idx="12">
-                  <c:v>1.1458333999999997</c:v>
+                  <c:v>1.1458333999999994</c:v>
                 </c:pt>
                 <c:pt idx="13">
                   <c:v>0</c:v>
                 </c:pt>
                 <c:pt idx="14">
-                  <c:v>1.2134830999999997</c:v>
+                  <c:v>1.2134830999999995</c:v>
                 </c:pt>
                 <c:pt idx="15">
                   <c:v>0</c:v>
@@ -2592,34 +2592,34 @@
                   <c:v>1.0317459999999998</c:v>
                 </c:pt>
                 <c:pt idx="18">
-                  <c:v>1.0434782999999999</c:v>
+                  <c:v>1.0434782999999996</c:v>
                 </c:pt>
                 <c:pt idx="19">
                   <c:v>1.0762711999999999</c:v>
                 </c:pt>
                 <c:pt idx="20">
-                  <c:v>1.1066666999999997</c:v>
+                  <c:v>1.1066666999999994</c:v>
                 </c:pt>
                 <c:pt idx="21">
-                  <c:v>1.0438143999999998</c:v>
+                  <c:v>1.0438143999999996</c:v>
                 </c:pt>
                 <c:pt idx="22">
                   <c:v>1.0653154</c:v>
                 </c:pt>
                 <c:pt idx="23">
-                  <c:v>1.0594713999999998</c:v>
+                  <c:v>1.0594713999999996</c:v>
                 </c:pt>
                 <c:pt idx="24">
                   <c:v>1.1578170999999999</c:v>
                 </c:pt>
                 <c:pt idx="25">
-                  <c:v>1.0748298999999997</c:v>
+                  <c:v>1.0748298999999994</c:v>
                 </c:pt>
                 <c:pt idx="26">
                   <c:v>1.1320182000000001</c:v>
                 </c:pt>
                 <c:pt idx="27">
-                  <c:v>1.1224105000000002</c:v>
+                  <c:v>1.1224105000000004</c:v>
                 </c:pt>
                 <c:pt idx="28">
                   <c:v>1.1406883000000001</c:v>
@@ -2631,13 +2631,13 @@
                   <c:v>1.1932007</c:v>
                 </c:pt>
                 <c:pt idx="31">
-                  <c:v>1.1880805000000003</c:v>
+                  <c:v>1.1880805000000005</c:v>
                 </c:pt>
                 <c:pt idx="32">
-                  <c:v>1.1863573000000003</c:v>
+                  <c:v>1.1863573000000005</c:v>
                 </c:pt>
                 <c:pt idx="33">
-                  <c:v>1.1770244999999997</c:v>
+                  <c:v>1.1770244999999995</c:v>
                 </c:pt>
                 <c:pt idx="34">
                   <c:v>1.1512935999999998</c:v>
@@ -2646,28 +2646,28 @@
                   <c:v>1.2283169</c:v>
                 </c:pt>
                 <c:pt idx="36">
-                  <c:v>1.2179253999999995</c:v>
+                  <c:v>1.217925399999999</c:v>
                 </c:pt>
                 <c:pt idx="37">
-                  <c:v>1.2480915999999997</c:v>
+                  <c:v>1.2480915999999995</c:v>
                 </c:pt>
                 <c:pt idx="38">
-                  <c:v>1.1883891000000002</c:v>
+                  <c:v>1.1883891000000004</c:v>
                 </c:pt>
                 <c:pt idx="39">
-                  <c:v>1.2593713999999998</c:v>
+                  <c:v>1.2593713999999996</c:v>
                 </c:pt>
                 <c:pt idx="40">
                   <c:v>1.3066514</c:v>
                 </c:pt>
                 <c:pt idx="41">
-                  <c:v>1.2787233999999998</c:v>
+                  <c:v>1.2787233999999996</c:v>
                 </c:pt>
                 <c:pt idx="42">
                   <c:v>1.2653855999999999</c:v>
                 </c:pt>
                 <c:pt idx="43">
-                  <c:v>1.2610710999999997</c:v>
+                  <c:v>1.2610710999999994</c:v>
                 </c:pt>
                 <c:pt idx="44">
                   <c:v>1.3033139999999999</c:v>
@@ -2856,7 +2856,7 @@
                   <c:v>1.02</c:v>
                 </c:pt>
                 <c:pt idx="16">
-                  <c:v>1.0249999999999997</c:v>
+                  <c:v>1.0249999999999995</c:v>
                 </c:pt>
                 <c:pt idx="17">
                   <c:v>1</c:v>
@@ -2868,7 +2868,7 @@
                   <c:v>1</c:v>
                 </c:pt>
                 <c:pt idx="20">
-                  <c:v>1.0754715999999997</c:v>
+                  <c:v>1.0754715999999995</c:v>
                 </c:pt>
                 <c:pt idx="21">
                   <c:v>1</c:v>
@@ -2880,10 +2880,10 @@
                   <c:v>1.0884955999999999</c:v>
                 </c:pt>
                 <c:pt idx="24">
-                  <c:v>1.0552763999999997</c:v>
+                  <c:v>1.0552763999999994</c:v>
                 </c:pt>
                 <c:pt idx="25">
-                  <c:v>1.1560975000000002</c:v>
+                  <c:v>1.1560975000000004</c:v>
                 </c:pt>
                 <c:pt idx="26">
                   <c:v>1.0979729999999999</c:v>
@@ -2898,19 +2898,19 @@
                   <c:v>1.1442623000000001</c:v>
                 </c:pt>
                 <c:pt idx="30">
-                  <c:v>1.1097045999999997</c:v>
+                  <c:v>1.1097045999999995</c:v>
                 </c:pt>
                 <c:pt idx="31">
-                  <c:v>1.1475693999999999</c:v>
+                  <c:v>1.1475693999999996</c:v>
                 </c:pt>
                 <c:pt idx="32">
                   <c:v>1.1167883000000001</c:v>
                 </c:pt>
                 <c:pt idx="33">
-                  <c:v>1.1203539000000002</c:v>
+                  <c:v>1.1203539000000005</c:v>
                 </c:pt>
                 <c:pt idx="34">
-                  <c:v>1.1584158000000002</c:v>
+                  <c:v>1.1584158000000004</c:v>
                 </c:pt>
                 <c:pt idx="35">
                   <c:v>1.1191335999999998</c:v>
@@ -2934,13 +2934,13 @@
                   <c:v>1.1242361999999999</c:v>
                 </c:pt>
                 <c:pt idx="42">
-                  <c:v>1.1536842999999999</c:v>
+                  <c:v>1.1536842999999997</c:v>
                 </c:pt>
                 <c:pt idx="43">
                   <c:v>1.1225681000000001</c:v>
                 </c:pt>
                 <c:pt idx="44">
-                  <c:v>1.1642157000000002</c:v>
+                  <c:v>1.1642157000000004</c:v>
                 </c:pt>
               </c:numCache>
             </c:numRef>
@@ -3114,13 +3114,13 @@
                 <c:formatCode>General</c:formatCode>
                 <c:ptCount val="45"/>
                 <c:pt idx="17">
-                  <c:v>1.0238095999999997</c:v>
+                  <c:v>1.0238095999999994</c:v>
                 </c:pt>
                 <c:pt idx="18">
-                  <c:v>1.0208333999999997</c:v>
+                  <c:v>1.0208333999999994</c:v>
                 </c:pt>
                 <c:pt idx="19">
-                  <c:v>1.0099009999999997</c:v>
+                  <c:v>1.0099009999999995</c:v>
                 </c:pt>
                 <c:pt idx="20">
                   <c:v>1.125</c:v>
@@ -3132,7 +3132,7 @@
                   <c:v>1.0972221999999998</c:v>
                 </c:pt>
                 <c:pt idx="23">
-                  <c:v>1.0543479000000002</c:v>
+                  <c:v>1.0543479000000004</c:v>
                 </c:pt>
                 <c:pt idx="24">
                   <c:v>1.1666665999999999</c:v>
@@ -3147,25 +3147,25 @@
                   <c:v>1.0372671</c:v>
                 </c:pt>
                 <c:pt idx="28">
-                  <c:v>1.1551155000000002</c:v>
+                  <c:v>1.1551155000000004</c:v>
                 </c:pt>
                 <c:pt idx="29">
                   <c:v>1.0712074</c:v>
                 </c:pt>
                 <c:pt idx="30">
-                  <c:v>1.1218486999999997</c:v>
+                  <c:v>1.1218486999999995</c:v>
                 </c:pt>
                 <c:pt idx="31">
                   <c:v>1.1705810000000001</c:v>
                 </c:pt>
                 <c:pt idx="32">
-                  <c:v>1.1654846999999997</c:v>
+                  <c:v>1.1654846999999995</c:v>
                 </c:pt>
                 <c:pt idx="33">
                   <c:v>1.1066822999999999</c:v>
                 </c:pt>
                 <c:pt idx="34">
-                  <c:v>1.1034482999999997</c:v>
+                  <c:v>1.1034482999999995</c:v>
                 </c:pt>
                 <c:pt idx="35">
                   <c:v>1.1030445</c:v>
@@ -3195,18 +3195,18 @@
                   <c:v>1.0980148000000001</c:v>
                 </c:pt>
                 <c:pt idx="44">
-                  <c:v>1.1192367999999997</c:v>
+                  <c:v>1.1192367999999995</c:v>
                 </c:pt>
               </c:numCache>
             </c:numRef>
           </c:val>
         </c:ser>
         <c:marker val="1"/>
-        <c:axId val="84665088"/>
-        <c:axId val="84667008"/>
+        <c:axId val="85521152"/>
+        <c:axId val="85523072"/>
       </c:lineChart>
       <c:catAx>
-        <c:axId val="84665088"/>
+        <c:axId val="85521152"/>
         <c:scaling>
           <c:orientation val="minMax"/>
         </c:scaling>
@@ -3231,14 +3231,14 @@
         </c:title>
         <c:numFmt formatCode="General" sourceLinked="1"/>
         <c:tickLblPos val="nextTo"/>
-        <c:crossAx val="84667008"/>
+        <c:crossAx val="85523072"/>
         <c:crosses val="autoZero"/>
         <c:auto val="1"/>
         <c:lblAlgn val="ctr"/>
         <c:lblOffset val="100"/>
       </c:catAx>
       <c:valAx>
-        <c:axId val="84667008"/>
+        <c:axId val="85523072"/>
         <c:scaling>
           <c:orientation val="minMax"/>
         </c:scaling>
@@ -3264,7 +3264,7 @@
         </c:title>
         <c:numFmt formatCode="General" sourceLinked="1"/>
         <c:tickLblPos val="nextTo"/>
-        <c:crossAx val="84665088"/>
+        <c:crossAx val="85521152"/>
         <c:crosses val="autoZero"/>
         <c:crossBetween val="between"/>
       </c:valAx>
@@ -3490,25 +3490,25 @@
                 <c:formatCode>General</c:formatCode>
                 <c:ptCount val="45"/>
                 <c:pt idx="0">
-                  <c:v>0.17391305000000004</c:v>
+                  <c:v>0.17391305000000007</c:v>
                 </c:pt>
                 <c:pt idx="1">
-                  <c:v>0.54545455999999992</c:v>
+                  <c:v>0.54545455999999981</c:v>
                 </c:pt>
                 <c:pt idx="2">
-                  <c:v>0.29411766000000006</c:v>
+                  <c:v>0.29411766000000011</c:v>
                 </c:pt>
                 <c:pt idx="3">
                   <c:v>1.1363635999999999</c:v>
                 </c:pt>
                 <c:pt idx="4">
-                  <c:v>0.16666666999999996</c:v>
+                  <c:v>0.16666666999999993</c:v>
                 </c:pt>
                 <c:pt idx="5">
-                  <c:v>0.77777780000000007</c:v>
+                  <c:v>0.7777778000000003</c:v>
                 </c:pt>
                 <c:pt idx="6">
-                  <c:v>1.1743119000000002</c:v>
+                  <c:v>1.1743119000000004</c:v>
                 </c:pt>
                 <c:pt idx="7">
                   <c:v>1.3153154</c:v>
@@ -3526,16 +3526,16 @@
                   <c:v>1.5335121</c:v>
                 </c:pt>
                 <c:pt idx="12">
-                  <c:v>1.0298849999999997</c:v>
+                  <c:v>1.0298849999999995</c:v>
                 </c:pt>
                 <c:pt idx="13">
-                  <c:v>1.6923077000000002</c:v>
+                  <c:v>1.6923077000000004</c:v>
                 </c:pt>
                 <c:pt idx="14">
-                  <c:v>1.7082706999999997</c:v>
+                  <c:v>1.7082706999999995</c:v>
                 </c:pt>
                 <c:pt idx="15">
-                  <c:v>2.952218499999999</c:v>
+                  <c:v>2.9522184999999981</c:v>
                 </c:pt>
                 <c:pt idx="16">
                   <c:v>1.9163635999999999</c:v>
@@ -3544,22 +3544,22 @@
                   <c:v>2.1970022</c:v>
                 </c:pt>
                 <c:pt idx="18">
-                  <c:v>1.7837837999999997</c:v>
+                  <c:v>1.7837837999999995</c:v>
                 </c:pt>
                 <c:pt idx="19">
-                  <c:v>2.0865307000000004</c:v>
+                  <c:v>2.0865307000000008</c:v>
                 </c:pt>
                 <c:pt idx="20">
-                  <c:v>1.9779660999999997</c:v>
+                  <c:v>1.9779660999999995</c:v>
                 </c:pt>
                 <c:pt idx="21">
                   <c:v>1.9395726</c:v>
                 </c:pt>
                 <c:pt idx="22">
-                  <c:v>1.6845508000000002</c:v>
+                  <c:v>1.6845508000000005</c:v>
                 </c:pt>
                 <c:pt idx="23">
-                  <c:v>1.8872092999999999</c:v>
+                  <c:v>1.8872092999999996</c:v>
                 </c:pt>
                 <c:pt idx="24">
                   <c:v>1.9656085000000001</c:v>
@@ -3574,7 +3574,7 @@
                   <c:v>2.3622112</c:v>
                 </c:pt>
                 <c:pt idx="28">
-                  <c:v>2.4158107999999996</c:v>
+                  <c:v>2.4158107999999991</c:v>
                 </c:pt>
                 <c:pt idx="29">
                   <c:v>2.4032353999999998</c:v>
@@ -3583,34 +3583,34 @@
                   <c:v>2.4905219999999999</c:v>
                 </c:pt>
                 <c:pt idx="31">
-                  <c:v>2.4018766999999994</c:v>
+                  <c:v>2.401876699999999</c:v>
                 </c:pt>
                 <c:pt idx="32">
                   <c:v>2.463244</c:v>
                 </c:pt>
                 <c:pt idx="33">
-                  <c:v>2.5999659999999998</c:v>
+                  <c:v>2.5999659999999993</c:v>
                 </c:pt>
                 <c:pt idx="34">
-                  <c:v>2.6943429999999995</c:v>
+                  <c:v>2.694342999999999</c:v>
                 </c:pt>
                 <c:pt idx="35">
-                  <c:v>2.7635770000000006</c:v>
+                  <c:v>2.7635770000000011</c:v>
                 </c:pt>
                 <c:pt idx="36">
-                  <c:v>2.8496174999999995</c:v>
+                  <c:v>2.849617499999999</c:v>
                 </c:pt>
                 <c:pt idx="37">
                   <c:v>2.6204448</c:v>
                 </c:pt>
                 <c:pt idx="38">
-                  <c:v>2.8344010999999996</c:v>
+                  <c:v>2.8344010999999991</c:v>
                 </c:pt>
                 <c:pt idx="39">
-                  <c:v>2.8538169999999994</c:v>
+                  <c:v>2.8538169999999989</c:v>
                 </c:pt>
                 <c:pt idx="40">
-                  <c:v>2.9095659999999994</c:v>
+                  <c:v>2.909565999999999</c:v>
                 </c:pt>
                 <c:pt idx="41">
                   <c:v>3.0385646999999998</c:v>
@@ -3796,31 +3796,31 @@
                 <c:formatCode>General</c:formatCode>
                 <c:ptCount val="45"/>
                 <c:pt idx="0">
-                  <c:v>0.17391305000000004</c:v>
+                  <c:v>0.17391305000000007</c:v>
                 </c:pt>
                 <c:pt idx="1">
-                  <c:v>0.54545455999999992</c:v>
+                  <c:v>0.54545455999999981</c:v>
                 </c:pt>
                 <c:pt idx="2">
-                  <c:v>0.29411766000000006</c:v>
+                  <c:v>0.29411766000000011</c:v>
                 </c:pt>
                 <c:pt idx="3">
                   <c:v>1.1363635999999999</c:v>
                 </c:pt>
                 <c:pt idx="4">
-                  <c:v>0.16666666999999996</c:v>
+                  <c:v>0.16666666999999993</c:v>
                 </c:pt>
                 <c:pt idx="5">
-                  <c:v>0.72500000000000009</c:v>
+                  <c:v>0.7250000000000002</c:v>
                 </c:pt>
                 <c:pt idx="6">
-                  <c:v>1.2717948999999997</c:v>
+                  <c:v>1.2717948999999993</c:v>
                 </c:pt>
                 <c:pt idx="7">
                   <c:v>0.86956520000000004</c:v>
                 </c:pt>
                 <c:pt idx="8">
-                  <c:v>1.5416665999999997</c:v>
+                  <c:v>1.5416665999999994</c:v>
                 </c:pt>
                 <c:pt idx="9">
                   <c:v>1.2340424999999999</c:v>
@@ -3835,22 +3835,22 @@
                   <c:v>0.93922649999999996</c:v>
                 </c:pt>
                 <c:pt idx="13">
-                  <c:v>1.4191176999999997</c:v>
+                  <c:v>1.4191176999999995</c:v>
                 </c:pt>
                 <c:pt idx="14">
                   <c:v>1.6385542</c:v>
                 </c:pt>
                 <c:pt idx="15">
-                  <c:v>2.1928249999999996</c:v>
+                  <c:v>2.1928249999999991</c:v>
                 </c:pt>
                 <c:pt idx="16">
                   <c:v>1.4061135</c:v>
                 </c:pt>
                 <c:pt idx="17">
-                  <c:v>2.2885770000000005</c:v>
+                  <c:v>2.288577000000001</c:v>
                 </c:pt>
                 <c:pt idx="18">
-                  <c:v>1.5838382999999998</c:v>
+                  <c:v>1.5838382999999996</c:v>
                 </c:pt>
                 <c:pt idx="19">
                   <c:v>1.9582542000000001</c:v>
@@ -3862,19 +3862,19 @@
                   <c:v>1.8761061000000001</c:v>
                 </c:pt>
                 <c:pt idx="22">
-                  <c:v>1.7542662999999998</c:v>
+                  <c:v>1.7542662999999996</c:v>
                 </c:pt>
                 <c:pt idx="23">
                   <c:v>1.7545605999999998</c:v>
                 </c:pt>
                 <c:pt idx="24">
-                  <c:v>2.2081218000000007</c:v>
+                  <c:v>2.2081218000000016</c:v>
                 </c:pt>
                 <c:pt idx="25">
                   <c:v>3.2745593</c:v>
                 </c:pt>
                 <c:pt idx="26">
-                  <c:v>2.4328899999999996</c:v>
+                  <c:v>2.4328899999999987</c:v>
                 </c:pt>
                 <c:pt idx="27">
                   <c:v>2.9071924999999998</c:v>
@@ -3886,7 +3886,7 @@
                   <c:v>3.0385396</c:v>
                 </c:pt>
                 <c:pt idx="30">
-                  <c:v>3.4365384999999997</c:v>
+                  <c:v>3.4365384999999993</c:v>
                 </c:pt>
                 <c:pt idx="31">
                   <c:v>3.006993</c:v>
@@ -3907,7 +3907,7 @@
                   <c:v>3.3807678000000001</c:v>
                 </c:pt>
                 <c:pt idx="37">
-                  <c:v>2.8305709999999995</c:v>
+                  <c:v>2.8305709999999991</c:v>
                 </c:pt>
                 <c:pt idx="38">
                   <c:v>3.0557314999999998</c:v>
@@ -3919,10 +3919,10 @@
                   <c:v>3.2824369999999998</c:v>
                 </c:pt>
                 <c:pt idx="41">
-                  <c:v>3.3916527999999992</c:v>
+                  <c:v>3.3916527999999984</c:v>
                 </c:pt>
                 <c:pt idx="42">
-                  <c:v>3.4116386999999997</c:v>
+                  <c:v>3.4116386999999992</c:v>
                 </c:pt>
                 <c:pt idx="43">
                   <c:v>3.6609538000000001</c:v>
@@ -4108,7 +4108,7 @@
                   <c:v>0</c:v>
                 </c:pt>
                 <c:pt idx="14">
-                  <c:v>2.0185183999999996</c:v>
+                  <c:v>2.0185183999999992</c:v>
                 </c:pt>
                 <c:pt idx="15">
                   <c:v>0</c:v>
@@ -4117,43 +4117,43 @@
                   <c:v>1.6792452</c:v>
                 </c:pt>
                 <c:pt idx="17">
-                  <c:v>2.8307692999999996</c:v>
+                  <c:v>2.8307692999999992</c:v>
                 </c:pt>
                 <c:pt idx="18">
-                  <c:v>0.16666666999999996</c:v>
+                  <c:v>0.16666666999999993</c:v>
                 </c:pt>
                 <c:pt idx="19">
-                  <c:v>1.9842520000000001</c:v>
+                  <c:v>1.9842520000000003</c:v>
                 </c:pt>
                 <c:pt idx="20">
                   <c:v>2.1144577999999998</c:v>
                 </c:pt>
                 <c:pt idx="21">
-                  <c:v>1.6296295999999997</c:v>
+                  <c:v>1.6296295999999995</c:v>
                 </c:pt>
                 <c:pt idx="22">
                   <c:v>1.7885835000000001</c:v>
                 </c:pt>
                 <c:pt idx="23">
-                  <c:v>1.7297297999999997</c:v>
+                  <c:v>1.7297297999999992</c:v>
                 </c:pt>
                 <c:pt idx="24">
                   <c:v>1.9057325000000001</c:v>
                 </c:pt>
                 <c:pt idx="25">
-                  <c:v>2.3955695999999995</c:v>
+                  <c:v>2.3955695999999991</c:v>
                 </c:pt>
                 <c:pt idx="26">
                   <c:v>2.1179623999999997</c:v>
                 </c:pt>
                 <c:pt idx="27">
-                  <c:v>2.1308724999999997</c:v>
+                  <c:v>2.1308724999999993</c:v>
                 </c:pt>
                 <c:pt idx="28">
-                  <c:v>2.0940549999999996</c:v>
+                  <c:v>2.0940549999999991</c:v>
                 </c:pt>
                 <c:pt idx="29">
-                  <c:v>2.0075330000000005</c:v>
+                  <c:v>2.0075330000000009</c:v>
                 </c:pt>
                 <c:pt idx="30">
                   <c:v>2.1250868000000001</c:v>
@@ -4162,7 +4162,7 @@
                   <c:v>2.2644951</c:v>
                 </c:pt>
                 <c:pt idx="32">
-                  <c:v>2.2133965000000004</c:v>
+                  <c:v>2.2133965000000009</c:v>
                 </c:pt>
                 <c:pt idx="33">
                   <c:v>2.4949333999999999</c:v>
@@ -4171,19 +4171,19 @@
                   <c:v>2.6888130000000001</c:v>
                 </c:pt>
                 <c:pt idx="35">
-                  <c:v>2.7335877000000006</c:v>
+                  <c:v>2.7335877000000011</c:v>
                 </c:pt>
                 <c:pt idx="36">
-                  <c:v>2.5760178999999996</c:v>
+                  <c:v>2.5760178999999992</c:v>
                 </c:pt>
                 <c:pt idx="37">
                   <c:v>2.6123852999999997</c:v>
                 </c:pt>
                 <c:pt idx="38">
-                  <c:v>2.5719829999999995</c:v>
+                  <c:v>2.571982999999999</c:v>
                 </c:pt>
                 <c:pt idx="39">
-                  <c:v>2.5315694999999994</c:v>
+                  <c:v>2.5315694999999989</c:v>
                 </c:pt>
                 <c:pt idx="40">
                   <c:v>2.888938</c:v>
@@ -4192,13 +4192,13 @@
                   <c:v>2.9545993999999998</c:v>
                 </c:pt>
                 <c:pt idx="42">
-                  <c:v>2.8023766999999995</c:v>
+                  <c:v>2.8023766999999991</c:v>
                 </c:pt>
                 <c:pt idx="43">
                   <c:v>2.9869335000000001</c:v>
                 </c:pt>
                 <c:pt idx="44">
-                  <c:v>3.1696429999999998</c:v>
+                  <c:v>3.1696429999999993</c:v>
                 </c:pt>
               </c:numCache>
             </c:numRef>
@@ -4375,16 +4375,16 @@
                   <c:v>1.3</c:v>
                 </c:pt>
                 <c:pt idx="13">
-                  <c:v>2.2941177000000006</c:v>
+                  <c:v>2.294117700000001</c:v>
                 </c:pt>
                 <c:pt idx="14">
                   <c:v>0</c:v>
                 </c:pt>
                 <c:pt idx="15">
-                  <c:v>10.862745000000002</c:v>
+                  <c:v>10.862745000000004</c:v>
                 </c:pt>
                 <c:pt idx="16">
-                  <c:v>6.9756100000000005</c:v>
+                  <c:v>6.9756100000000014</c:v>
                 </c:pt>
                 <c:pt idx="17">
                   <c:v>1.9000000000000001</c:v>
@@ -4399,13 +4399,13 @@
                   <c:v>2</c:v>
                 </c:pt>
                 <c:pt idx="21">
-                  <c:v>1.5483870000000002</c:v>
+                  <c:v>1.5483870000000004</c:v>
                 </c:pt>
                 <c:pt idx="22">
                   <c:v>1.8580645</c:v>
                 </c:pt>
                 <c:pt idx="23">
-                  <c:v>1.9674796999999997</c:v>
+                  <c:v>1.9674796999999995</c:v>
                 </c:pt>
                 <c:pt idx="24">
                   <c:v>2.2571428</c:v>
@@ -4420,22 +4420,22 @@
                   <c:v>2.1458333000000001</c:v>
                 </c:pt>
                 <c:pt idx="28">
-                  <c:v>1.9771428000000002</c:v>
+                  <c:v>1.9771428000000004</c:v>
                 </c:pt>
                 <c:pt idx="29">
-                  <c:v>2.1318051999999996</c:v>
+                  <c:v>2.1318051999999987</c:v>
                 </c:pt>
                 <c:pt idx="30">
                   <c:v>2.0038022999999998</c:v>
                 </c:pt>
                 <c:pt idx="31">
-                  <c:v>2.3721632999999995</c:v>
+                  <c:v>2.3721632999999991</c:v>
                 </c:pt>
                 <c:pt idx="32">
                   <c:v>2.1176472</c:v>
                 </c:pt>
                 <c:pt idx="33">
-                  <c:v>2.1516587999999994</c:v>
+                  <c:v>2.151658799999999</c:v>
                 </c:pt>
                 <c:pt idx="34">
                   <c:v>2.0410255999999998</c:v>
@@ -4444,10 +4444,10 @@
                   <c:v>2.1451614000000001</c:v>
                 </c:pt>
                 <c:pt idx="36">
-                  <c:v>2.3060605999999995</c:v>
+                  <c:v>2.306060599999999</c:v>
                 </c:pt>
                 <c:pt idx="37">
-                  <c:v>2.2163589999999997</c:v>
+                  <c:v>2.2163589999999993</c:v>
                 </c:pt>
                 <c:pt idx="38">
                   <c:v>2.2852350000000001</c:v>
@@ -4465,7 +4465,7 @@
                   <c:v>2.4927007999999997</c:v>
                 </c:pt>
                 <c:pt idx="43">
-                  <c:v>2.4263431999999994</c:v>
+                  <c:v>2.4263431999999989</c:v>
                 </c:pt>
                 <c:pt idx="44">
                   <c:v>2.9642105000000001</c:v>
@@ -4645,7 +4645,7 @@
                   <c:v>2.4186045999999997</c:v>
                 </c:pt>
                 <c:pt idx="18">
-                  <c:v>1.2653060999999999</c:v>
+                  <c:v>1.2653060999999997</c:v>
                 </c:pt>
                 <c:pt idx="19">
                   <c:v>3.5882353999999999</c:v>
@@ -4660,13 +4660,13 @@
                   <c:v>1.1392405000000001</c:v>
                 </c:pt>
                 <c:pt idx="23">
-                  <c:v>1.6597938999999997</c:v>
+                  <c:v>1.6597938999999995</c:v>
                 </c:pt>
                 <c:pt idx="24">
                   <c:v>2.2142855999999997</c:v>
                 </c:pt>
                 <c:pt idx="25">
-                  <c:v>1.4942529000000002</c:v>
+                  <c:v>1.4942529000000004</c:v>
                 </c:pt>
                 <c:pt idx="26">
                   <c:v>1.9354838000000001</c:v>
@@ -4696,31 +4696,31 @@
                   <c:v>2.2455356000000002</c:v>
                 </c:pt>
                 <c:pt idx="35">
-                  <c:v>2.3248407999999996</c:v>
+                  <c:v>2.3248407999999992</c:v>
                 </c:pt>
                 <c:pt idx="36">
                   <c:v>2.3941068999999997</c:v>
                 </c:pt>
                 <c:pt idx="37">
-                  <c:v>2.4412664999999993</c:v>
+                  <c:v>2.4412664999999989</c:v>
                 </c:pt>
                 <c:pt idx="38">
-                  <c:v>2.3614089999999996</c:v>
+                  <c:v>2.3614089999999988</c:v>
                 </c:pt>
                 <c:pt idx="39">
                   <c:v>2.3622047999999998</c:v>
                 </c:pt>
                 <c:pt idx="40">
-                  <c:v>2.7175370000000005</c:v>
+                  <c:v>2.717537000000001</c:v>
                 </c:pt>
                 <c:pt idx="41">
                   <c:v>2.1294363000000001</c:v>
                 </c:pt>
                 <c:pt idx="42">
-                  <c:v>2.8550931999999998</c:v>
+                  <c:v>2.8550931999999993</c:v>
                 </c:pt>
                 <c:pt idx="43">
-                  <c:v>2.5514122999999995</c:v>
+                  <c:v>2.5514122999999991</c:v>
                 </c:pt>
                 <c:pt idx="44">
                   <c:v>2.4375</c:v>
@@ -4730,11 +4730,11 @@
           </c:val>
         </c:ser>
         <c:marker val="1"/>
-        <c:axId val="85354752"/>
-        <c:axId val="85361024"/>
+        <c:axId val="85747968"/>
+        <c:axId val="85754240"/>
       </c:lineChart>
       <c:catAx>
-        <c:axId val="85354752"/>
+        <c:axId val="85747968"/>
         <c:scaling>
           <c:orientation val="minMax"/>
         </c:scaling>
@@ -4759,14 +4759,14 @@
         </c:title>
         <c:numFmt formatCode="General" sourceLinked="1"/>
         <c:tickLblPos val="nextTo"/>
-        <c:crossAx val="85361024"/>
+        <c:crossAx val="85754240"/>
         <c:crosses val="autoZero"/>
         <c:auto val="1"/>
         <c:lblAlgn val="ctr"/>
         <c:lblOffset val="100"/>
       </c:catAx>
       <c:valAx>
-        <c:axId val="85361024"/>
+        <c:axId val="85754240"/>
         <c:scaling>
           <c:orientation val="minMax"/>
         </c:scaling>
@@ -4792,7 +4792,7 @@
         </c:title>
         <c:numFmt formatCode="General" sourceLinked="1"/>
         <c:tickLblPos val="nextTo"/>
-        <c:crossAx val="85354752"/>
+        <c:crossAx val="85747968"/>
         <c:crosses val="autoZero"/>
         <c:crossBetween val="between"/>
       </c:valAx>
@@ -5021,13 +5021,13 @@
                   <c:v>0.90476190000000001</c:v>
                 </c:pt>
                 <c:pt idx="1">
-                  <c:v>0.72000000000000008</c:v>
+                  <c:v>0.7200000000000002</c:v>
                 </c:pt>
                 <c:pt idx="2">
-                  <c:v>0.82758622999999987</c:v>
+                  <c:v>0.82758622999999976</c:v>
                 </c:pt>
                 <c:pt idx="3">
-                  <c:v>0.59259259999999991</c:v>
+                  <c:v>0.59259259999999969</c:v>
                 </c:pt>
                 <c:pt idx="4">
                   <c:v>0.90909094000000001</c:v>
@@ -5045,25 +5045,25 @@
                   <c:v>0.48760330000000002</c:v>
                 </c:pt>
                 <c:pt idx="9">
-                  <c:v>0.5962732999999999</c:v>
+                  <c:v>0.59627329999999978</c:v>
                 </c:pt>
                 <c:pt idx="10">
-                  <c:v>0.46308726000000006</c:v>
+                  <c:v>0.46308726000000011</c:v>
                 </c:pt>
                 <c:pt idx="11">
                   <c:v>0.57603689999999996</c:v>
                 </c:pt>
                 <c:pt idx="12">
-                  <c:v>0.54307114999999984</c:v>
+                  <c:v>0.54307114999999972</c:v>
                 </c:pt>
                 <c:pt idx="13">
-                  <c:v>0.4945055000000001</c:v>
+                  <c:v>0.49450550000000015</c:v>
                 </c:pt>
                 <c:pt idx="14">
                   <c:v>0.43323442000000001</c:v>
                 </c:pt>
                 <c:pt idx="15">
-                  <c:v>0.39852400000000016</c:v>
+                  <c:v>0.39852400000000027</c:v>
                 </c:pt>
                 <c:pt idx="16">
                   <c:v>0.4014337</c:v>
@@ -5072,22 +5072,22 @@
                   <c:v>0.40178570000000002</c:v>
                 </c:pt>
                 <c:pt idx="18">
-                  <c:v>0.3507109000000001</c:v>
+                  <c:v>0.35071090000000016</c:v>
                 </c:pt>
                 <c:pt idx="19">
-                  <c:v>0.29945552000000003</c:v>
+                  <c:v>0.29945552000000009</c:v>
                 </c:pt>
                 <c:pt idx="20">
-                  <c:v>0.33211678000000011</c:v>
+                  <c:v>0.33211678000000022</c:v>
                 </c:pt>
                 <c:pt idx="21">
-                  <c:v>0.29508197000000014</c:v>
+                  <c:v>0.29508197000000025</c:v>
                 </c:pt>
                 <c:pt idx="22">
-                  <c:v>0.29542303000000003</c:v>
+                  <c:v>0.29542303000000009</c:v>
                 </c:pt>
                 <c:pt idx="23">
-                  <c:v>0.32115868000000009</c:v>
+                  <c:v>0.3211586800000002</c:v>
                 </c:pt>
                 <c:pt idx="24">
                   <c:v>0.27709612</c:v>
@@ -5099,34 +5099,34 @@
                   <c:v>0.21908126999999999</c:v>
                 </c:pt>
                 <c:pt idx="27">
-                  <c:v>0.24220374000000003</c:v>
+                  <c:v>0.24220374000000006</c:v>
                 </c:pt>
                 <c:pt idx="28">
-                  <c:v>0.19274193000000003</c:v>
+                  <c:v>0.19274193000000006</c:v>
                 </c:pt>
                 <c:pt idx="29">
-                  <c:v>0.17367169999999998</c:v>
+                  <c:v>0.17367169999999996</c:v>
                 </c:pt>
                 <c:pt idx="30">
-                  <c:v>0.18029740000000005</c:v>
+                  <c:v>0.18029740000000011</c:v>
                 </c:pt>
                 <c:pt idx="31">
                   <c:v>0.1883746</c:v>
                 </c:pt>
                 <c:pt idx="32">
-                  <c:v>0.16648993000000004</c:v>
+                  <c:v>0.16648993000000006</c:v>
                 </c:pt>
                 <c:pt idx="33">
                   <c:v>0.15242164999999999</c:v>
                 </c:pt>
                 <c:pt idx="34">
-                  <c:v>0.15173596000000003</c:v>
+                  <c:v>0.15173596000000006</c:v>
                 </c:pt>
                 <c:pt idx="35">
-                  <c:v>0.10950080000000001</c:v>
+                  <c:v>0.10950080000000002</c:v>
                 </c:pt>
                 <c:pt idx="36">
-                  <c:v>0.10484178000000001</c:v>
+                  <c:v>0.10484178000000002</c:v>
                 </c:pt>
                 <c:pt idx="37">
                   <c:v>9.1723400000000024E-2</c:v>
@@ -5138,16 +5138,16 @@
                   <c:v>0.103067905</c:v>
                 </c:pt>
                 <c:pt idx="40">
-                  <c:v>9.3842513999999988E-2</c:v>
+                  <c:v>9.3842514000000016E-2</c:v>
                 </c:pt>
                 <c:pt idx="41">
-                  <c:v>9.5622900000000038E-2</c:v>
+                  <c:v>9.5622900000000052E-2</c:v>
                 </c:pt>
                 <c:pt idx="42">
-                  <c:v>9.1988129999999987E-2</c:v>
+                  <c:v>9.1988130000000001E-2</c:v>
                 </c:pt>
                 <c:pt idx="43">
-                  <c:v>7.9018260000000021E-2</c:v>
+                  <c:v>7.9018260000000035E-2</c:v>
                 </c:pt>
                 <c:pt idx="44">
                   <c:v>8.2352940000000027E-2</c:v>
@@ -5327,25 +5327,25 @@
                   <c:v>0.90476190000000001</c:v>
                 </c:pt>
                 <c:pt idx="1">
-                  <c:v>0.72000000000000008</c:v>
+                  <c:v>0.7200000000000002</c:v>
                 </c:pt>
                 <c:pt idx="2">
-                  <c:v>0.82758622999999987</c:v>
+                  <c:v>0.82758622999999976</c:v>
                 </c:pt>
                 <c:pt idx="3">
-                  <c:v>0.59259259999999991</c:v>
+                  <c:v>0.59259259999999969</c:v>
                 </c:pt>
                 <c:pt idx="4">
                   <c:v>0.90909094000000001</c:v>
                 </c:pt>
                 <c:pt idx="5">
-                  <c:v>0.61818180000000011</c:v>
+                  <c:v>0.61818180000000023</c:v>
                 </c:pt>
                 <c:pt idx="6">
-                  <c:v>0.48648650000000015</c:v>
+                  <c:v>0.48648650000000027</c:v>
                 </c:pt>
                 <c:pt idx="7">
-                  <c:v>0.48837210000000009</c:v>
+                  <c:v>0.4883721000000002</c:v>
                 </c:pt>
                 <c:pt idx="8">
                   <c:v>0.48113210000000001</c:v>
@@ -5360,31 +5360,31 @@
                   <c:v>0.57046980000000003</c:v>
                 </c:pt>
                 <c:pt idx="12">
-                  <c:v>0.63865550000000015</c:v>
+                  <c:v>0.63865550000000026</c:v>
                 </c:pt>
                 <c:pt idx="13">
                   <c:v>0.44966444</c:v>
                 </c:pt>
                 <c:pt idx="14">
-                  <c:v>0.4319526600000001</c:v>
+                  <c:v>0.43195266000000021</c:v>
                 </c:pt>
                 <c:pt idx="15">
-                  <c:v>0.3796296400000001</c:v>
+                  <c:v>0.37962964000000016</c:v>
                 </c:pt>
                 <c:pt idx="16">
-                  <c:v>0.28947368000000007</c:v>
+                  <c:v>0.28947368000000012</c:v>
                 </c:pt>
                 <c:pt idx="17">
-                  <c:v>0.31838566000000013</c:v>
+                  <c:v>0.31838566000000029</c:v>
                 </c:pt>
                 <c:pt idx="18">
-                  <c:v>0.33744857000000011</c:v>
+                  <c:v>0.33744857000000023</c:v>
                 </c:pt>
                 <c:pt idx="19">
-                  <c:v>0.2938775400000001</c:v>
+                  <c:v>0.29387754000000016</c:v>
                 </c:pt>
                 <c:pt idx="20">
-                  <c:v>0.37354085000000004</c:v>
+                  <c:v>0.37354085000000009</c:v>
                 </c:pt>
                 <c:pt idx="21">
                   <c:v>0.26104417000000002</c:v>
@@ -5402,28 +5402,28 @@
                   <c:v>0.23129252</c:v>
                 </c:pt>
                 <c:pt idx="26">
-                  <c:v>0.22291021000000003</c:v>
+                  <c:v>0.22291021000000005</c:v>
                 </c:pt>
                 <c:pt idx="27">
                   <c:v>0.24437300000000001</c:v>
                 </c:pt>
                 <c:pt idx="28">
-                  <c:v>0.11784512000000001</c:v>
+                  <c:v>0.11784512000000003</c:v>
                 </c:pt>
                 <c:pt idx="29">
-                  <c:v>0.21159421000000003</c:v>
+                  <c:v>0.21159421000000006</c:v>
                 </c:pt>
                 <c:pt idx="30">
-                  <c:v>0.19943820000000004</c:v>
+                  <c:v>0.19943820000000007</c:v>
                 </c:pt>
                 <c:pt idx="31">
                   <c:v>0.18013857</c:v>
                 </c:pt>
                 <c:pt idx="32">
-                  <c:v>0.18091450000000003</c:v>
+                  <c:v>0.18091450000000006</c:v>
                 </c:pt>
                 <c:pt idx="33">
-                  <c:v>0.19275123000000002</c:v>
+                  <c:v>0.19275123000000005</c:v>
                 </c:pt>
                 <c:pt idx="34">
                   <c:v>0.17530487</c:v>
@@ -5438,25 +5438,25 @@
                   <c:v>6.9101679999999999E-2</c:v>
                 </c:pt>
                 <c:pt idx="38">
-                  <c:v>5.9322033000000017E-2</c:v>
+                  <c:v>5.9322033000000038E-2</c:v>
                 </c:pt>
                 <c:pt idx="39">
-                  <c:v>8.8552915000000024E-2</c:v>
+                  <c:v>8.8552915000000038E-2</c:v>
                 </c:pt>
                 <c:pt idx="40">
                   <c:v>8.4398980000000026E-2</c:v>
                 </c:pt>
                 <c:pt idx="41">
-                  <c:v>7.6833524000000014E-2</c:v>
+                  <c:v>7.6833524000000028E-2</c:v>
                 </c:pt>
                 <c:pt idx="42">
-                  <c:v>5.9113300000000008E-2</c:v>
+                  <c:v>5.9113300000000021E-2</c:v>
                 </c:pt>
                 <c:pt idx="43">
-                  <c:v>7.911803000000002E-2</c:v>
+                  <c:v>7.9118030000000034E-2</c:v>
                 </c:pt>
                 <c:pt idx="44">
-                  <c:v>8.7008340000000017E-2</c:v>
+                  <c:v>8.7008340000000031E-2</c:v>
                 </c:pt>
               </c:numCache>
             </c:numRef>
@@ -5630,19 +5630,19 @@
                 <c:formatCode>General</c:formatCode>
                 <c:ptCount val="45"/>
                 <c:pt idx="12">
-                  <c:v>0.52238803999999994</c:v>
+                  <c:v>0.52238803999999983</c:v>
                 </c:pt>
                 <c:pt idx="13">
                   <c:v>0</c:v>
                 </c:pt>
                 <c:pt idx="14">
-                  <c:v>0.48214287000000006</c:v>
+                  <c:v>0.48214287000000011</c:v>
                 </c:pt>
                 <c:pt idx="15">
                   <c:v>0</c:v>
                 </c:pt>
                 <c:pt idx="16">
-                  <c:v>0.4181818000000001</c:v>
+                  <c:v>0.41818180000000016</c:v>
                 </c:pt>
                 <c:pt idx="17">
                   <c:v>0.52173910000000001</c:v>
@@ -5654,22 +5654,22 @@
                   <c:v>0.2982456</c:v>
                 </c:pt>
                 <c:pt idx="20">
-                  <c:v>0.31034482000000008</c:v>
+                  <c:v>0.31034482000000013</c:v>
                 </c:pt>
                 <c:pt idx="21">
-                  <c:v>0.31282052000000016</c:v>
+                  <c:v>0.31282052000000027</c:v>
                 </c:pt>
                 <c:pt idx="22">
                   <c:v>0.27014217000000001</c:v>
                 </c:pt>
                 <c:pt idx="23">
-                  <c:v>0.26146790000000003</c:v>
+                  <c:v>0.26146790000000009</c:v>
                 </c:pt>
                 <c:pt idx="24">
-                  <c:v>0.21276596000000003</c:v>
+                  <c:v>0.21276596000000006</c:v>
                 </c:pt>
                 <c:pt idx="25">
-                  <c:v>0.18431373000000004</c:v>
+                  <c:v>0.18431373000000006</c:v>
                 </c:pt>
                 <c:pt idx="26">
                   <c:v>0.17567568</c:v>
@@ -5681,22 +5681,22 @@
                   <c:v>0.22004356999999997</c:v>
                 </c:pt>
                 <c:pt idx="29">
-                  <c:v>0.15914490000000003</c:v>
+                  <c:v>0.15914490000000006</c:v>
                 </c:pt>
                 <c:pt idx="30">
                   <c:v>0.17406750000000001</c:v>
                 </c:pt>
                 <c:pt idx="31">
-                  <c:v>0.18398637000000004</c:v>
+                  <c:v>0.18398637000000007</c:v>
                 </c:pt>
                 <c:pt idx="32">
                   <c:v>0.13333333999999999</c:v>
                 </c:pt>
                 <c:pt idx="33">
-                  <c:v>0.12366412600000003</c:v>
+                  <c:v>0.12366412600000005</c:v>
                 </c:pt>
                 <c:pt idx="34">
-                  <c:v>0.12569060999999998</c:v>
+                  <c:v>0.12569060999999995</c:v>
                 </c:pt>
                 <c:pt idx="35">
                   <c:v>7.043880000000001E-2</c:v>
@@ -5705,7 +5705,7 @@
                   <c:v>8.7912089999999998E-2</c:v>
                 </c:pt>
                 <c:pt idx="37">
-                  <c:v>7.7464790000000019E-2</c:v>
+                  <c:v>7.7464790000000033E-2</c:v>
                 </c:pt>
                 <c:pt idx="38">
                   <c:v>7.7223849999999997E-2</c:v>
@@ -5717,16 +5717,16 @@
                   <c:v>6.5201980000000007E-2</c:v>
                 </c:pt>
                 <c:pt idx="41">
-                  <c:v>6.9400630000000033E-2</c:v>
+                  <c:v>6.9400630000000046E-2</c:v>
                 </c:pt>
                 <c:pt idx="42">
-                  <c:v>7.9131655000000009E-2</c:v>
+                  <c:v>7.9131655000000023E-2</c:v>
                 </c:pt>
                 <c:pt idx="43">
-                  <c:v>4.517025999999999E-2</c:v>
+                  <c:v>4.5170259999999983E-2</c:v>
                 </c:pt>
                 <c:pt idx="44">
-                  <c:v>6.0053980000000014E-2</c:v>
+                  <c:v>6.0053980000000021E-2</c:v>
                 </c:pt>
               </c:numCache>
             </c:numRef>
@@ -5900,7 +5900,7 @@
                 <c:formatCode>General</c:formatCode>
                 <c:ptCount val="45"/>
                 <c:pt idx="12">
-                  <c:v>0.54545455999999992</c:v>
+                  <c:v>0.54545455999999981</c:v>
                 </c:pt>
                 <c:pt idx="13">
                   <c:v>0.4</c:v>
@@ -5915,7 +5915,7 @@
                   <c:v>0.25</c:v>
                 </c:pt>
                 <c:pt idx="17">
-                  <c:v>0.75000000000000011</c:v>
+                  <c:v>0.75000000000000022</c:v>
                 </c:pt>
                 <c:pt idx="18">
                   <c:v>0</c:v>
@@ -5924,7 +5924,7 @@
                   <c:v>0.4</c:v>
                 </c:pt>
                 <c:pt idx="20">
-                  <c:v>0.17391305000000004</c:v>
+                  <c:v>0.17391305000000007</c:v>
                 </c:pt>
                 <c:pt idx="21">
                   <c:v>0.4</c:v>
@@ -5933,10 +5933,10 @@
                   <c:v>0.23880596000000001</c:v>
                 </c:pt>
                 <c:pt idx="23">
-                  <c:v>0.17307692999999996</c:v>
+                  <c:v>0.17307692999999993</c:v>
                 </c:pt>
                 <c:pt idx="24">
-                  <c:v>0.28735632000000005</c:v>
+                  <c:v>0.28735632000000011</c:v>
                 </c:pt>
                 <c:pt idx="25">
                   <c:v>0.30769232000000002</c:v>
@@ -5948,7 +5948,7 @@
                   <c:v>0.25301205999999998</c:v>
                 </c:pt>
                 <c:pt idx="28">
-                  <c:v>0.21379310000000004</c:v>
+                  <c:v>0.21379310000000007</c:v>
                 </c:pt>
                 <c:pt idx="29">
                   <c:v>0.13235295</c:v>
@@ -5957,16 +5957,16 @@
                   <c:v>0.19354837999999999</c:v>
                 </c:pt>
                 <c:pt idx="31">
-                  <c:v>0.14741036000000002</c:v>
+                  <c:v>0.14741036000000007</c:v>
                 </c:pt>
                 <c:pt idx="32">
                   <c:v>0.13559321999999999</c:v>
                 </c:pt>
                 <c:pt idx="33">
-                  <c:v>0.12393162400000002</c:v>
+                  <c:v>0.12393162400000003</c:v>
                 </c:pt>
                 <c:pt idx="34">
-                  <c:v>0.14096916000000004</c:v>
+                  <c:v>0.14096916000000007</c:v>
                 </c:pt>
                 <c:pt idx="35">
                   <c:v>0.11814346000000002</c:v>
@@ -5975,25 +5975,25 @@
                   <c:v>0.11965812000000002</c:v>
                 </c:pt>
                 <c:pt idx="37">
-                  <c:v>9.2592590000000016E-2</c:v>
+                  <c:v>9.259259000000003E-2</c:v>
                 </c:pt>
                 <c:pt idx="38">
-                  <c:v>0.10232558000000001</c:v>
+                  <c:v>0.10232558000000003</c:v>
                 </c:pt>
                 <c:pt idx="39">
-                  <c:v>0.17777778000000002</c:v>
+                  <c:v>0.17777778000000005</c:v>
                 </c:pt>
                 <c:pt idx="40">
-                  <c:v>0.15879828000000007</c:v>
+                  <c:v>0.15879828000000015</c:v>
                 </c:pt>
                 <c:pt idx="41">
-                  <c:v>0.16915422999999996</c:v>
+                  <c:v>0.16915422999999993</c:v>
                 </c:pt>
                 <c:pt idx="42">
-                  <c:v>0.15706806000000004</c:v>
+                  <c:v>0.15706806000000006</c:v>
                 </c:pt>
                 <c:pt idx="43">
-                  <c:v>0.13592233000000004</c:v>
+                  <c:v>0.13592233000000006</c:v>
                 </c:pt>
                 <c:pt idx="44">
                   <c:v>8.4415585000000001E-2</c:v>
@@ -6176,10 +6176,10 @@
                   <c:v>0.30769232000000002</c:v>
                 </c:pt>
                 <c:pt idx="19">
-                  <c:v>0.31578946000000008</c:v>
+                  <c:v>0.31578946000000013</c:v>
                 </c:pt>
                 <c:pt idx="20">
-                  <c:v>0.4875000000000001</c:v>
+                  <c:v>0.48750000000000016</c:v>
                 </c:pt>
                 <c:pt idx="21">
                   <c:v>0</c:v>
@@ -6191,7 +6191,7 @@
                   <c:v>0.38775510000000002</c:v>
                 </c:pt>
                 <c:pt idx="24">
-                  <c:v>0.21739130000000004</c:v>
+                  <c:v>0.21739130000000007</c:v>
                 </c:pt>
                 <c:pt idx="25">
                   <c:v>0.40151515999999998</c:v>
@@ -6200,7 +6200,7 @@
                   <c:v>0.26271184999999997</c:v>
                 </c:pt>
                 <c:pt idx="27">
-                  <c:v>0.36708862000000009</c:v>
+                  <c:v>0.3670886200000002</c:v>
                 </c:pt>
                 <c:pt idx="28">
                   <c:v>0.25165563999999996</c:v>
@@ -6209,10 +6209,10 @@
                   <c:v>0.29333332000000001</c:v>
                 </c:pt>
                 <c:pt idx="30">
-                  <c:v>0.15686275000000002</c:v>
+                  <c:v>0.15686275000000005</c:v>
                 </c:pt>
                 <c:pt idx="31">
-                  <c:v>0.19035532999999996</c:v>
+                  <c:v>0.19035532999999993</c:v>
                 </c:pt>
                 <c:pt idx="32">
                   <c:v>0.18421051999999999</c:v>
@@ -6221,28 +6221,28 @@
                   <c:v>0.19125684000000001</c:v>
                 </c:pt>
                 <c:pt idx="34">
-                  <c:v>0.13173652999999996</c:v>
+                  <c:v>0.13173652999999994</c:v>
                 </c:pt>
                 <c:pt idx="35">
-                  <c:v>0.14845939000000005</c:v>
+                  <c:v>0.14845939000000011</c:v>
                 </c:pt>
                 <c:pt idx="36">
-                  <c:v>0.15979381000000004</c:v>
+                  <c:v>0.15979381000000006</c:v>
                 </c:pt>
                 <c:pt idx="37">
                   <c:v>0.105882354</c:v>
                 </c:pt>
                 <c:pt idx="38">
-                  <c:v>8.9686096000000021E-2</c:v>
+                  <c:v>8.9686096000000035E-2</c:v>
                 </c:pt>
                 <c:pt idx="39">
-                  <c:v>0.15948276000000003</c:v>
+                  <c:v>0.15948276000000006</c:v>
                 </c:pt>
                 <c:pt idx="40">
-                  <c:v>9.166667000000002E-2</c:v>
+                  <c:v>9.1666670000000033E-2</c:v>
                 </c:pt>
                 <c:pt idx="41">
-                  <c:v>0.15384616000000004</c:v>
+                  <c:v>0.15384616000000007</c:v>
                 </c:pt>
                 <c:pt idx="42">
                   <c:v>0.13675213999999999</c:v>
@@ -6258,11 +6258,11 @@
           </c:val>
         </c:ser>
         <c:marker val="1"/>
-        <c:axId val="85233664"/>
-        <c:axId val="85235584"/>
+        <c:axId val="56987648"/>
+        <c:axId val="56989568"/>
       </c:lineChart>
       <c:catAx>
-        <c:axId val="85233664"/>
+        <c:axId val="56987648"/>
         <c:scaling>
           <c:orientation val="minMax"/>
         </c:scaling>
@@ -6287,14 +6287,14 @@
         </c:title>
         <c:numFmt formatCode="General" sourceLinked="1"/>
         <c:tickLblPos val="nextTo"/>
-        <c:crossAx val="85235584"/>
+        <c:crossAx val="56989568"/>
         <c:crosses val="autoZero"/>
         <c:auto val="1"/>
         <c:lblAlgn val="ctr"/>
         <c:lblOffset val="100"/>
       </c:catAx>
       <c:valAx>
-        <c:axId val="85235584"/>
+        <c:axId val="56989568"/>
         <c:scaling>
           <c:orientation val="minMax"/>
         </c:scaling>
@@ -6320,7 +6320,7 @@
         </c:title>
         <c:numFmt formatCode="General" sourceLinked="1"/>
         <c:tickLblPos val="nextTo"/>
-        <c:crossAx val="85233664"/>
+        <c:crossAx val="56987648"/>
         <c:crosses val="autoZero"/>
         <c:crossBetween val="between"/>
       </c:valAx>
@@ -6545,70 +6545,70 @@
                 <c:formatCode>General</c:formatCode>
                 <c:ptCount val="45"/>
                 <c:pt idx="0">
-                  <c:v>0.39473686000000008</c:v>
+                  <c:v>0.39473686000000013</c:v>
                 </c:pt>
                 <c:pt idx="1">
-                  <c:v>0.43103448000000005</c:v>
+                  <c:v>0.43103448000000011</c:v>
                 </c:pt>
                 <c:pt idx="2">
-                  <c:v>0.39285713000000005</c:v>
+                  <c:v>0.39285713000000011</c:v>
                 </c:pt>
                 <c:pt idx="3">
                   <c:v>0.35294120000000001</c:v>
                 </c:pt>
                 <c:pt idx="4">
-                  <c:v>0.33333334000000003</c:v>
+                  <c:v>0.33333334000000009</c:v>
                 </c:pt>
                 <c:pt idx="5">
-                  <c:v>0.38285714000000004</c:v>
+                  <c:v>0.3828571400000001</c:v>
                 </c:pt>
                 <c:pt idx="6">
-                  <c:v>0.42021278000000006</c:v>
+                  <c:v>0.42021278000000012</c:v>
                 </c:pt>
                 <c:pt idx="7">
                   <c:v>0.4</c:v>
                 </c:pt>
                 <c:pt idx="8">
-                  <c:v>0.40437160000000005</c:v>
+                  <c:v>0.40437160000000011</c:v>
                 </c:pt>
                 <c:pt idx="9">
-                  <c:v>0.34500000000000003</c:v>
+                  <c:v>0.34500000000000008</c:v>
                 </c:pt>
                 <c:pt idx="10">
-                  <c:v>0.34490740000000003</c:v>
+                  <c:v>0.34490740000000009</c:v>
                 </c:pt>
                 <c:pt idx="11">
-                  <c:v>0.3254973000000001</c:v>
+                  <c:v>0.32549730000000016</c:v>
                 </c:pt>
                 <c:pt idx="12">
-                  <c:v>0.35650888000000008</c:v>
+                  <c:v>0.35650888000000014</c:v>
                 </c:pt>
                 <c:pt idx="13">
-                  <c:v>0.30909090000000006</c:v>
+                  <c:v>0.30909090000000011</c:v>
                 </c:pt>
                 <c:pt idx="14">
-                  <c:v>0.33366734000000003</c:v>
+                  <c:v>0.33366734000000009</c:v>
                 </c:pt>
                 <c:pt idx="15">
-                  <c:v>0.33484676000000013</c:v>
+                  <c:v>0.3348467600000003</c:v>
                 </c:pt>
                 <c:pt idx="16">
                   <c:v>0.30904523</c:v>
                 </c:pt>
                 <c:pt idx="17">
-                  <c:v>0.29615673000000003</c:v>
+                  <c:v>0.29615673000000009</c:v>
                 </c:pt>
                 <c:pt idx="18">
-                  <c:v>0.30078740000000004</c:v>
+                  <c:v>0.30078740000000009</c:v>
                 </c:pt>
                 <c:pt idx="19">
                   <c:v>0.28613054999999998</c:v>
                 </c:pt>
                 <c:pt idx="20">
-                  <c:v>0.26111460000000003</c:v>
+                  <c:v>0.26111460000000009</c:v>
                 </c:pt>
                 <c:pt idx="21">
-                  <c:v>0.28541338000000011</c:v>
+                  <c:v>0.28541338000000016</c:v>
                 </c:pt>
                 <c:pt idx="22">
                   <c:v>0.28610983000000001</c:v>
@@ -6620,10 +6620,10 @@
                   <c:v>0.28114103999999995</c:v>
                 </c:pt>
                 <c:pt idx="25">
-                  <c:v>0.28283426000000006</c:v>
+                  <c:v>0.28283426000000012</c:v>
                 </c:pt>
                 <c:pt idx="26">
-                  <c:v>0.27681120000000004</c:v>
+                  <c:v>0.27681120000000009</c:v>
                 </c:pt>
                 <c:pt idx="27">
                   <c:v>0.26723096000000002</c:v>
@@ -6638,13 +6638,13 @@
                   <c:v>0.25944540000000005</c:v>
                 </c:pt>
                 <c:pt idx="31">
-                  <c:v>0.27752396000000007</c:v>
+                  <c:v>0.27752396000000012</c:v>
                 </c:pt>
                 <c:pt idx="32">
                   <c:v>0.26793850000000002</c:v>
                 </c:pt>
                 <c:pt idx="33">
-                  <c:v>0.26292726000000005</c:v>
+                  <c:v>0.26292726000000011</c:v>
                 </c:pt>
                 <c:pt idx="34">
                   <c:v>0.27176080000000002</c:v>
@@ -6659,25 +6659,25 @@
                   <c:v>0.25572383000000004</c:v>
                 </c:pt>
                 <c:pt idx="38">
-                  <c:v>0.26038070000000008</c:v>
+                  <c:v>0.26038070000000013</c:v>
                 </c:pt>
                 <c:pt idx="39">
-                  <c:v>0.23894710000000005</c:v>
+                  <c:v>0.23894710000000011</c:v>
                 </c:pt>
                 <c:pt idx="40">
                   <c:v>0.24907141999999999</c:v>
                 </c:pt>
                 <c:pt idx="41">
-                  <c:v>0.24722503000000004</c:v>
+                  <c:v>0.24722503000000007</c:v>
                 </c:pt>
                 <c:pt idx="42">
-                  <c:v>0.24600504000000004</c:v>
+                  <c:v>0.24600504000000006</c:v>
                 </c:pt>
                 <c:pt idx="43">
                   <c:v>0.2606097</c:v>
                 </c:pt>
                 <c:pt idx="44">
-                  <c:v>0.25238840000000007</c:v>
+                  <c:v>0.25238840000000012</c:v>
                 </c:pt>
               </c:numCache>
             </c:numRef>
@@ -6851,70 +6851,70 @@
                 <c:formatCode>General</c:formatCode>
                 <c:ptCount val="45"/>
                 <c:pt idx="0">
-                  <c:v>0.39473686000000008</c:v>
+                  <c:v>0.39473686000000013</c:v>
                 </c:pt>
                 <c:pt idx="1">
-                  <c:v>0.43103448000000005</c:v>
+                  <c:v>0.43103448000000011</c:v>
                 </c:pt>
                 <c:pt idx="2">
-                  <c:v>0.39285713000000005</c:v>
+                  <c:v>0.39285713000000011</c:v>
                 </c:pt>
                 <c:pt idx="3">
                   <c:v>0.35294120000000001</c:v>
                 </c:pt>
                 <c:pt idx="4">
-                  <c:v>0.33333334000000003</c:v>
+                  <c:v>0.33333334000000009</c:v>
                 </c:pt>
                 <c:pt idx="5">
-                  <c:v>0.37500000000000006</c:v>
+                  <c:v>0.37500000000000011</c:v>
                 </c:pt>
                 <c:pt idx="6">
-                  <c:v>0.43478260000000007</c:v>
+                  <c:v>0.43478260000000013</c:v>
                 </c:pt>
                 <c:pt idx="7">
                   <c:v>0.41025642000000001</c:v>
                 </c:pt>
                 <c:pt idx="8">
-                  <c:v>0.42168674000000006</c:v>
+                  <c:v>0.42168674000000012</c:v>
                 </c:pt>
                 <c:pt idx="9">
-                  <c:v>0.35792350000000006</c:v>
+                  <c:v>0.35792350000000012</c:v>
                 </c:pt>
                 <c:pt idx="10">
-                  <c:v>0.35593220000000003</c:v>
+                  <c:v>0.35593220000000009</c:v>
                 </c:pt>
                 <c:pt idx="11">
-                  <c:v>0.32658228000000011</c:v>
+                  <c:v>0.32658228000000022</c:v>
                 </c:pt>
                 <c:pt idx="12">
-                  <c:v>0.32962963000000006</c:v>
+                  <c:v>0.32962963000000012</c:v>
                 </c:pt>
                 <c:pt idx="13">
-                  <c:v>0.30788803000000009</c:v>
+                  <c:v>0.3078880300000002</c:v>
                 </c:pt>
                 <c:pt idx="14">
-                  <c:v>0.33600000000000008</c:v>
+                  <c:v>0.33600000000000013</c:v>
                 </c:pt>
                 <c:pt idx="15">
-                  <c:v>0.35362318000000004</c:v>
+                  <c:v>0.35362318000000009</c:v>
                 </c:pt>
                 <c:pt idx="16">
-                  <c:v>0.29102167000000007</c:v>
+                  <c:v>0.29102167000000012</c:v>
                 </c:pt>
                 <c:pt idx="17">
-                  <c:v>0.30014026000000005</c:v>
+                  <c:v>0.3001402600000001</c:v>
                 </c:pt>
                 <c:pt idx="18">
-                  <c:v>0.30183357000000005</c:v>
+                  <c:v>0.30183357000000011</c:v>
                 </c:pt>
                 <c:pt idx="19">
-                  <c:v>0.28396740000000004</c:v>
+                  <c:v>0.28396740000000009</c:v>
                 </c:pt>
                 <c:pt idx="20">
-                  <c:v>0.24631268000000003</c:v>
+                  <c:v>0.24631268000000006</c:v>
                 </c:pt>
                 <c:pt idx="21">
-                  <c:v>0.23337855999999998</c:v>
+                  <c:v>0.23337855999999996</c:v>
                 </c:pt>
                 <c:pt idx="22">
                   <c:v>0.26289308</c:v>
@@ -6923,7 +6923,7 @@
                   <c:v>0.25371285999999998</c:v>
                 </c:pt>
                 <c:pt idx="24">
-                  <c:v>0.2669767400000001</c:v>
+                  <c:v>0.26697674000000016</c:v>
                 </c:pt>
                 <c:pt idx="25">
                   <c:v>0.26070764999999996</c:v>
@@ -6938,16 +6938,16 @@
                   <c:v>0.25474032999999996</c:v>
                 </c:pt>
                 <c:pt idx="29">
-                  <c:v>0.25132877000000009</c:v>
+                  <c:v>0.2513287700000002</c:v>
                 </c:pt>
                 <c:pt idx="30">
-                  <c:v>0.24909747000000002</c:v>
+                  <c:v>0.24909747000000007</c:v>
                 </c:pt>
                 <c:pt idx="31">
                   <c:v>0.26161790000000001</c:v>
                 </c:pt>
                 <c:pt idx="32">
-                  <c:v>0.27079304999999992</c:v>
+                  <c:v>0.27079304999999987</c:v>
                 </c:pt>
                 <c:pt idx="33">
                   <c:v>0.26866284000000001</c:v>
@@ -6956,7 +6956,7 @@
                   <c:v>0.26271184999999997</c:v>
                 </c:pt>
                 <c:pt idx="35">
-                  <c:v>0.2559176700000001</c:v>
+                  <c:v>0.25591767000000015</c:v>
                 </c:pt>
                 <c:pt idx="36">
                   <c:v>0.28071954999999998</c:v>
@@ -6965,10 +6965,10 @@
                   <c:v>0.28911194000000001</c:v>
                 </c:pt>
                 <c:pt idx="38">
-                  <c:v>0.2564163000000001</c:v>
+                  <c:v>0.25641630000000015</c:v>
                 </c:pt>
                 <c:pt idx="39">
-                  <c:v>0.24902724000000004</c:v>
+                  <c:v>0.24902724000000007</c:v>
                 </c:pt>
                 <c:pt idx="40">
                   <c:v>0.25933146000000001</c:v>
@@ -6983,7 +6983,7 @@
                   <c:v>0.28862974000000002</c:v>
                 </c:pt>
                 <c:pt idx="44">
-                  <c:v>0.27636626000000003</c:v>
+                  <c:v>0.27636626000000014</c:v>
                 </c:pt>
               </c:numCache>
             </c:numRef>
@@ -7163,7 +7163,7 @@
                   <c:v>0</c:v>
                 </c:pt>
                 <c:pt idx="14">
-                  <c:v>0.39664805000000003</c:v>
+                  <c:v>0.39664805000000009</c:v>
                 </c:pt>
                 <c:pt idx="15">
                   <c:v>0</c:v>
@@ -7172,13 +7172,13 @@
                   <c:v>0.45360824</c:v>
                 </c:pt>
                 <c:pt idx="17">
-                  <c:v>0.43231440000000015</c:v>
+                  <c:v>0.43231440000000027</c:v>
                 </c:pt>
                 <c:pt idx="18">
-                  <c:v>0.47826087000000006</c:v>
+                  <c:v>0.47826087000000012</c:v>
                 </c:pt>
                 <c:pt idx="19">
-                  <c:v>0.42792794000000006</c:v>
+                  <c:v>0.42792794000000012</c:v>
                 </c:pt>
                 <c:pt idx="20">
                   <c:v>0.42659760000000002</c:v>
@@ -7190,64 +7190,64 @@
                   <c:v>0.40428212000000002</c:v>
                 </c:pt>
                 <c:pt idx="23">
-                  <c:v>0.39572865000000007</c:v>
+                  <c:v>0.39572865000000013</c:v>
                 </c:pt>
                 <c:pt idx="24">
-                  <c:v>0.38527800000000006</c:v>
+                  <c:v>0.38527800000000012</c:v>
                 </c:pt>
                 <c:pt idx="25">
-                  <c:v>0.37301588000000008</c:v>
+                  <c:v>0.37301588000000013</c:v>
                 </c:pt>
                 <c:pt idx="26">
-                  <c:v>0.33094170000000006</c:v>
+                  <c:v>0.33094170000000012</c:v>
                 </c:pt>
                 <c:pt idx="27">
                   <c:v>0.34216334999999998</c:v>
                 </c:pt>
                 <c:pt idx="28">
-                  <c:v>0.36756453000000006</c:v>
+                  <c:v>0.36756453000000011</c:v>
                 </c:pt>
                 <c:pt idx="29">
-                  <c:v>0.33666460000000009</c:v>
+                  <c:v>0.3366646000000002</c:v>
                 </c:pt>
                 <c:pt idx="30">
-                  <c:v>0.33502772000000008</c:v>
+                  <c:v>0.33502772000000014</c:v>
                 </c:pt>
                 <c:pt idx="31">
-                  <c:v>0.33318853000000009</c:v>
+                  <c:v>0.3331885300000002</c:v>
                 </c:pt>
                 <c:pt idx="32">
-                  <c:v>0.33055556000000014</c:v>
+                  <c:v>0.33055556000000025</c:v>
                 </c:pt>
                 <c:pt idx="33">
-                  <c:v>0.3381574200000001</c:v>
+                  <c:v>0.33815742000000015</c:v>
                 </c:pt>
                 <c:pt idx="34">
                   <c:v>0.34454050000000008</c:v>
                 </c:pt>
                 <c:pt idx="35">
-                  <c:v>0.32456818000000009</c:v>
+                  <c:v>0.32456818000000021</c:v>
                 </c:pt>
                 <c:pt idx="36">
-                  <c:v>0.32107532000000005</c:v>
+                  <c:v>0.32107532000000011</c:v>
                 </c:pt>
                 <c:pt idx="37">
-                  <c:v>0.31139773000000004</c:v>
+                  <c:v>0.31139773000000009</c:v>
                 </c:pt>
                 <c:pt idx="38">
-                  <c:v>0.33797386000000013</c:v>
+                  <c:v>0.33797386000000029</c:v>
                 </c:pt>
                 <c:pt idx="39">
-                  <c:v>0.3109592000000001</c:v>
+                  <c:v>0.31095920000000016</c:v>
                 </c:pt>
                 <c:pt idx="40">
-                  <c:v>0.29828360000000004</c:v>
+                  <c:v>0.29828360000000009</c:v>
                 </c:pt>
                 <c:pt idx="41">
-                  <c:v>0.29460093000000004</c:v>
+                  <c:v>0.29460093000000009</c:v>
                 </c:pt>
                 <c:pt idx="42">
-                  <c:v>0.28699198000000004</c:v>
+                  <c:v>0.28699198000000009</c:v>
                 </c:pt>
                 <c:pt idx="43">
                   <c:v>0.29229880000000008</c:v>
@@ -7430,31 +7430,31 @@
                   <c:v>0.5</c:v>
                 </c:pt>
                 <c:pt idx="13">
-                  <c:v>0.46031746000000007</c:v>
+                  <c:v>0.46031746000000012</c:v>
                 </c:pt>
                 <c:pt idx="14">
                   <c:v>0</c:v>
                 </c:pt>
                 <c:pt idx="15">
-                  <c:v>0.45161290000000004</c:v>
+                  <c:v>0.45161290000000009</c:v>
                 </c:pt>
                 <c:pt idx="16">
                   <c:v>0.41428572000000002</c:v>
                 </c:pt>
                 <c:pt idx="17">
-                  <c:v>0.42857143000000003</c:v>
+                  <c:v>0.42857143000000009</c:v>
                 </c:pt>
                 <c:pt idx="18">
                   <c:v>0</c:v>
                 </c:pt>
                 <c:pt idx="19">
-                  <c:v>0.4411764700000001</c:v>
+                  <c:v>0.44117647000000015</c:v>
                 </c:pt>
                 <c:pt idx="20">
-                  <c:v>0.48181817000000016</c:v>
+                  <c:v>0.48181817000000027</c:v>
                 </c:pt>
                 <c:pt idx="21">
-                  <c:v>0.42592594000000006</c:v>
+                  <c:v>0.42592594000000011</c:v>
                 </c:pt>
                 <c:pt idx="22">
                   <c:v>0.45229682000000004</c:v>
@@ -7463,7 +7463,7 @@
                   <c:v>0.44594594999999998</c:v>
                 </c:pt>
                 <c:pt idx="24">
-                  <c:v>0.43548387000000011</c:v>
+                  <c:v>0.43548387000000022</c:v>
                 </c:pt>
                 <c:pt idx="25">
                   <c:v>0.4</c:v>
@@ -7475,13 +7475,13 @@
                   <c:v>0.4</c:v>
                 </c:pt>
                 <c:pt idx="28">
-                  <c:v>0.41176470000000004</c:v>
+                  <c:v>0.41176470000000009</c:v>
                 </c:pt>
                 <c:pt idx="29">
-                  <c:v>0.3654545500000001</c:v>
+                  <c:v>0.36545455000000016</c:v>
                 </c:pt>
                 <c:pt idx="30">
-                  <c:v>0.4069898400000001</c:v>
+                  <c:v>0.40698984000000016</c:v>
                 </c:pt>
                 <c:pt idx="31">
                   <c:v>0.365643</c:v>
@@ -7496,19 +7496,19 @@
                   <c:v>0.34855235000000001</c:v>
                 </c:pt>
                 <c:pt idx="35">
-                  <c:v>0.35884178000000005</c:v>
+                  <c:v>0.35884178000000011</c:v>
                 </c:pt>
                 <c:pt idx="36">
-                  <c:v>0.36046510000000004</c:v>
+                  <c:v>0.36046510000000009</c:v>
                 </c:pt>
                 <c:pt idx="37">
-                  <c:v>0.33972126000000008</c:v>
+                  <c:v>0.33972126000000014</c:v>
                 </c:pt>
                 <c:pt idx="38">
                   <c:v>0.35076252000000002</c:v>
                 </c:pt>
                 <c:pt idx="39">
-                  <c:v>0.33371300000000009</c:v>
+                  <c:v>0.33371300000000015</c:v>
                 </c:pt>
                 <c:pt idx="40">
                   <c:v>0.35079050000000001</c:v>
@@ -7517,13 +7517,13 @@
                   <c:v>0.36842105000000008</c:v>
                 </c:pt>
                 <c:pt idx="42">
-                  <c:v>0.33333334000000003</c:v>
+                  <c:v>0.33333334000000009</c:v>
                 </c:pt>
                 <c:pt idx="43">
                   <c:v>0.35746104000000001</c:v>
                 </c:pt>
                 <c:pt idx="44">
-                  <c:v>0.35197818000000008</c:v>
+                  <c:v>0.35197818000000014</c:v>
                 </c:pt>
               </c:numCache>
             </c:numRef>
@@ -7712,7 +7712,7 @@
                   <c:v>0</c:v>
                 </c:pt>
                 <c:pt idx="22">
-                  <c:v>0.38759690000000008</c:v>
+                  <c:v>0.38759690000000013</c:v>
                 </c:pt>
                 <c:pt idx="23">
                   <c:v>0.41212120000000002</c:v>
@@ -7721,75 +7721,75 @@
                   <c:v>0.34883720000000001</c:v>
                 </c:pt>
                 <c:pt idx="25">
-                  <c:v>0.42384106000000005</c:v>
+                  <c:v>0.4238410600000001</c:v>
                 </c:pt>
                 <c:pt idx="26">
                   <c:v>0.41875000000000001</c:v>
                 </c:pt>
                 <c:pt idx="27">
-                  <c:v>0.40989400000000004</c:v>
+                  <c:v>0.40989400000000009</c:v>
                 </c:pt>
                 <c:pt idx="28">
-                  <c:v>0.38271606000000008</c:v>
+                  <c:v>0.38271606000000014</c:v>
                 </c:pt>
                 <c:pt idx="29">
                   <c:v>0.41455162000000001</c:v>
                 </c:pt>
                 <c:pt idx="30">
-                  <c:v>0.3717647200000001</c:v>
+                  <c:v>0.37176472000000016</c:v>
                 </c:pt>
                 <c:pt idx="31">
-                  <c:v>0.39333760000000006</c:v>
+                  <c:v>0.39333760000000012</c:v>
                 </c:pt>
                 <c:pt idx="32">
                   <c:v>0.37277353000000002</c:v>
                 </c:pt>
                 <c:pt idx="33">
-                  <c:v>0.39292604000000009</c:v>
+                  <c:v>0.3929260400000002</c:v>
                 </c:pt>
                 <c:pt idx="34">
                   <c:v>0.40583554000000005</c:v>
                 </c:pt>
                 <c:pt idx="35">
-                  <c:v>0.3761589500000001</c:v>
+                  <c:v>0.37615895000000016</c:v>
                 </c:pt>
                 <c:pt idx="36">
-                  <c:v>0.37942857000000013</c:v>
+                  <c:v>0.3794285700000003</c:v>
                 </c:pt>
                 <c:pt idx="37">
-                  <c:v>0.40304878000000005</c:v>
+                  <c:v>0.40304878000000011</c:v>
                 </c:pt>
                 <c:pt idx="38">
-                  <c:v>0.38045540000000005</c:v>
+                  <c:v>0.38045540000000011</c:v>
                 </c:pt>
                 <c:pt idx="39">
                   <c:v>0.36180905000000002</c:v>
                 </c:pt>
                 <c:pt idx="40">
-                  <c:v>0.38162252000000008</c:v>
+                  <c:v>0.38162252000000013</c:v>
                 </c:pt>
                 <c:pt idx="41">
-                  <c:v>0.35618278000000009</c:v>
+                  <c:v>0.3561827800000002</c:v>
                 </c:pt>
                 <c:pt idx="42">
                   <c:v>0.36865940000000008</c:v>
                 </c:pt>
                 <c:pt idx="43">
-                  <c:v>0.39836845000000015</c:v>
+                  <c:v>0.39836845000000026</c:v>
                 </c:pt>
                 <c:pt idx="44">
-                  <c:v>0.38137080000000012</c:v>
+                  <c:v>0.38137080000000023</c:v>
                 </c:pt>
               </c:numCache>
             </c:numRef>
           </c:val>
         </c:ser>
         <c:marker val="1"/>
-        <c:axId val="84834176"/>
-        <c:axId val="84836352"/>
+        <c:axId val="65173376"/>
+        <c:axId val="65179648"/>
       </c:lineChart>
       <c:catAx>
-        <c:axId val="84834176"/>
+        <c:axId val="65173376"/>
         <c:scaling>
           <c:orientation val="minMax"/>
         </c:scaling>
@@ -7814,14 +7814,14 @@
         </c:title>
         <c:numFmt formatCode="General" sourceLinked="1"/>
         <c:tickLblPos val="nextTo"/>
-        <c:crossAx val="84836352"/>
+        <c:crossAx val="65179648"/>
         <c:crosses val="autoZero"/>
         <c:auto val="1"/>
         <c:lblAlgn val="ctr"/>
         <c:lblOffset val="100"/>
       </c:catAx>
       <c:valAx>
-        <c:axId val="84836352"/>
+        <c:axId val="65179648"/>
         <c:scaling>
           <c:orientation val="minMax"/>
         </c:scaling>
@@ -7847,7 +7847,7 @@
         </c:title>
         <c:numFmt formatCode="General" sourceLinked="1"/>
         <c:tickLblPos val="nextTo"/>
-        <c:crossAx val="84834176"/>
+        <c:crossAx val="65173376"/>
         <c:crosses val="autoZero"/>
         <c:crossBetween val="between"/>
       </c:valAx>
@@ -13034,21 +13034,7 @@
                 <a:latin typeface="Times New Roman" pitchFamily="18" charset="0"/>
                 <a:cs typeface="Times New Roman" pitchFamily="18" charset="0"/>
               </a:rPr>
-              <a:t>Steady amount of research per </a:t>
-            </a:r>
-            <a:r>
-              <a:rPr lang="en-US" sz="1800" dirty="0" smtClean="0">
-                <a:latin typeface="Times New Roman" pitchFamily="18" charset="0"/>
-                <a:cs typeface="Times New Roman" pitchFamily="18" charset="0"/>
-              </a:rPr>
-              <a:t>author; </a:t>
-            </a:r>
-            <a:r>
-              <a:rPr lang="en-US" sz="1800" dirty="0" smtClean="0">
-                <a:latin typeface="Times New Roman" pitchFamily="18" charset="0"/>
-                <a:cs typeface="Times New Roman" pitchFamily="18" charset="0"/>
-              </a:rPr>
-              <a:t>good as number of authors increasing</a:t>
+              <a:t>Steady amount of research per author; good as number of authors increasing</a:t>
             </a:r>
           </a:p>
           <a:p>
@@ -13094,14 +13080,21 @@
                 <a:latin typeface="Times New Roman" pitchFamily="18" charset="0"/>
                 <a:cs typeface="Times New Roman" pitchFamily="18" charset="0"/>
               </a:rPr>
-              <a:t>Lotka</a:t>
+              <a:t>Lotka’s</a:t>
             </a:r>
             <a:r>
               <a:rPr lang="en-US" sz="1800" dirty="0" smtClean="0">
                 <a:latin typeface="Times New Roman" pitchFamily="18" charset="0"/>
                 <a:cs typeface="Times New Roman" pitchFamily="18" charset="0"/>
               </a:rPr>
-              <a:t> Law of 60%</a:t>
+              <a:t> </a:t>
+            </a:r>
+            <a:r>
+              <a:rPr lang="en-US" sz="1800" dirty="0" smtClean="0">
+                <a:latin typeface="Times New Roman" pitchFamily="18" charset="0"/>
+                <a:cs typeface="Times New Roman" pitchFamily="18" charset="0"/>
+              </a:rPr>
+              <a:t>Law of 60%</a:t>
             </a:r>
             <a:endParaRPr lang="en-US" sz="1800" dirty="0">
               <a:latin typeface="Times New Roman" pitchFamily="18" charset="0"/>

</xml_diff>